<commit_message>
Added my stuff to the powerpoint
Should be about everyhting I ahve about KNN from the graphs to the code. And slides. I also set up a skeleton of the powerpoint feel free to edit/change to your liking.
</commit_message>
<xml_diff>
--- a/data-science-final-projects.pptx
+++ b/data-science-final-projects.pptx
@@ -2,10 +2,21 @@
 <file path=ppt/presentation.xml><?xml version="1.0" encoding="utf-8"?>
 <p:presentation xmlns:a="http://schemas.openxmlformats.org/drawingml/2006/main" xmlns:r="http://schemas.openxmlformats.org/officeDocument/2006/relationships" xmlns:p="http://schemas.openxmlformats.org/presentationml/2006/main" saveSubsetFonts="1" autoCompressPictures="0">
   <p:sldMasterIdLst>
-    <p:sldMasterId id="2147483648" r:id="rId1"/>
+    <p:sldMasterId id="2147483684" r:id="rId1"/>
   </p:sldMasterIdLst>
   <p:sldIdLst>
     <p:sldId id="256" r:id="rId2"/>
+    <p:sldId id="257" r:id="rId3"/>
+    <p:sldId id="258" r:id="rId4"/>
+    <p:sldId id="259" r:id="rId5"/>
+    <p:sldId id="260" r:id="rId6"/>
+    <p:sldId id="263" r:id="rId7"/>
+    <p:sldId id="264" r:id="rId8"/>
+    <p:sldId id="265" r:id="rId9"/>
+    <p:sldId id="266" r:id="rId10"/>
+    <p:sldId id="267" r:id="rId11"/>
+    <p:sldId id="268" r:id="rId12"/>
+    <p:sldId id="261" r:id="rId13"/>
   </p:sldIdLst>
   <p:sldSz cx="12192000" cy="6858000"/>
   <p:notesSz cx="6858000" cy="9144000"/>
@@ -13,7 +24,7 @@
     <a:defPPr>
       <a:defRPr lang="en-US"/>
     </a:defPPr>
-    <a:lvl1pPr marL="0" algn="l" defTabSz="914400" rtl="0" eaLnBrk="1" latinLnBrk="0" hangingPunct="1">
+    <a:lvl1pPr marL="0" algn="l" defTabSz="457200" rtl="0" eaLnBrk="1" latinLnBrk="0" hangingPunct="1">
       <a:defRPr sz="1800" kern="1200">
         <a:solidFill>
           <a:schemeClr val="tx1"/>
@@ -23,7 +34,7 @@
         <a:cs typeface="+mn-cs"/>
       </a:defRPr>
     </a:lvl1pPr>
-    <a:lvl2pPr marL="457200" algn="l" defTabSz="914400" rtl="0" eaLnBrk="1" latinLnBrk="0" hangingPunct="1">
+    <a:lvl2pPr marL="457200" algn="l" defTabSz="457200" rtl="0" eaLnBrk="1" latinLnBrk="0" hangingPunct="1">
       <a:defRPr sz="1800" kern="1200">
         <a:solidFill>
           <a:schemeClr val="tx1"/>
@@ -33,7 +44,7 @@
         <a:cs typeface="+mn-cs"/>
       </a:defRPr>
     </a:lvl2pPr>
-    <a:lvl3pPr marL="914400" algn="l" defTabSz="914400" rtl="0" eaLnBrk="1" latinLnBrk="0" hangingPunct="1">
+    <a:lvl3pPr marL="914400" algn="l" defTabSz="457200" rtl="0" eaLnBrk="1" latinLnBrk="0" hangingPunct="1">
       <a:defRPr sz="1800" kern="1200">
         <a:solidFill>
           <a:schemeClr val="tx1"/>
@@ -43,7 +54,7 @@
         <a:cs typeface="+mn-cs"/>
       </a:defRPr>
     </a:lvl3pPr>
-    <a:lvl4pPr marL="1371600" algn="l" defTabSz="914400" rtl="0" eaLnBrk="1" latinLnBrk="0" hangingPunct="1">
+    <a:lvl4pPr marL="1371600" algn="l" defTabSz="457200" rtl="0" eaLnBrk="1" latinLnBrk="0" hangingPunct="1">
       <a:defRPr sz="1800" kern="1200">
         <a:solidFill>
           <a:schemeClr val="tx1"/>
@@ -53,7 +64,7 @@
         <a:cs typeface="+mn-cs"/>
       </a:defRPr>
     </a:lvl4pPr>
-    <a:lvl5pPr marL="1828800" algn="l" defTabSz="914400" rtl="0" eaLnBrk="1" latinLnBrk="0" hangingPunct="1">
+    <a:lvl5pPr marL="1828800" algn="l" defTabSz="457200" rtl="0" eaLnBrk="1" latinLnBrk="0" hangingPunct="1">
       <a:defRPr sz="1800" kern="1200">
         <a:solidFill>
           <a:schemeClr val="tx1"/>
@@ -63,7 +74,7 @@
         <a:cs typeface="+mn-cs"/>
       </a:defRPr>
     </a:lvl5pPr>
-    <a:lvl6pPr marL="2286000" algn="l" defTabSz="914400" rtl="0" eaLnBrk="1" latinLnBrk="0" hangingPunct="1">
+    <a:lvl6pPr marL="2286000" algn="l" defTabSz="457200" rtl="0" eaLnBrk="1" latinLnBrk="0" hangingPunct="1">
       <a:defRPr sz="1800" kern="1200">
         <a:solidFill>
           <a:schemeClr val="tx1"/>
@@ -73,7 +84,7 @@
         <a:cs typeface="+mn-cs"/>
       </a:defRPr>
     </a:lvl6pPr>
-    <a:lvl7pPr marL="2743200" algn="l" defTabSz="914400" rtl="0" eaLnBrk="1" latinLnBrk="0" hangingPunct="1">
+    <a:lvl7pPr marL="2743200" algn="l" defTabSz="457200" rtl="0" eaLnBrk="1" latinLnBrk="0" hangingPunct="1">
       <a:defRPr sz="1800" kern="1200">
         <a:solidFill>
           <a:schemeClr val="tx1"/>
@@ -83,7 +94,7 @@
         <a:cs typeface="+mn-cs"/>
       </a:defRPr>
     </a:lvl7pPr>
-    <a:lvl8pPr marL="3200400" algn="l" defTabSz="914400" rtl="0" eaLnBrk="1" latinLnBrk="0" hangingPunct="1">
+    <a:lvl8pPr marL="3200400" algn="l" defTabSz="457200" rtl="0" eaLnBrk="1" latinLnBrk="0" hangingPunct="1">
       <a:defRPr sz="1800" kern="1200">
         <a:solidFill>
           <a:schemeClr val="tx1"/>
@@ -93,7 +104,7 @@
         <a:cs typeface="+mn-cs"/>
       </a:defRPr>
     </a:lvl8pPr>
-    <a:lvl9pPr marL="3657600" algn="l" defTabSz="914400" rtl="0" eaLnBrk="1" latinLnBrk="0" hangingPunct="1">
+    <a:lvl9pPr marL="3657600" algn="l" defTabSz="457200" rtl="0" eaLnBrk="1" latinLnBrk="0" hangingPunct="1">
       <a:defRPr sz="1800" kern="1200">
         <a:solidFill>
           <a:schemeClr val="tx1"/>
@@ -104,6 +115,11 @@
       </a:defRPr>
     </a:lvl9pPr>
   </p:defaultTextStyle>
+  <p:extLst>
+    <p:ext uri="{EFAFB233-063F-42B5-8137-9DF3F51BA10A}">
+      <p15:sldGuideLst xmlns:p15="http://schemas.microsoft.com/office/powerpoint/2012/main"/>
+    </p:ext>
+  </p:extLst>
 </p:presentation>
 </file>
 
@@ -126,13 +142,7 @@
       </p:grpSpPr>
       <p:sp>
         <p:nvSpPr>
-          <p:cNvPr id="2" name="Title 1">
-            <a:extLst>
-              <a:ext uri="{FF2B5EF4-FFF2-40B4-BE49-F238E27FC236}">
-                <a16:creationId xmlns:a16="http://schemas.microsoft.com/office/drawing/2014/main" id="{A486D4A0-2084-82A3-2AEE-2989DCEF0AD7}"/>
-              </a:ext>
-            </a:extLst>
-          </p:cNvPr>
+          <p:cNvPr id="2" name="Title 1"/>
           <p:cNvSpPr>
             <a:spLocks noGrp="1"/>
           </p:cNvSpPr>
@@ -158,18 +168,13 @@
               <a:rPr lang="en-US"/>
               <a:t>Click to edit Master title style</a:t>
             </a:r>
-          </a:p>
-        </p:txBody>
-      </p:sp>
-      <p:sp>
-        <p:nvSpPr>
-          <p:cNvPr id="3" name="Subtitle 2">
-            <a:extLst>
-              <a:ext uri="{FF2B5EF4-FFF2-40B4-BE49-F238E27FC236}">
-                <a16:creationId xmlns:a16="http://schemas.microsoft.com/office/drawing/2014/main" id="{828D7D84-E8BB-1B31-7765-D72198D9A814}"/>
-              </a:ext>
-            </a:extLst>
-          </p:cNvPr>
+            <a:endParaRPr lang="en-US" dirty="0"/>
+          </a:p>
+        </p:txBody>
+      </p:sp>
+      <p:sp>
+        <p:nvSpPr>
+          <p:cNvPr id="3" name="Subtitle 2"/>
           <p:cNvSpPr>
             <a:spLocks noGrp="1"/>
           </p:cNvSpPr>
@@ -228,18 +233,13 @@
               <a:rPr lang="en-US"/>
               <a:t>Click to edit Master subtitle style</a:t>
             </a:r>
-          </a:p>
-        </p:txBody>
-      </p:sp>
-      <p:sp>
-        <p:nvSpPr>
-          <p:cNvPr id="4" name="Date Placeholder 3">
-            <a:extLst>
-              <a:ext uri="{FF2B5EF4-FFF2-40B4-BE49-F238E27FC236}">
-                <a16:creationId xmlns:a16="http://schemas.microsoft.com/office/drawing/2014/main" id="{162E4561-D50C-A13E-F85F-DED4C7D27338}"/>
-              </a:ext>
-            </a:extLst>
-          </p:cNvPr>
+            <a:endParaRPr lang="en-US" dirty="0"/>
+          </a:p>
+        </p:txBody>
+      </p:sp>
+      <p:sp>
+        <p:nvSpPr>
+          <p:cNvPr id="4" name="Date Placeholder 3"/>
           <p:cNvSpPr>
             <a:spLocks noGrp="1"/>
           </p:cNvSpPr>
@@ -254,7 +254,7 @@
           <a:p>
             <a:fld id="{3A76C9ED-68B5-024C-9605-8F26FFAEC05E}" type="datetimeFigureOut">
               <a:rPr lang="en-US" smtClean="0"/>
-              <a:t>11/4/25</a:t>
+              <a:t>11/13/25</a:t>
             </a:fld>
             <a:endParaRPr lang="en-US"/>
           </a:p>
@@ -262,13 +262,7 @@
       </p:sp>
       <p:sp>
         <p:nvSpPr>
-          <p:cNvPr id="5" name="Footer Placeholder 4">
-            <a:extLst>
-              <a:ext uri="{FF2B5EF4-FFF2-40B4-BE49-F238E27FC236}">
-                <a16:creationId xmlns:a16="http://schemas.microsoft.com/office/drawing/2014/main" id="{765BED2A-8176-F212-88A0-0074D4F9E753}"/>
-              </a:ext>
-            </a:extLst>
-          </p:cNvPr>
+          <p:cNvPr id="5" name="Footer Placeholder 4"/>
           <p:cNvSpPr>
             <a:spLocks noGrp="1"/>
           </p:cNvSpPr>
@@ -287,13 +281,7 @@
       </p:sp>
       <p:sp>
         <p:nvSpPr>
-          <p:cNvPr id="6" name="Slide Number Placeholder 5">
-            <a:extLst>
-              <a:ext uri="{FF2B5EF4-FFF2-40B4-BE49-F238E27FC236}">
-                <a16:creationId xmlns:a16="http://schemas.microsoft.com/office/drawing/2014/main" id="{5C688E3C-E316-1621-BD6E-C8C26B4568CC}"/>
-              </a:ext>
-            </a:extLst>
-          </p:cNvPr>
+          <p:cNvPr id="6" name="Slide Number Placeholder 5"/>
           <p:cNvSpPr>
             <a:spLocks noGrp="1"/>
           </p:cNvSpPr>
@@ -317,7 +305,7 @@
     </p:spTree>
     <p:extLst>
       <p:ext uri="{BB962C8B-B14F-4D97-AF65-F5344CB8AC3E}">
-        <p14:creationId xmlns:p14="http://schemas.microsoft.com/office/powerpoint/2010/main" val="1875790542"/>
+        <p14:creationId xmlns:p14="http://schemas.microsoft.com/office/powerpoint/2010/main" val="2884054338"/>
       </p:ext>
     </p:extLst>
   </p:cSld>
@@ -346,13 +334,7 @@
       </p:grpSpPr>
       <p:sp>
         <p:nvSpPr>
-          <p:cNvPr id="2" name="Title 1">
-            <a:extLst>
-              <a:ext uri="{FF2B5EF4-FFF2-40B4-BE49-F238E27FC236}">
-                <a16:creationId xmlns:a16="http://schemas.microsoft.com/office/drawing/2014/main" id="{73AFA879-AFE7-2335-19DD-BD990F672ADD}"/>
-              </a:ext>
-            </a:extLst>
-          </p:cNvPr>
+          <p:cNvPr id="2" name="Title 1"/>
           <p:cNvSpPr>
             <a:spLocks noGrp="1"/>
           </p:cNvSpPr>
@@ -369,18 +351,13 @@
               <a:rPr lang="en-US"/>
               <a:t>Click to edit Master title style</a:t>
             </a:r>
-          </a:p>
-        </p:txBody>
-      </p:sp>
-      <p:sp>
-        <p:nvSpPr>
-          <p:cNvPr id="3" name="Vertical Text Placeholder 2">
-            <a:extLst>
-              <a:ext uri="{FF2B5EF4-FFF2-40B4-BE49-F238E27FC236}">
-                <a16:creationId xmlns:a16="http://schemas.microsoft.com/office/drawing/2014/main" id="{90FD8A0C-D0CD-4082-16B3-DE1F4BB02E2E}"/>
-              </a:ext>
-            </a:extLst>
-          </p:cNvPr>
+            <a:endParaRPr lang="en-US" dirty="0"/>
+          </a:p>
+        </p:txBody>
+      </p:sp>
+      <p:sp>
+        <p:nvSpPr>
+          <p:cNvPr id="3" name="Vertical Text Placeholder 2"/>
           <p:cNvSpPr>
             <a:spLocks noGrp="1"/>
           </p:cNvSpPr>
@@ -426,18 +403,13 @@
               <a:rPr lang="en-US"/>
               <a:t>Fifth level</a:t>
             </a:r>
-          </a:p>
-        </p:txBody>
-      </p:sp>
-      <p:sp>
-        <p:nvSpPr>
-          <p:cNvPr id="4" name="Date Placeholder 3">
-            <a:extLst>
-              <a:ext uri="{FF2B5EF4-FFF2-40B4-BE49-F238E27FC236}">
-                <a16:creationId xmlns:a16="http://schemas.microsoft.com/office/drawing/2014/main" id="{2A0238CB-801F-837D-684B-0E1BB0CE009F}"/>
-              </a:ext>
-            </a:extLst>
-          </p:cNvPr>
+            <a:endParaRPr lang="en-US" dirty="0"/>
+          </a:p>
+        </p:txBody>
+      </p:sp>
+      <p:sp>
+        <p:nvSpPr>
+          <p:cNvPr id="4" name="Date Placeholder 3"/>
           <p:cNvSpPr>
             <a:spLocks noGrp="1"/>
           </p:cNvSpPr>
@@ -452,7 +424,7 @@
           <a:p>
             <a:fld id="{3A76C9ED-68B5-024C-9605-8F26FFAEC05E}" type="datetimeFigureOut">
               <a:rPr lang="en-US" smtClean="0"/>
-              <a:t>11/4/25</a:t>
+              <a:t>11/13/25</a:t>
             </a:fld>
             <a:endParaRPr lang="en-US"/>
           </a:p>
@@ -460,13 +432,7 @@
       </p:sp>
       <p:sp>
         <p:nvSpPr>
-          <p:cNvPr id="5" name="Footer Placeholder 4">
-            <a:extLst>
-              <a:ext uri="{FF2B5EF4-FFF2-40B4-BE49-F238E27FC236}">
-                <a16:creationId xmlns:a16="http://schemas.microsoft.com/office/drawing/2014/main" id="{7A911F22-94D8-AE16-4837-C442C65B754D}"/>
-              </a:ext>
-            </a:extLst>
-          </p:cNvPr>
+          <p:cNvPr id="5" name="Footer Placeholder 4"/>
           <p:cNvSpPr>
             <a:spLocks noGrp="1"/>
           </p:cNvSpPr>
@@ -485,13 +451,7 @@
       </p:sp>
       <p:sp>
         <p:nvSpPr>
-          <p:cNvPr id="6" name="Slide Number Placeholder 5">
-            <a:extLst>
-              <a:ext uri="{FF2B5EF4-FFF2-40B4-BE49-F238E27FC236}">
-                <a16:creationId xmlns:a16="http://schemas.microsoft.com/office/drawing/2014/main" id="{90E5EAFA-BC68-72BA-492F-E2DFA031E793}"/>
-              </a:ext>
-            </a:extLst>
-          </p:cNvPr>
+          <p:cNvPr id="6" name="Slide Number Placeholder 5"/>
           <p:cNvSpPr>
             <a:spLocks noGrp="1"/>
           </p:cNvSpPr>
@@ -515,7 +475,7 @@
     </p:spTree>
     <p:extLst>
       <p:ext uri="{BB962C8B-B14F-4D97-AF65-F5344CB8AC3E}">
-        <p14:creationId xmlns:p14="http://schemas.microsoft.com/office/powerpoint/2010/main" val="3560248186"/>
+        <p14:creationId xmlns:p14="http://schemas.microsoft.com/office/powerpoint/2010/main" val="2531609369"/>
       </p:ext>
     </p:extLst>
   </p:cSld>
@@ -544,13 +504,7 @@
       </p:grpSpPr>
       <p:sp>
         <p:nvSpPr>
-          <p:cNvPr id="2" name="Vertical Title 1">
-            <a:extLst>
-              <a:ext uri="{FF2B5EF4-FFF2-40B4-BE49-F238E27FC236}">
-                <a16:creationId xmlns:a16="http://schemas.microsoft.com/office/drawing/2014/main" id="{F10CC54F-D604-C81E-C5EE-F9269045058A}"/>
-              </a:ext>
-            </a:extLst>
-          </p:cNvPr>
+          <p:cNvPr id="2" name="Vertical Title 1"/>
           <p:cNvSpPr>
             <a:spLocks noGrp="1"/>
           </p:cNvSpPr>
@@ -572,18 +526,13 @@
               <a:rPr lang="en-US"/>
               <a:t>Click to edit Master title style</a:t>
             </a:r>
-          </a:p>
-        </p:txBody>
-      </p:sp>
-      <p:sp>
-        <p:nvSpPr>
-          <p:cNvPr id="3" name="Vertical Text Placeholder 2">
-            <a:extLst>
-              <a:ext uri="{FF2B5EF4-FFF2-40B4-BE49-F238E27FC236}">
-                <a16:creationId xmlns:a16="http://schemas.microsoft.com/office/drawing/2014/main" id="{7E0615BD-FA9D-F4D2-3676-929F4722FCCC}"/>
-              </a:ext>
-            </a:extLst>
-          </p:cNvPr>
+            <a:endParaRPr lang="en-US" dirty="0"/>
+          </a:p>
+        </p:txBody>
+      </p:sp>
+      <p:sp>
+        <p:nvSpPr>
+          <p:cNvPr id="3" name="Vertical Text Placeholder 2"/>
           <p:cNvSpPr>
             <a:spLocks noGrp="1"/>
           </p:cNvSpPr>
@@ -634,18 +583,13 @@
               <a:rPr lang="en-US"/>
               <a:t>Fifth level</a:t>
             </a:r>
-          </a:p>
-        </p:txBody>
-      </p:sp>
-      <p:sp>
-        <p:nvSpPr>
-          <p:cNvPr id="4" name="Date Placeholder 3">
-            <a:extLst>
-              <a:ext uri="{FF2B5EF4-FFF2-40B4-BE49-F238E27FC236}">
-                <a16:creationId xmlns:a16="http://schemas.microsoft.com/office/drawing/2014/main" id="{EDE33667-100B-EE54-EA65-4DAACC08D72C}"/>
-              </a:ext>
-            </a:extLst>
-          </p:cNvPr>
+            <a:endParaRPr lang="en-US" dirty="0"/>
+          </a:p>
+        </p:txBody>
+      </p:sp>
+      <p:sp>
+        <p:nvSpPr>
+          <p:cNvPr id="4" name="Date Placeholder 3"/>
           <p:cNvSpPr>
             <a:spLocks noGrp="1"/>
           </p:cNvSpPr>
@@ -660,7 +604,7 @@
           <a:p>
             <a:fld id="{3A76C9ED-68B5-024C-9605-8F26FFAEC05E}" type="datetimeFigureOut">
               <a:rPr lang="en-US" smtClean="0"/>
-              <a:t>11/4/25</a:t>
+              <a:t>11/13/25</a:t>
             </a:fld>
             <a:endParaRPr lang="en-US"/>
           </a:p>
@@ -668,13 +612,7 @@
       </p:sp>
       <p:sp>
         <p:nvSpPr>
-          <p:cNvPr id="5" name="Footer Placeholder 4">
-            <a:extLst>
-              <a:ext uri="{FF2B5EF4-FFF2-40B4-BE49-F238E27FC236}">
-                <a16:creationId xmlns:a16="http://schemas.microsoft.com/office/drawing/2014/main" id="{A200E5F4-A884-EEBC-714A-D0FEDDA29E07}"/>
-              </a:ext>
-            </a:extLst>
-          </p:cNvPr>
+          <p:cNvPr id="5" name="Footer Placeholder 4"/>
           <p:cNvSpPr>
             <a:spLocks noGrp="1"/>
           </p:cNvSpPr>
@@ -693,13 +631,7 @@
       </p:sp>
       <p:sp>
         <p:nvSpPr>
-          <p:cNvPr id="6" name="Slide Number Placeholder 5">
-            <a:extLst>
-              <a:ext uri="{FF2B5EF4-FFF2-40B4-BE49-F238E27FC236}">
-                <a16:creationId xmlns:a16="http://schemas.microsoft.com/office/drawing/2014/main" id="{FE3F1A66-6427-CD81-AF66-BDD82926E569}"/>
-              </a:ext>
-            </a:extLst>
-          </p:cNvPr>
+          <p:cNvPr id="6" name="Slide Number Placeholder 5"/>
           <p:cNvSpPr>
             <a:spLocks noGrp="1"/>
           </p:cNvSpPr>
@@ -723,7 +655,7 @@
     </p:spTree>
     <p:extLst>
       <p:ext uri="{BB962C8B-B14F-4D97-AF65-F5344CB8AC3E}">
-        <p14:creationId xmlns:p14="http://schemas.microsoft.com/office/powerpoint/2010/main" val="4248976006"/>
+        <p14:creationId xmlns:p14="http://schemas.microsoft.com/office/powerpoint/2010/main" val="724768145"/>
       </p:ext>
     </p:extLst>
   </p:cSld>
@@ -752,13 +684,7 @@
       </p:grpSpPr>
       <p:sp>
         <p:nvSpPr>
-          <p:cNvPr id="2" name="Title 1">
-            <a:extLst>
-              <a:ext uri="{FF2B5EF4-FFF2-40B4-BE49-F238E27FC236}">
-                <a16:creationId xmlns:a16="http://schemas.microsoft.com/office/drawing/2014/main" id="{0CADB160-5AB2-CA18-6189-8FBDBBAB9E7C}"/>
-              </a:ext>
-            </a:extLst>
-          </p:cNvPr>
+          <p:cNvPr id="2" name="Title 1"/>
           <p:cNvSpPr>
             <a:spLocks noGrp="1"/>
           </p:cNvSpPr>
@@ -775,18 +701,13 @@
               <a:rPr lang="en-US"/>
               <a:t>Click to edit Master title style</a:t>
             </a:r>
-          </a:p>
-        </p:txBody>
-      </p:sp>
-      <p:sp>
-        <p:nvSpPr>
-          <p:cNvPr id="3" name="Content Placeholder 2">
-            <a:extLst>
-              <a:ext uri="{FF2B5EF4-FFF2-40B4-BE49-F238E27FC236}">
-                <a16:creationId xmlns:a16="http://schemas.microsoft.com/office/drawing/2014/main" id="{1CBFA450-E8E7-8749-06A9-81A09E51661A}"/>
-              </a:ext>
-            </a:extLst>
-          </p:cNvPr>
+            <a:endParaRPr lang="en-US" dirty="0"/>
+          </a:p>
+        </p:txBody>
+      </p:sp>
+      <p:sp>
+        <p:nvSpPr>
+          <p:cNvPr id="3" name="Content Placeholder 2"/>
           <p:cNvSpPr>
             <a:spLocks noGrp="1"/>
           </p:cNvSpPr>
@@ -832,18 +753,13 @@
               <a:rPr lang="en-US"/>
               <a:t>Fifth level</a:t>
             </a:r>
-          </a:p>
-        </p:txBody>
-      </p:sp>
-      <p:sp>
-        <p:nvSpPr>
-          <p:cNvPr id="4" name="Date Placeholder 3">
-            <a:extLst>
-              <a:ext uri="{FF2B5EF4-FFF2-40B4-BE49-F238E27FC236}">
-                <a16:creationId xmlns:a16="http://schemas.microsoft.com/office/drawing/2014/main" id="{9DBD3F72-5FD0-BBF9-374E-7BFE80FBFCB9}"/>
-              </a:ext>
-            </a:extLst>
-          </p:cNvPr>
+            <a:endParaRPr lang="en-US" dirty="0"/>
+          </a:p>
+        </p:txBody>
+      </p:sp>
+      <p:sp>
+        <p:nvSpPr>
+          <p:cNvPr id="4" name="Date Placeholder 3"/>
           <p:cNvSpPr>
             <a:spLocks noGrp="1"/>
           </p:cNvSpPr>
@@ -858,7 +774,7 @@
           <a:p>
             <a:fld id="{3A76C9ED-68B5-024C-9605-8F26FFAEC05E}" type="datetimeFigureOut">
               <a:rPr lang="en-US" smtClean="0"/>
-              <a:t>11/4/25</a:t>
+              <a:t>11/13/25</a:t>
             </a:fld>
             <a:endParaRPr lang="en-US"/>
           </a:p>
@@ -866,13 +782,7 @@
       </p:sp>
       <p:sp>
         <p:nvSpPr>
-          <p:cNvPr id="5" name="Footer Placeholder 4">
-            <a:extLst>
-              <a:ext uri="{FF2B5EF4-FFF2-40B4-BE49-F238E27FC236}">
-                <a16:creationId xmlns:a16="http://schemas.microsoft.com/office/drawing/2014/main" id="{C36B28F0-7CAC-FCF8-8E21-4359B3D06E97}"/>
-              </a:ext>
-            </a:extLst>
-          </p:cNvPr>
+          <p:cNvPr id="5" name="Footer Placeholder 4"/>
           <p:cNvSpPr>
             <a:spLocks noGrp="1"/>
           </p:cNvSpPr>
@@ -891,13 +801,7 @@
       </p:sp>
       <p:sp>
         <p:nvSpPr>
-          <p:cNvPr id="6" name="Slide Number Placeholder 5">
-            <a:extLst>
-              <a:ext uri="{FF2B5EF4-FFF2-40B4-BE49-F238E27FC236}">
-                <a16:creationId xmlns:a16="http://schemas.microsoft.com/office/drawing/2014/main" id="{C17E9EC4-084E-04A1-D521-8714D3D8A624}"/>
-              </a:ext>
-            </a:extLst>
-          </p:cNvPr>
+          <p:cNvPr id="6" name="Slide Number Placeholder 5"/>
           <p:cNvSpPr>
             <a:spLocks noGrp="1"/>
           </p:cNvSpPr>
@@ -921,7 +825,7 @@
     </p:spTree>
     <p:extLst>
       <p:ext uri="{BB962C8B-B14F-4D97-AF65-F5344CB8AC3E}">
-        <p14:creationId xmlns:p14="http://schemas.microsoft.com/office/powerpoint/2010/main" val="3107520329"/>
+        <p14:creationId xmlns:p14="http://schemas.microsoft.com/office/powerpoint/2010/main" val="2117424455"/>
       </p:ext>
     </p:extLst>
   </p:cSld>
@@ -950,13 +854,7 @@
       </p:grpSpPr>
       <p:sp>
         <p:nvSpPr>
-          <p:cNvPr id="2" name="Title 1">
-            <a:extLst>
-              <a:ext uri="{FF2B5EF4-FFF2-40B4-BE49-F238E27FC236}">
-                <a16:creationId xmlns:a16="http://schemas.microsoft.com/office/drawing/2014/main" id="{AB6C7D89-4C4E-CEAF-AA26-0E4BF550C4D2}"/>
-              </a:ext>
-            </a:extLst>
-          </p:cNvPr>
+          <p:cNvPr id="2" name="Title 1"/>
           <p:cNvSpPr>
             <a:spLocks noGrp="1"/>
           </p:cNvSpPr>
@@ -982,18 +880,13 @@
               <a:rPr lang="en-US"/>
               <a:t>Click to edit Master title style</a:t>
             </a:r>
-          </a:p>
-        </p:txBody>
-      </p:sp>
-      <p:sp>
-        <p:nvSpPr>
-          <p:cNvPr id="3" name="Text Placeholder 2">
-            <a:extLst>
-              <a:ext uri="{FF2B5EF4-FFF2-40B4-BE49-F238E27FC236}">
-                <a16:creationId xmlns:a16="http://schemas.microsoft.com/office/drawing/2014/main" id="{4110E2E9-255F-C6C3-2426-2E7FB862F29B}"/>
-              </a:ext>
-            </a:extLst>
-          </p:cNvPr>
+            <a:endParaRPr lang="en-US" dirty="0"/>
+          </a:p>
+        </p:txBody>
+      </p:sp>
+      <p:sp>
+        <p:nvSpPr>
+          <p:cNvPr id="3" name="Text Placeholder 2"/>
           <p:cNvSpPr>
             <a:spLocks noGrp="1"/>
           </p:cNvSpPr>
@@ -1015,7 +908,7 @@
               <a:defRPr sz="2400">
                 <a:solidFill>
                   <a:schemeClr val="tx1">
-                    <a:tint val="82000"/>
+                    <a:tint val="75000"/>
                   </a:schemeClr>
                 </a:solidFill>
               </a:defRPr>
@@ -1025,7 +918,7 @@
               <a:defRPr sz="2000">
                 <a:solidFill>
                   <a:schemeClr val="tx1">
-                    <a:tint val="82000"/>
+                    <a:tint val="75000"/>
                   </a:schemeClr>
                 </a:solidFill>
               </a:defRPr>
@@ -1035,7 +928,7 @@
               <a:defRPr sz="1800">
                 <a:solidFill>
                   <a:schemeClr val="tx1">
-                    <a:tint val="82000"/>
+                    <a:tint val="75000"/>
                   </a:schemeClr>
                 </a:solidFill>
               </a:defRPr>
@@ -1045,7 +938,7 @@
               <a:defRPr sz="1600">
                 <a:solidFill>
                   <a:schemeClr val="tx1">
-                    <a:tint val="82000"/>
+                    <a:tint val="75000"/>
                   </a:schemeClr>
                 </a:solidFill>
               </a:defRPr>
@@ -1055,7 +948,7 @@
               <a:defRPr sz="1600">
                 <a:solidFill>
                   <a:schemeClr val="tx1">
-                    <a:tint val="82000"/>
+                    <a:tint val="75000"/>
                   </a:schemeClr>
                 </a:solidFill>
               </a:defRPr>
@@ -1065,7 +958,7 @@
               <a:defRPr sz="1600">
                 <a:solidFill>
                   <a:schemeClr val="tx1">
-                    <a:tint val="82000"/>
+                    <a:tint val="75000"/>
                   </a:schemeClr>
                 </a:solidFill>
               </a:defRPr>
@@ -1075,7 +968,7 @@
               <a:defRPr sz="1600">
                 <a:solidFill>
                   <a:schemeClr val="tx1">
-                    <a:tint val="82000"/>
+                    <a:tint val="75000"/>
                   </a:schemeClr>
                 </a:solidFill>
               </a:defRPr>
@@ -1085,7 +978,7 @@
               <a:defRPr sz="1600">
                 <a:solidFill>
                   <a:schemeClr val="tx1">
-                    <a:tint val="82000"/>
+                    <a:tint val="75000"/>
                   </a:schemeClr>
                 </a:solidFill>
               </a:defRPr>
@@ -1095,7 +988,7 @@
               <a:defRPr sz="1600">
                 <a:solidFill>
                   <a:schemeClr val="tx1">
-                    <a:tint val="82000"/>
+                    <a:tint val="75000"/>
                   </a:schemeClr>
                 </a:solidFill>
               </a:defRPr>
@@ -1112,13 +1005,7 @@
       </p:sp>
       <p:sp>
         <p:nvSpPr>
-          <p:cNvPr id="4" name="Date Placeholder 3">
-            <a:extLst>
-              <a:ext uri="{FF2B5EF4-FFF2-40B4-BE49-F238E27FC236}">
-                <a16:creationId xmlns:a16="http://schemas.microsoft.com/office/drawing/2014/main" id="{220F0A5E-6026-A392-5EA2-6C2034E72DF3}"/>
-              </a:ext>
-            </a:extLst>
-          </p:cNvPr>
+          <p:cNvPr id="4" name="Date Placeholder 3"/>
           <p:cNvSpPr>
             <a:spLocks noGrp="1"/>
           </p:cNvSpPr>
@@ -1133,7 +1020,7 @@
           <a:p>
             <a:fld id="{3A76C9ED-68B5-024C-9605-8F26FFAEC05E}" type="datetimeFigureOut">
               <a:rPr lang="en-US" smtClean="0"/>
-              <a:t>11/4/25</a:t>
+              <a:t>11/13/25</a:t>
             </a:fld>
             <a:endParaRPr lang="en-US"/>
           </a:p>
@@ -1141,13 +1028,7 @@
       </p:sp>
       <p:sp>
         <p:nvSpPr>
-          <p:cNvPr id="5" name="Footer Placeholder 4">
-            <a:extLst>
-              <a:ext uri="{FF2B5EF4-FFF2-40B4-BE49-F238E27FC236}">
-                <a16:creationId xmlns:a16="http://schemas.microsoft.com/office/drawing/2014/main" id="{5C20D84F-BC2D-E424-AF01-D1F44E2072D9}"/>
-              </a:ext>
-            </a:extLst>
-          </p:cNvPr>
+          <p:cNvPr id="5" name="Footer Placeholder 4"/>
           <p:cNvSpPr>
             <a:spLocks noGrp="1"/>
           </p:cNvSpPr>
@@ -1166,13 +1047,7 @@
       </p:sp>
       <p:sp>
         <p:nvSpPr>
-          <p:cNvPr id="6" name="Slide Number Placeholder 5">
-            <a:extLst>
-              <a:ext uri="{FF2B5EF4-FFF2-40B4-BE49-F238E27FC236}">
-                <a16:creationId xmlns:a16="http://schemas.microsoft.com/office/drawing/2014/main" id="{A1AAD833-3838-A9C0-C28F-67F2C7C80E94}"/>
-              </a:ext>
-            </a:extLst>
-          </p:cNvPr>
+          <p:cNvPr id="6" name="Slide Number Placeholder 5"/>
           <p:cNvSpPr>
             <a:spLocks noGrp="1"/>
           </p:cNvSpPr>
@@ -1196,7 +1071,7 @@
     </p:spTree>
     <p:extLst>
       <p:ext uri="{BB962C8B-B14F-4D97-AF65-F5344CB8AC3E}">
-        <p14:creationId xmlns:p14="http://schemas.microsoft.com/office/powerpoint/2010/main" val="104454576"/>
+        <p14:creationId xmlns:p14="http://schemas.microsoft.com/office/powerpoint/2010/main" val="464420022"/>
       </p:ext>
     </p:extLst>
   </p:cSld>
@@ -1225,13 +1100,7 @@
       </p:grpSpPr>
       <p:sp>
         <p:nvSpPr>
-          <p:cNvPr id="2" name="Title 1">
-            <a:extLst>
-              <a:ext uri="{FF2B5EF4-FFF2-40B4-BE49-F238E27FC236}">
-                <a16:creationId xmlns:a16="http://schemas.microsoft.com/office/drawing/2014/main" id="{A73BF821-160F-3E4B-0999-FBFE5665A050}"/>
-              </a:ext>
-            </a:extLst>
-          </p:cNvPr>
+          <p:cNvPr id="2" name="Title 1"/>
           <p:cNvSpPr>
             <a:spLocks noGrp="1"/>
           </p:cNvSpPr>
@@ -1248,18 +1117,13 @@
               <a:rPr lang="en-US"/>
               <a:t>Click to edit Master title style</a:t>
             </a:r>
-          </a:p>
-        </p:txBody>
-      </p:sp>
-      <p:sp>
-        <p:nvSpPr>
-          <p:cNvPr id="3" name="Content Placeholder 2">
-            <a:extLst>
-              <a:ext uri="{FF2B5EF4-FFF2-40B4-BE49-F238E27FC236}">
-                <a16:creationId xmlns:a16="http://schemas.microsoft.com/office/drawing/2014/main" id="{04613B26-0A37-98A4-91FF-79A63BF790CB}"/>
-              </a:ext>
-            </a:extLst>
-          </p:cNvPr>
+            <a:endParaRPr lang="en-US" dirty="0"/>
+          </a:p>
+        </p:txBody>
+      </p:sp>
+      <p:sp>
+        <p:nvSpPr>
+          <p:cNvPr id="3" name="Content Placeholder 2"/>
           <p:cNvSpPr>
             <a:spLocks noGrp="1"/>
           </p:cNvSpPr>
@@ -1310,18 +1174,13 @@
               <a:rPr lang="en-US"/>
               <a:t>Fifth level</a:t>
             </a:r>
-          </a:p>
-        </p:txBody>
-      </p:sp>
-      <p:sp>
-        <p:nvSpPr>
-          <p:cNvPr id="4" name="Content Placeholder 3">
-            <a:extLst>
-              <a:ext uri="{FF2B5EF4-FFF2-40B4-BE49-F238E27FC236}">
-                <a16:creationId xmlns:a16="http://schemas.microsoft.com/office/drawing/2014/main" id="{46278F38-A3B9-D872-58B2-D91EEFAA5C24}"/>
-              </a:ext>
-            </a:extLst>
-          </p:cNvPr>
+            <a:endParaRPr lang="en-US" dirty="0"/>
+          </a:p>
+        </p:txBody>
+      </p:sp>
+      <p:sp>
+        <p:nvSpPr>
+          <p:cNvPr id="4" name="Content Placeholder 3"/>
           <p:cNvSpPr>
             <a:spLocks noGrp="1"/>
           </p:cNvSpPr>
@@ -1372,18 +1231,13 @@
               <a:rPr lang="en-US"/>
               <a:t>Fifth level</a:t>
             </a:r>
-          </a:p>
-        </p:txBody>
-      </p:sp>
-      <p:sp>
-        <p:nvSpPr>
-          <p:cNvPr id="5" name="Date Placeholder 4">
-            <a:extLst>
-              <a:ext uri="{FF2B5EF4-FFF2-40B4-BE49-F238E27FC236}">
-                <a16:creationId xmlns:a16="http://schemas.microsoft.com/office/drawing/2014/main" id="{07218BB2-9320-2E8A-AC99-A1912D49A510}"/>
-              </a:ext>
-            </a:extLst>
-          </p:cNvPr>
+            <a:endParaRPr lang="en-US" dirty="0"/>
+          </a:p>
+        </p:txBody>
+      </p:sp>
+      <p:sp>
+        <p:nvSpPr>
+          <p:cNvPr id="5" name="Date Placeholder 4"/>
           <p:cNvSpPr>
             <a:spLocks noGrp="1"/>
           </p:cNvSpPr>
@@ -1398,7 +1252,7 @@
           <a:p>
             <a:fld id="{3A76C9ED-68B5-024C-9605-8F26FFAEC05E}" type="datetimeFigureOut">
               <a:rPr lang="en-US" smtClean="0"/>
-              <a:t>11/4/25</a:t>
+              <a:t>11/13/25</a:t>
             </a:fld>
             <a:endParaRPr lang="en-US"/>
           </a:p>
@@ -1406,13 +1260,7 @@
       </p:sp>
       <p:sp>
         <p:nvSpPr>
-          <p:cNvPr id="6" name="Footer Placeholder 5">
-            <a:extLst>
-              <a:ext uri="{FF2B5EF4-FFF2-40B4-BE49-F238E27FC236}">
-                <a16:creationId xmlns:a16="http://schemas.microsoft.com/office/drawing/2014/main" id="{C0F4D7E7-F168-C5AE-25C7-34C0D59216F8}"/>
-              </a:ext>
-            </a:extLst>
-          </p:cNvPr>
+          <p:cNvPr id="6" name="Footer Placeholder 5"/>
           <p:cNvSpPr>
             <a:spLocks noGrp="1"/>
           </p:cNvSpPr>
@@ -1431,13 +1279,7 @@
       </p:sp>
       <p:sp>
         <p:nvSpPr>
-          <p:cNvPr id="7" name="Slide Number Placeholder 6">
-            <a:extLst>
-              <a:ext uri="{FF2B5EF4-FFF2-40B4-BE49-F238E27FC236}">
-                <a16:creationId xmlns:a16="http://schemas.microsoft.com/office/drawing/2014/main" id="{B15749EF-01C5-4766-CBA8-89174AA92AD6}"/>
-              </a:ext>
-            </a:extLst>
-          </p:cNvPr>
+          <p:cNvPr id="7" name="Slide Number Placeholder 6"/>
           <p:cNvSpPr>
             <a:spLocks noGrp="1"/>
           </p:cNvSpPr>
@@ -1461,7 +1303,7 @@
     </p:spTree>
     <p:extLst>
       <p:ext uri="{BB962C8B-B14F-4D97-AF65-F5344CB8AC3E}">
-        <p14:creationId xmlns:p14="http://schemas.microsoft.com/office/powerpoint/2010/main" val="2349832102"/>
+        <p14:creationId xmlns:p14="http://schemas.microsoft.com/office/powerpoint/2010/main" val="2336404070"/>
       </p:ext>
     </p:extLst>
   </p:cSld>
@@ -1490,13 +1332,7 @@
       </p:grpSpPr>
       <p:sp>
         <p:nvSpPr>
-          <p:cNvPr id="2" name="Title 1">
-            <a:extLst>
-              <a:ext uri="{FF2B5EF4-FFF2-40B4-BE49-F238E27FC236}">
-                <a16:creationId xmlns:a16="http://schemas.microsoft.com/office/drawing/2014/main" id="{83EE33E3-F397-872A-769A-5A24E8209A56}"/>
-              </a:ext>
-            </a:extLst>
-          </p:cNvPr>
+          <p:cNvPr id="2" name="Title 1"/>
           <p:cNvSpPr>
             <a:spLocks noGrp="1"/>
           </p:cNvSpPr>
@@ -1518,18 +1354,13 @@
               <a:rPr lang="en-US"/>
               <a:t>Click to edit Master title style</a:t>
             </a:r>
-          </a:p>
-        </p:txBody>
-      </p:sp>
-      <p:sp>
-        <p:nvSpPr>
-          <p:cNvPr id="3" name="Text Placeholder 2">
-            <a:extLst>
-              <a:ext uri="{FF2B5EF4-FFF2-40B4-BE49-F238E27FC236}">
-                <a16:creationId xmlns:a16="http://schemas.microsoft.com/office/drawing/2014/main" id="{1A20FE2D-0E01-9334-A610-3779C0761B80}"/>
-              </a:ext>
-            </a:extLst>
-          </p:cNvPr>
+            <a:endParaRPr lang="en-US" dirty="0"/>
+          </a:p>
+        </p:txBody>
+      </p:sp>
+      <p:sp>
+        <p:nvSpPr>
+          <p:cNvPr id="3" name="Text Placeholder 2"/>
           <p:cNvSpPr>
             <a:spLocks noGrp="1"/>
           </p:cNvSpPr>
@@ -1594,13 +1425,7 @@
       </p:sp>
       <p:sp>
         <p:nvSpPr>
-          <p:cNvPr id="4" name="Content Placeholder 3">
-            <a:extLst>
-              <a:ext uri="{FF2B5EF4-FFF2-40B4-BE49-F238E27FC236}">
-                <a16:creationId xmlns:a16="http://schemas.microsoft.com/office/drawing/2014/main" id="{26A74DBC-EAA7-C6D7-04FF-22F03E18C36A}"/>
-              </a:ext>
-            </a:extLst>
-          </p:cNvPr>
+          <p:cNvPr id="4" name="Content Placeholder 3"/>
           <p:cNvSpPr>
             <a:spLocks noGrp="1"/>
           </p:cNvSpPr>
@@ -1651,18 +1476,13 @@
               <a:rPr lang="en-US"/>
               <a:t>Fifth level</a:t>
             </a:r>
-          </a:p>
-        </p:txBody>
-      </p:sp>
-      <p:sp>
-        <p:nvSpPr>
-          <p:cNvPr id="5" name="Text Placeholder 4">
-            <a:extLst>
-              <a:ext uri="{FF2B5EF4-FFF2-40B4-BE49-F238E27FC236}">
-                <a16:creationId xmlns:a16="http://schemas.microsoft.com/office/drawing/2014/main" id="{5D397D34-3E90-DEFF-D1E7-90F3777013E0}"/>
-              </a:ext>
-            </a:extLst>
-          </p:cNvPr>
+            <a:endParaRPr lang="en-US" dirty="0"/>
+          </a:p>
+        </p:txBody>
+      </p:sp>
+      <p:sp>
+        <p:nvSpPr>
+          <p:cNvPr id="5" name="Text Placeholder 4"/>
           <p:cNvSpPr>
             <a:spLocks noGrp="1"/>
           </p:cNvSpPr>
@@ -1727,13 +1547,7 @@
       </p:sp>
       <p:sp>
         <p:nvSpPr>
-          <p:cNvPr id="6" name="Content Placeholder 5">
-            <a:extLst>
-              <a:ext uri="{FF2B5EF4-FFF2-40B4-BE49-F238E27FC236}">
-                <a16:creationId xmlns:a16="http://schemas.microsoft.com/office/drawing/2014/main" id="{5DE042F8-9E0E-E819-D562-D9FCDB557EA8}"/>
-              </a:ext>
-            </a:extLst>
-          </p:cNvPr>
+          <p:cNvPr id="6" name="Content Placeholder 5"/>
           <p:cNvSpPr>
             <a:spLocks noGrp="1"/>
           </p:cNvSpPr>
@@ -1784,18 +1598,13 @@
               <a:rPr lang="en-US"/>
               <a:t>Fifth level</a:t>
             </a:r>
-          </a:p>
-        </p:txBody>
-      </p:sp>
-      <p:sp>
-        <p:nvSpPr>
-          <p:cNvPr id="7" name="Date Placeholder 6">
-            <a:extLst>
-              <a:ext uri="{FF2B5EF4-FFF2-40B4-BE49-F238E27FC236}">
-                <a16:creationId xmlns:a16="http://schemas.microsoft.com/office/drawing/2014/main" id="{BE2DB35B-7929-F970-9D06-35268ED1CF3C}"/>
-              </a:ext>
-            </a:extLst>
-          </p:cNvPr>
+            <a:endParaRPr lang="en-US" dirty="0"/>
+          </a:p>
+        </p:txBody>
+      </p:sp>
+      <p:sp>
+        <p:nvSpPr>
+          <p:cNvPr id="7" name="Date Placeholder 6"/>
           <p:cNvSpPr>
             <a:spLocks noGrp="1"/>
           </p:cNvSpPr>
@@ -1810,7 +1619,7 @@
           <a:p>
             <a:fld id="{3A76C9ED-68B5-024C-9605-8F26FFAEC05E}" type="datetimeFigureOut">
               <a:rPr lang="en-US" smtClean="0"/>
-              <a:t>11/4/25</a:t>
+              <a:t>11/13/25</a:t>
             </a:fld>
             <a:endParaRPr lang="en-US"/>
           </a:p>
@@ -1818,13 +1627,7 @@
       </p:sp>
       <p:sp>
         <p:nvSpPr>
-          <p:cNvPr id="8" name="Footer Placeholder 7">
-            <a:extLst>
-              <a:ext uri="{FF2B5EF4-FFF2-40B4-BE49-F238E27FC236}">
-                <a16:creationId xmlns:a16="http://schemas.microsoft.com/office/drawing/2014/main" id="{D1FF28E4-4A98-FF6C-BC71-3A02BBDE4B0C}"/>
-              </a:ext>
-            </a:extLst>
-          </p:cNvPr>
+          <p:cNvPr id="8" name="Footer Placeholder 7"/>
           <p:cNvSpPr>
             <a:spLocks noGrp="1"/>
           </p:cNvSpPr>
@@ -1843,13 +1646,7 @@
       </p:sp>
       <p:sp>
         <p:nvSpPr>
-          <p:cNvPr id="9" name="Slide Number Placeholder 8">
-            <a:extLst>
-              <a:ext uri="{FF2B5EF4-FFF2-40B4-BE49-F238E27FC236}">
-                <a16:creationId xmlns:a16="http://schemas.microsoft.com/office/drawing/2014/main" id="{80BDD02C-56B0-D4F7-B5CD-B1333E5B613D}"/>
-              </a:ext>
-            </a:extLst>
-          </p:cNvPr>
+          <p:cNvPr id="9" name="Slide Number Placeholder 8"/>
           <p:cNvSpPr>
             <a:spLocks noGrp="1"/>
           </p:cNvSpPr>
@@ -1873,7 +1670,7 @@
     </p:spTree>
     <p:extLst>
       <p:ext uri="{BB962C8B-B14F-4D97-AF65-F5344CB8AC3E}">
-        <p14:creationId xmlns:p14="http://schemas.microsoft.com/office/powerpoint/2010/main" val="1634131153"/>
+        <p14:creationId xmlns:p14="http://schemas.microsoft.com/office/powerpoint/2010/main" val="3632038184"/>
       </p:ext>
     </p:extLst>
   </p:cSld>
@@ -1902,13 +1699,7 @@
       </p:grpSpPr>
       <p:sp>
         <p:nvSpPr>
-          <p:cNvPr id="2" name="Title 1">
-            <a:extLst>
-              <a:ext uri="{FF2B5EF4-FFF2-40B4-BE49-F238E27FC236}">
-                <a16:creationId xmlns:a16="http://schemas.microsoft.com/office/drawing/2014/main" id="{BD7D5B38-8D0D-AA30-46DF-4B14D56A2550}"/>
-              </a:ext>
-            </a:extLst>
-          </p:cNvPr>
+          <p:cNvPr id="2" name="Title 1"/>
           <p:cNvSpPr>
             <a:spLocks noGrp="1"/>
           </p:cNvSpPr>
@@ -1925,18 +1716,13 @@
               <a:rPr lang="en-US"/>
               <a:t>Click to edit Master title style</a:t>
             </a:r>
-          </a:p>
-        </p:txBody>
-      </p:sp>
-      <p:sp>
-        <p:nvSpPr>
-          <p:cNvPr id="3" name="Date Placeholder 2">
-            <a:extLst>
-              <a:ext uri="{FF2B5EF4-FFF2-40B4-BE49-F238E27FC236}">
-                <a16:creationId xmlns:a16="http://schemas.microsoft.com/office/drawing/2014/main" id="{54E38EF8-04ED-C25C-3DEA-A357F05F0A3C}"/>
-              </a:ext>
-            </a:extLst>
-          </p:cNvPr>
+            <a:endParaRPr lang="en-US" dirty="0"/>
+          </a:p>
+        </p:txBody>
+      </p:sp>
+      <p:sp>
+        <p:nvSpPr>
+          <p:cNvPr id="3" name="Date Placeholder 2"/>
           <p:cNvSpPr>
             <a:spLocks noGrp="1"/>
           </p:cNvSpPr>
@@ -1951,7 +1737,7 @@
           <a:p>
             <a:fld id="{3A76C9ED-68B5-024C-9605-8F26FFAEC05E}" type="datetimeFigureOut">
               <a:rPr lang="en-US" smtClean="0"/>
-              <a:t>11/4/25</a:t>
+              <a:t>11/13/25</a:t>
             </a:fld>
             <a:endParaRPr lang="en-US"/>
           </a:p>
@@ -1959,13 +1745,7 @@
       </p:sp>
       <p:sp>
         <p:nvSpPr>
-          <p:cNvPr id="4" name="Footer Placeholder 3">
-            <a:extLst>
-              <a:ext uri="{FF2B5EF4-FFF2-40B4-BE49-F238E27FC236}">
-                <a16:creationId xmlns:a16="http://schemas.microsoft.com/office/drawing/2014/main" id="{EA917BCD-D9E9-AB1E-CD9D-B7191E2E45DB}"/>
-              </a:ext>
-            </a:extLst>
-          </p:cNvPr>
+          <p:cNvPr id="4" name="Footer Placeholder 3"/>
           <p:cNvSpPr>
             <a:spLocks noGrp="1"/>
           </p:cNvSpPr>
@@ -1984,13 +1764,7 @@
       </p:sp>
       <p:sp>
         <p:nvSpPr>
-          <p:cNvPr id="5" name="Slide Number Placeholder 4">
-            <a:extLst>
-              <a:ext uri="{FF2B5EF4-FFF2-40B4-BE49-F238E27FC236}">
-                <a16:creationId xmlns:a16="http://schemas.microsoft.com/office/drawing/2014/main" id="{815BC9E2-FBCA-F741-2D12-6C6790158C85}"/>
-              </a:ext>
-            </a:extLst>
-          </p:cNvPr>
+          <p:cNvPr id="5" name="Slide Number Placeholder 4"/>
           <p:cNvSpPr>
             <a:spLocks noGrp="1"/>
           </p:cNvSpPr>
@@ -2014,7 +1788,7 @@
     </p:spTree>
     <p:extLst>
       <p:ext uri="{BB962C8B-B14F-4D97-AF65-F5344CB8AC3E}">
-        <p14:creationId xmlns:p14="http://schemas.microsoft.com/office/powerpoint/2010/main" val="2297616107"/>
+        <p14:creationId xmlns:p14="http://schemas.microsoft.com/office/powerpoint/2010/main" val="757645302"/>
       </p:ext>
     </p:extLst>
   </p:cSld>
@@ -2043,13 +1817,7 @@
       </p:grpSpPr>
       <p:sp>
         <p:nvSpPr>
-          <p:cNvPr id="2" name="Date Placeholder 1">
-            <a:extLst>
-              <a:ext uri="{FF2B5EF4-FFF2-40B4-BE49-F238E27FC236}">
-                <a16:creationId xmlns:a16="http://schemas.microsoft.com/office/drawing/2014/main" id="{F72D0580-9B9C-DDF7-ABC5-0E0B58069F7F}"/>
-              </a:ext>
-            </a:extLst>
-          </p:cNvPr>
+          <p:cNvPr id="2" name="Date Placeholder 1"/>
           <p:cNvSpPr>
             <a:spLocks noGrp="1"/>
           </p:cNvSpPr>
@@ -2064,7 +1832,7 @@
           <a:p>
             <a:fld id="{3A76C9ED-68B5-024C-9605-8F26FFAEC05E}" type="datetimeFigureOut">
               <a:rPr lang="en-US" smtClean="0"/>
-              <a:t>11/4/25</a:t>
+              <a:t>11/13/25</a:t>
             </a:fld>
             <a:endParaRPr lang="en-US"/>
           </a:p>
@@ -2072,13 +1840,7 @@
       </p:sp>
       <p:sp>
         <p:nvSpPr>
-          <p:cNvPr id="3" name="Footer Placeholder 2">
-            <a:extLst>
-              <a:ext uri="{FF2B5EF4-FFF2-40B4-BE49-F238E27FC236}">
-                <a16:creationId xmlns:a16="http://schemas.microsoft.com/office/drawing/2014/main" id="{68CFFAD8-E8FB-912B-38B8-EA7D37CEDF2D}"/>
-              </a:ext>
-            </a:extLst>
-          </p:cNvPr>
+          <p:cNvPr id="3" name="Footer Placeholder 2"/>
           <p:cNvSpPr>
             <a:spLocks noGrp="1"/>
           </p:cNvSpPr>
@@ -2097,13 +1859,7 @@
       </p:sp>
       <p:sp>
         <p:nvSpPr>
-          <p:cNvPr id="4" name="Slide Number Placeholder 3">
-            <a:extLst>
-              <a:ext uri="{FF2B5EF4-FFF2-40B4-BE49-F238E27FC236}">
-                <a16:creationId xmlns:a16="http://schemas.microsoft.com/office/drawing/2014/main" id="{DA1E4C88-AD39-0D09-0B63-BD5DEA742A41}"/>
-              </a:ext>
-            </a:extLst>
-          </p:cNvPr>
+          <p:cNvPr id="4" name="Slide Number Placeholder 3"/>
           <p:cNvSpPr>
             <a:spLocks noGrp="1"/>
           </p:cNvSpPr>
@@ -2127,7 +1883,7 @@
     </p:spTree>
     <p:extLst>
       <p:ext uri="{BB962C8B-B14F-4D97-AF65-F5344CB8AC3E}">
-        <p14:creationId xmlns:p14="http://schemas.microsoft.com/office/powerpoint/2010/main" val="2523482065"/>
+        <p14:creationId xmlns:p14="http://schemas.microsoft.com/office/powerpoint/2010/main" val="466960736"/>
       </p:ext>
     </p:extLst>
   </p:cSld>
@@ -2156,13 +1912,7 @@
       </p:grpSpPr>
       <p:sp>
         <p:nvSpPr>
-          <p:cNvPr id="2" name="Title 1">
-            <a:extLst>
-              <a:ext uri="{FF2B5EF4-FFF2-40B4-BE49-F238E27FC236}">
-                <a16:creationId xmlns:a16="http://schemas.microsoft.com/office/drawing/2014/main" id="{76635C54-EEC0-A4EA-53C2-377928AD4AE9}"/>
-              </a:ext>
-            </a:extLst>
-          </p:cNvPr>
+          <p:cNvPr id="2" name="Title 1"/>
           <p:cNvSpPr>
             <a:spLocks noGrp="1"/>
           </p:cNvSpPr>
@@ -2188,18 +1938,13 @@
               <a:rPr lang="en-US"/>
               <a:t>Click to edit Master title style</a:t>
             </a:r>
-          </a:p>
-        </p:txBody>
-      </p:sp>
-      <p:sp>
-        <p:nvSpPr>
-          <p:cNvPr id="3" name="Content Placeholder 2">
-            <a:extLst>
-              <a:ext uri="{FF2B5EF4-FFF2-40B4-BE49-F238E27FC236}">
-                <a16:creationId xmlns:a16="http://schemas.microsoft.com/office/drawing/2014/main" id="{658EC53E-5F9D-AD73-D6C1-2F8502F6DDB9}"/>
-              </a:ext>
-            </a:extLst>
-          </p:cNvPr>
+            <a:endParaRPr lang="en-US" dirty="0"/>
+          </a:p>
+        </p:txBody>
+      </p:sp>
+      <p:sp>
+        <p:nvSpPr>
+          <p:cNvPr id="3" name="Content Placeholder 2"/>
           <p:cNvSpPr>
             <a:spLocks noGrp="1"/>
           </p:cNvSpPr>
@@ -2278,18 +2023,13 @@
               <a:rPr lang="en-US"/>
               <a:t>Fifth level</a:t>
             </a:r>
-          </a:p>
-        </p:txBody>
-      </p:sp>
-      <p:sp>
-        <p:nvSpPr>
-          <p:cNvPr id="4" name="Text Placeholder 3">
-            <a:extLst>
-              <a:ext uri="{FF2B5EF4-FFF2-40B4-BE49-F238E27FC236}">
-                <a16:creationId xmlns:a16="http://schemas.microsoft.com/office/drawing/2014/main" id="{F727182D-2062-551B-6B32-DA3D4776D339}"/>
-              </a:ext>
-            </a:extLst>
-          </p:cNvPr>
+            <a:endParaRPr lang="en-US" dirty="0"/>
+          </a:p>
+        </p:txBody>
+      </p:sp>
+      <p:sp>
+        <p:nvSpPr>
+          <p:cNvPr id="4" name="Text Placeholder 3"/>
           <p:cNvSpPr>
             <a:spLocks noGrp="1"/>
           </p:cNvSpPr>
@@ -2354,13 +2094,7 @@
       </p:sp>
       <p:sp>
         <p:nvSpPr>
-          <p:cNvPr id="5" name="Date Placeholder 4">
-            <a:extLst>
-              <a:ext uri="{FF2B5EF4-FFF2-40B4-BE49-F238E27FC236}">
-                <a16:creationId xmlns:a16="http://schemas.microsoft.com/office/drawing/2014/main" id="{D8069B2B-9E3F-201F-B237-87A60A4EC06C}"/>
-              </a:ext>
-            </a:extLst>
-          </p:cNvPr>
+          <p:cNvPr id="5" name="Date Placeholder 4"/>
           <p:cNvSpPr>
             <a:spLocks noGrp="1"/>
           </p:cNvSpPr>
@@ -2375,7 +2109,7 @@
           <a:p>
             <a:fld id="{3A76C9ED-68B5-024C-9605-8F26FFAEC05E}" type="datetimeFigureOut">
               <a:rPr lang="en-US" smtClean="0"/>
-              <a:t>11/4/25</a:t>
+              <a:t>11/13/25</a:t>
             </a:fld>
             <a:endParaRPr lang="en-US"/>
           </a:p>
@@ -2383,13 +2117,7 @@
       </p:sp>
       <p:sp>
         <p:nvSpPr>
-          <p:cNvPr id="6" name="Footer Placeholder 5">
-            <a:extLst>
-              <a:ext uri="{FF2B5EF4-FFF2-40B4-BE49-F238E27FC236}">
-                <a16:creationId xmlns:a16="http://schemas.microsoft.com/office/drawing/2014/main" id="{D9E6F7C7-75AA-B1CC-B512-876B300B4790}"/>
-              </a:ext>
-            </a:extLst>
-          </p:cNvPr>
+          <p:cNvPr id="6" name="Footer Placeholder 5"/>
           <p:cNvSpPr>
             <a:spLocks noGrp="1"/>
           </p:cNvSpPr>
@@ -2408,13 +2136,7 @@
       </p:sp>
       <p:sp>
         <p:nvSpPr>
-          <p:cNvPr id="7" name="Slide Number Placeholder 6">
-            <a:extLst>
-              <a:ext uri="{FF2B5EF4-FFF2-40B4-BE49-F238E27FC236}">
-                <a16:creationId xmlns:a16="http://schemas.microsoft.com/office/drawing/2014/main" id="{FDD3EE90-3B4B-4D4C-A77E-C6DD87989AB2}"/>
-              </a:ext>
-            </a:extLst>
-          </p:cNvPr>
+          <p:cNvPr id="7" name="Slide Number Placeholder 6"/>
           <p:cNvSpPr>
             <a:spLocks noGrp="1"/>
           </p:cNvSpPr>
@@ -2438,7 +2160,7 @@
     </p:spTree>
     <p:extLst>
       <p:ext uri="{BB962C8B-B14F-4D97-AF65-F5344CB8AC3E}">
-        <p14:creationId xmlns:p14="http://schemas.microsoft.com/office/powerpoint/2010/main" val="222331733"/>
+        <p14:creationId xmlns:p14="http://schemas.microsoft.com/office/powerpoint/2010/main" val="3374728383"/>
       </p:ext>
     </p:extLst>
   </p:cSld>
@@ -2467,13 +2189,7 @@
       </p:grpSpPr>
       <p:sp>
         <p:nvSpPr>
-          <p:cNvPr id="2" name="Title 1">
-            <a:extLst>
-              <a:ext uri="{FF2B5EF4-FFF2-40B4-BE49-F238E27FC236}">
-                <a16:creationId xmlns:a16="http://schemas.microsoft.com/office/drawing/2014/main" id="{A1AB851F-B482-102C-6779-F0A5F37D01C2}"/>
-              </a:ext>
-            </a:extLst>
-          </p:cNvPr>
+          <p:cNvPr id="2" name="Title 1"/>
           <p:cNvSpPr>
             <a:spLocks noGrp="1"/>
           </p:cNvSpPr>
@@ -2499,20 +2215,15 @@
               <a:rPr lang="en-US"/>
               <a:t>Click to edit Master title style</a:t>
             </a:r>
-          </a:p>
-        </p:txBody>
-      </p:sp>
-      <p:sp>
-        <p:nvSpPr>
-          <p:cNvPr id="3" name="Picture Placeholder 2">
-            <a:extLst>
-              <a:ext uri="{FF2B5EF4-FFF2-40B4-BE49-F238E27FC236}">
-                <a16:creationId xmlns:a16="http://schemas.microsoft.com/office/drawing/2014/main" id="{B9520B2B-25AC-8A07-2835-E5B3EBF70BB1}"/>
-              </a:ext>
-            </a:extLst>
-          </p:cNvPr>
-          <p:cNvSpPr>
-            <a:spLocks noGrp="1"/>
+            <a:endParaRPr lang="en-US" dirty="0"/>
+          </a:p>
+        </p:txBody>
+      </p:sp>
+      <p:sp>
+        <p:nvSpPr>
+          <p:cNvPr id="3" name="Picture Placeholder 2"/>
+          <p:cNvSpPr>
+            <a:spLocks noGrp="1" noChangeAspect="1"/>
           </p:cNvSpPr>
           <p:nvPr>
             <p:ph type="pic" idx="1"/>
@@ -2525,7 +2236,7 @@
           </a:xfrm>
         </p:spPr>
         <p:txBody>
-          <a:bodyPr/>
+          <a:bodyPr anchor="t"/>
           <a:lstStyle>
             <a:lvl1pPr marL="0" indent="0">
               <a:buNone/>
@@ -2565,19 +2276,17 @@
             </a:lvl9pPr>
           </a:lstStyle>
           <a:p>
-            <a:endParaRPr lang="en-US"/>
-          </a:p>
-        </p:txBody>
-      </p:sp>
-      <p:sp>
-        <p:nvSpPr>
-          <p:cNvPr id="4" name="Text Placeholder 3">
-            <a:extLst>
-              <a:ext uri="{FF2B5EF4-FFF2-40B4-BE49-F238E27FC236}">
-                <a16:creationId xmlns:a16="http://schemas.microsoft.com/office/drawing/2014/main" id="{D21BFD78-D5DC-B20D-D880-CE1F3044625D}"/>
-              </a:ext>
-            </a:extLst>
-          </p:cNvPr>
+            <a:r>
+              <a:rPr lang="en-US"/>
+              <a:t>Click icon to add picture</a:t>
+            </a:r>
+            <a:endParaRPr lang="en-US" dirty="0"/>
+          </a:p>
+        </p:txBody>
+      </p:sp>
+      <p:sp>
+        <p:nvSpPr>
+          <p:cNvPr id="4" name="Text Placeholder 3"/>
           <p:cNvSpPr>
             <a:spLocks noGrp="1"/>
           </p:cNvSpPr>
@@ -2642,13 +2351,7 @@
       </p:sp>
       <p:sp>
         <p:nvSpPr>
-          <p:cNvPr id="5" name="Date Placeholder 4">
-            <a:extLst>
-              <a:ext uri="{FF2B5EF4-FFF2-40B4-BE49-F238E27FC236}">
-                <a16:creationId xmlns:a16="http://schemas.microsoft.com/office/drawing/2014/main" id="{8FC3701B-7C5F-398C-0FCD-D0B67B215084}"/>
-              </a:ext>
-            </a:extLst>
-          </p:cNvPr>
+          <p:cNvPr id="5" name="Date Placeholder 4"/>
           <p:cNvSpPr>
             <a:spLocks noGrp="1"/>
           </p:cNvSpPr>
@@ -2663,7 +2366,7 @@
           <a:p>
             <a:fld id="{3A76C9ED-68B5-024C-9605-8F26FFAEC05E}" type="datetimeFigureOut">
               <a:rPr lang="en-US" smtClean="0"/>
-              <a:t>11/4/25</a:t>
+              <a:t>11/13/25</a:t>
             </a:fld>
             <a:endParaRPr lang="en-US"/>
           </a:p>
@@ -2671,13 +2374,7 @@
       </p:sp>
       <p:sp>
         <p:nvSpPr>
-          <p:cNvPr id="6" name="Footer Placeholder 5">
-            <a:extLst>
-              <a:ext uri="{FF2B5EF4-FFF2-40B4-BE49-F238E27FC236}">
-                <a16:creationId xmlns:a16="http://schemas.microsoft.com/office/drawing/2014/main" id="{15E550B2-D5E4-E60A-BE40-9E69918008F2}"/>
-              </a:ext>
-            </a:extLst>
-          </p:cNvPr>
+          <p:cNvPr id="6" name="Footer Placeholder 5"/>
           <p:cNvSpPr>
             <a:spLocks noGrp="1"/>
           </p:cNvSpPr>
@@ -2696,13 +2393,7 @@
       </p:sp>
       <p:sp>
         <p:nvSpPr>
-          <p:cNvPr id="7" name="Slide Number Placeholder 6">
-            <a:extLst>
-              <a:ext uri="{FF2B5EF4-FFF2-40B4-BE49-F238E27FC236}">
-                <a16:creationId xmlns:a16="http://schemas.microsoft.com/office/drawing/2014/main" id="{CB2D0E43-36BD-A86D-7385-C39E647744F0}"/>
-              </a:ext>
-            </a:extLst>
-          </p:cNvPr>
+          <p:cNvPr id="7" name="Slide Number Placeholder 6"/>
           <p:cNvSpPr>
             <a:spLocks noGrp="1"/>
           </p:cNvSpPr>
@@ -2726,7 +2417,7 @@
     </p:spTree>
     <p:extLst>
       <p:ext uri="{BB962C8B-B14F-4D97-AF65-F5344CB8AC3E}">
-        <p14:creationId xmlns:p14="http://schemas.microsoft.com/office/powerpoint/2010/main" val="2634299144"/>
+        <p14:creationId xmlns:p14="http://schemas.microsoft.com/office/powerpoint/2010/main" val="3531495665"/>
       </p:ext>
     </p:extLst>
   </p:cSld>
@@ -2760,13 +2451,7 @@
       </p:grpSpPr>
       <p:sp>
         <p:nvSpPr>
-          <p:cNvPr id="2" name="Title Placeholder 1">
-            <a:extLst>
-              <a:ext uri="{FF2B5EF4-FFF2-40B4-BE49-F238E27FC236}">
-                <a16:creationId xmlns:a16="http://schemas.microsoft.com/office/drawing/2014/main" id="{53D8638F-7923-99EC-4D75-AD92465E3292}"/>
-              </a:ext>
-            </a:extLst>
-          </p:cNvPr>
+          <p:cNvPr id="2" name="Title Placeholder 1"/>
           <p:cNvSpPr>
             <a:spLocks noGrp="1"/>
           </p:cNvSpPr>
@@ -2793,18 +2478,13 @@
               <a:rPr lang="en-US"/>
               <a:t>Click to edit Master title style</a:t>
             </a:r>
-          </a:p>
-        </p:txBody>
-      </p:sp>
-      <p:sp>
-        <p:nvSpPr>
-          <p:cNvPr id="3" name="Text Placeholder 2">
-            <a:extLst>
-              <a:ext uri="{FF2B5EF4-FFF2-40B4-BE49-F238E27FC236}">
-                <a16:creationId xmlns:a16="http://schemas.microsoft.com/office/drawing/2014/main" id="{E1EB9826-1BD3-C5BC-812C-43D752733F30}"/>
-              </a:ext>
-            </a:extLst>
-          </p:cNvPr>
+            <a:endParaRPr lang="en-US" dirty="0"/>
+          </a:p>
+        </p:txBody>
+      </p:sp>
+      <p:sp>
+        <p:nvSpPr>
+          <p:cNvPr id="3" name="Text Placeholder 2"/>
           <p:cNvSpPr>
             <a:spLocks noGrp="1"/>
           </p:cNvSpPr>
@@ -2860,18 +2540,13 @@
               <a:rPr lang="en-US"/>
               <a:t>Fifth level</a:t>
             </a:r>
-          </a:p>
-        </p:txBody>
-      </p:sp>
-      <p:sp>
-        <p:nvSpPr>
-          <p:cNvPr id="4" name="Date Placeholder 3">
-            <a:extLst>
-              <a:ext uri="{FF2B5EF4-FFF2-40B4-BE49-F238E27FC236}">
-                <a16:creationId xmlns:a16="http://schemas.microsoft.com/office/drawing/2014/main" id="{CDC82B20-C581-C390-9A11-D15EBCD46405}"/>
-              </a:ext>
-            </a:extLst>
-          </p:cNvPr>
+            <a:endParaRPr lang="en-US" dirty="0"/>
+          </a:p>
+        </p:txBody>
+      </p:sp>
+      <p:sp>
+        <p:nvSpPr>
+          <p:cNvPr id="4" name="Date Placeholder 3"/>
           <p:cNvSpPr>
             <a:spLocks noGrp="1"/>
           </p:cNvSpPr>
@@ -2895,7 +2570,7 @@
               <a:defRPr sz="1200">
                 <a:solidFill>
                   <a:schemeClr val="tx1">
-                    <a:tint val="82000"/>
+                    <a:tint val="75000"/>
                   </a:schemeClr>
                 </a:solidFill>
               </a:defRPr>
@@ -2904,7 +2579,7 @@
           <a:p>
             <a:fld id="{3A76C9ED-68B5-024C-9605-8F26FFAEC05E}" type="datetimeFigureOut">
               <a:rPr lang="en-US" smtClean="0"/>
-              <a:t>11/4/25</a:t>
+              <a:t>11/13/25</a:t>
             </a:fld>
             <a:endParaRPr lang="en-US"/>
           </a:p>
@@ -2912,13 +2587,7 @@
       </p:sp>
       <p:sp>
         <p:nvSpPr>
-          <p:cNvPr id="5" name="Footer Placeholder 4">
-            <a:extLst>
-              <a:ext uri="{FF2B5EF4-FFF2-40B4-BE49-F238E27FC236}">
-                <a16:creationId xmlns:a16="http://schemas.microsoft.com/office/drawing/2014/main" id="{AE6A5279-7BF8-69F3-89A2-38A849E82CD0}"/>
-              </a:ext>
-            </a:extLst>
-          </p:cNvPr>
+          <p:cNvPr id="5" name="Footer Placeholder 4"/>
           <p:cNvSpPr>
             <a:spLocks noGrp="1"/>
           </p:cNvSpPr>
@@ -2942,7 +2611,7 @@
               <a:defRPr sz="1200">
                 <a:solidFill>
                   <a:schemeClr val="tx1">
-                    <a:tint val="82000"/>
+                    <a:tint val="75000"/>
                   </a:schemeClr>
                 </a:solidFill>
               </a:defRPr>
@@ -2955,13 +2624,7 @@
       </p:sp>
       <p:sp>
         <p:nvSpPr>
-          <p:cNvPr id="6" name="Slide Number Placeholder 5">
-            <a:extLst>
-              <a:ext uri="{FF2B5EF4-FFF2-40B4-BE49-F238E27FC236}">
-                <a16:creationId xmlns:a16="http://schemas.microsoft.com/office/drawing/2014/main" id="{D147B612-AE32-ADA5-597C-563383E6B59B}"/>
-              </a:ext>
-            </a:extLst>
-          </p:cNvPr>
+          <p:cNvPr id="6" name="Slide Number Placeholder 5"/>
           <p:cNvSpPr>
             <a:spLocks noGrp="1"/>
           </p:cNvSpPr>
@@ -2985,7 +2648,7 @@
               <a:defRPr sz="1200">
                 <a:solidFill>
                   <a:schemeClr val="tx1">
-                    <a:tint val="82000"/>
+                    <a:tint val="75000"/>
                   </a:schemeClr>
                 </a:solidFill>
               </a:defRPr>
@@ -3003,23 +2666,23 @@
     </p:spTree>
     <p:extLst>
       <p:ext uri="{BB962C8B-B14F-4D97-AF65-F5344CB8AC3E}">
-        <p14:creationId xmlns:p14="http://schemas.microsoft.com/office/powerpoint/2010/main" val="3698845942"/>
+        <p14:creationId xmlns:p14="http://schemas.microsoft.com/office/powerpoint/2010/main" val="2524859858"/>
       </p:ext>
     </p:extLst>
   </p:cSld>
   <p:clrMap bg1="lt1" tx1="dk1" bg2="lt2" tx2="dk2" accent1="accent1" accent2="accent2" accent3="accent3" accent4="accent4" accent5="accent5" accent6="accent6" hlink="hlink" folHlink="folHlink"/>
   <p:sldLayoutIdLst>
-    <p:sldLayoutId id="2147483649" r:id="rId1"/>
-    <p:sldLayoutId id="2147483650" r:id="rId2"/>
-    <p:sldLayoutId id="2147483651" r:id="rId3"/>
-    <p:sldLayoutId id="2147483652" r:id="rId4"/>
-    <p:sldLayoutId id="2147483653" r:id="rId5"/>
-    <p:sldLayoutId id="2147483654" r:id="rId6"/>
-    <p:sldLayoutId id="2147483655" r:id="rId7"/>
-    <p:sldLayoutId id="2147483656" r:id="rId8"/>
-    <p:sldLayoutId id="2147483657" r:id="rId9"/>
-    <p:sldLayoutId id="2147483658" r:id="rId10"/>
-    <p:sldLayoutId id="2147483659" r:id="rId11"/>
+    <p:sldLayoutId id="2147483685" r:id="rId1"/>
+    <p:sldLayoutId id="2147483686" r:id="rId2"/>
+    <p:sldLayoutId id="2147483687" r:id="rId3"/>
+    <p:sldLayoutId id="2147483688" r:id="rId4"/>
+    <p:sldLayoutId id="2147483689" r:id="rId5"/>
+    <p:sldLayoutId id="2147483690" r:id="rId6"/>
+    <p:sldLayoutId id="2147483691" r:id="rId7"/>
+    <p:sldLayoutId id="2147483692" r:id="rId8"/>
+    <p:sldLayoutId id="2147483693" r:id="rId9"/>
+    <p:sldLayoutId id="2147483694" r:id="rId10"/>
+    <p:sldLayoutId id="2147483695" r:id="rId11"/>
   </p:sldLayoutIdLst>
   <p:txStyles>
     <p:titleStyle>
@@ -3342,7 +3005,13 @@
           <a:bodyPr/>
           <a:lstStyle/>
           <a:p>
-            <a:endParaRPr lang="en-US"/>
+            <a:r>
+              <a:rPr lang="en-US" dirty="0">
+                <a:latin typeface="Times New Roman" panose="02020603050405020304" pitchFamily="18" charset="0"/>
+                <a:cs typeface="Times New Roman" panose="02020603050405020304" pitchFamily="18" charset="0"/>
+              </a:rPr>
+              <a:t>Predicting Star Types</a:t>
+            </a:r>
           </a:p>
         </p:txBody>
       </p:sp>
@@ -3367,7 +3036,18 @@
           <a:bodyPr/>
           <a:lstStyle/>
           <a:p>
-            <a:endParaRPr lang="en-US"/>
+            <a:r>
+              <a:rPr lang="en-US" dirty="0"/>
+              <a:t>By: Aiden Hammond, Sneha </a:t>
+            </a:r>
+            <a:r>
+              <a:rPr lang="en-US" dirty="0" err="1"/>
+              <a:t>Kummarapurugu</a:t>
+            </a:r>
+            <a:r>
+              <a:rPr lang="en-US" dirty="0"/>
+              <a:t>, Juan Hernandez</a:t>
+            </a:r>
           </a:p>
         </p:txBody>
       </p:sp>
@@ -3384,10 +3064,1589 @@
 </p:sld>
 </file>
 
+<file path=ppt/slides/slide10.xml><?xml version="1.0" encoding="utf-8"?>
+<p:sld xmlns:a="http://schemas.openxmlformats.org/drawingml/2006/main" xmlns:r="http://schemas.openxmlformats.org/officeDocument/2006/relationships" xmlns:p="http://schemas.openxmlformats.org/presentationml/2006/main">
+  <p:cSld>
+    <p:spTree>
+      <p:nvGrpSpPr>
+        <p:cNvPr id="1" name=""/>
+        <p:cNvGrpSpPr/>
+        <p:nvPr/>
+      </p:nvGrpSpPr>
+      <p:grpSpPr>
+        <a:xfrm>
+          <a:off x="0" y="0"/>
+          <a:ext cx="0" cy="0"/>
+          <a:chOff x="0" y="0"/>
+          <a:chExt cx="0" cy="0"/>
+        </a:xfrm>
+      </p:grpSpPr>
+      <p:pic>
+        <p:nvPicPr>
+          <p:cNvPr id="3" name="Picture 2" descr="A graph with blue and orange lines&#10;&#10;AI-generated content may be incorrect.">
+            <a:extLst>
+              <a:ext uri="{FF2B5EF4-FFF2-40B4-BE49-F238E27FC236}">
+                <a16:creationId xmlns:a16="http://schemas.microsoft.com/office/drawing/2014/main" id="{4FBB33D3-EEA2-A3B9-64C6-F2F5942C4AC0}"/>
+              </a:ext>
+            </a:extLst>
+          </p:cNvPr>
+          <p:cNvPicPr>
+            <a:picLocks noChangeAspect="1"/>
+          </p:cNvPicPr>
+          <p:nvPr/>
+        </p:nvPicPr>
+        <p:blipFill>
+          <a:blip r:embed="rId2"/>
+          <a:stretch>
+            <a:fillRect/>
+          </a:stretch>
+        </p:blipFill>
+        <p:spPr>
+          <a:xfrm>
+            <a:off x="1119584" y="220521"/>
+            <a:ext cx="9952831" cy="6416957"/>
+          </a:xfrm>
+          <a:prstGeom prst="rect">
+            <a:avLst/>
+          </a:prstGeom>
+          <a:ln w="38100">
+            <a:solidFill>
+              <a:schemeClr val="tx1"/>
+            </a:solidFill>
+          </a:ln>
+        </p:spPr>
+      </p:pic>
+    </p:spTree>
+    <p:extLst>
+      <p:ext uri="{BB962C8B-B14F-4D97-AF65-F5344CB8AC3E}">
+        <p14:creationId xmlns:p14="http://schemas.microsoft.com/office/powerpoint/2010/main" val="2689361968"/>
+      </p:ext>
+    </p:extLst>
+  </p:cSld>
+  <p:clrMapOvr>
+    <a:masterClrMapping/>
+  </p:clrMapOvr>
+</p:sld>
+</file>
+
+<file path=ppt/slides/slide11.xml><?xml version="1.0" encoding="utf-8"?>
+<p:sld xmlns:a="http://schemas.openxmlformats.org/drawingml/2006/main" xmlns:r="http://schemas.openxmlformats.org/officeDocument/2006/relationships" xmlns:p="http://schemas.openxmlformats.org/presentationml/2006/main">
+  <p:cSld>
+    <p:bg>
+      <p:bgPr>
+        <a:solidFill>
+          <a:schemeClr val="accent2">
+            <a:lumMod val="50000"/>
+          </a:schemeClr>
+        </a:solidFill>
+        <a:effectLst/>
+      </p:bgPr>
+    </p:bg>
+    <p:spTree>
+      <p:nvGrpSpPr>
+        <p:cNvPr id="1" name=""/>
+        <p:cNvGrpSpPr/>
+        <p:nvPr/>
+      </p:nvGrpSpPr>
+      <p:grpSpPr>
+        <a:xfrm>
+          <a:off x="0" y="0"/>
+          <a:ext cx="0" cy="0"/>
+          <a:chOff x="0" y="0"/>
+          <a:chExt cx="0" cy="0"/>
+        </a:xfrm>
+      </p:grpSpPr>
+      <p:sp useBgFill="1">
+        <p:nvSpPr>
+          <p:cNvPr id="10" name="Rectangle 9">
+            <a:extLst>
+              <a:ext uri="{FF2B5EF4-FFF2-40B4-BE49-F238E27FC236}">
+                <a16:creationId xmlns:a16="http://schemas.microsoft.com/office/drawing/2014/main" id="{11BE3FA7-0D70-4431-814F-D8C40576EA93}"/>
+              </a:ext>
+              <a:ext uri="{C183D7F6-B498-43B3-948B-1728B52AA6E4}">
+                <adec:decorative xmlns:adec="http://schemas.microsoft.com/office/drawing/2017/decorative" val="1"/>
+              </a:ext>
+            </a:extLst>
+          </p:cNvPr>
+          <p:cNvSpPr>
+            <a:spLocks noGrp="1" noRot="1" noChangeAspect="1" noMove="1" noResize="1" noEditPoints="1" noAdjustHandles="1" noChangeArrowheads="1" noChangeShapeType="1" noTextEdit="1"/>
+          </p:cNvSpPr>
+          <p:nvPr>
+            <p:extLst>
+              <p:ext uri="{386F3935-93C4-4BCD-93E2-E3B085C9AB24}">
+                <p16:designElem xmlns:p16="http://schemas.microsoft.com/office/powerpoint/2015/main" val="1"/>
+              </p:ext>
+            </p:extLst>
+          </p:nvPr>
+        </p:nvSpPr>
+        <p:spPr bwMode="white">
+          <a:xfrm>
+            <a:off x="1524" y="0"/>
+            <a:ext cx="12188952" cy="6858000"/>
+          </a:xfrm>
+          <a:prstGeom prst="rect">
+            <a:avLst/>
+          </a:prstGeom>
+          <a:ln>
+            <a:noFill/>
+          </a:ln>
+        </p:spPr>
+        <p:style>
+          <a:lnRef idx="2">
+            <a:schemeClr val="accent1">
+              <a:shade val="50000"/>
+            </a:schemeClr>
+          </a:lnRef>
+          <a:fillRef idx="1">
+            <a:schemeClr val="accent1"/>
+          </a:fillRef>
+          <a:effectRef idx="0">
+            <a:schemeClr val="accent1"/>
+          </a:effectRef>
+          <a:fontRef idx="minor">
+            <a:schemeClr val="lt1"/>
+          </a:fontRef>
+        </p:style>
+        <p:txBody>
+          <a:bodyPr rtlCol="0" anchor="ctr"/>
+          <a:lstStyle>
+            <a:defPPr>
+              <a:defRPr lang="en-US"/>
+            </a:defPPr>
+            <a:lvl1pPr marL="0" algn="l" defTabSz="914400" rtl="0" eaLnBrk="1" latinLnBrk="0" hangingPunct="1">
+              <a:defRPr sz="1800" kern="1200">
+                <a:solidFill>
+                  <a:schemeClr val="lt1"/>
+                </a:solidFill>
+                <a:latin typeface="+mn-lt"/>
+                <a:ea typeface="+mn-ea"/>
+                <a:cs typeface="+mn-cs"/>
+              </a:defRPr>
+            </a:lvl1pPr>
+            <a:lvl2pPr marL="457200" algn="l" defTabSz="914400" rtl="0" eaLnBrk="1" latinLnBrk="0" hangingPunct="1">
+              <a:defRPr sz="1800" kern="1200">
+                <a:solidFill>
+                  <a:schemeClr val="lt1"/>
+                </a:solidFill>
+                <a:latin typeface="+mn-lt"/>
+                <a:ea typeface="+mn-ea"/>
+                <a:cs typeface="+mn-cs"/>
+              </a:defRPr>
+            </a:lvl2pPr>
+            <a:lvl3pPr marL="914400" algn="l" defTabSz="914400" rtl="0" eaLnBrk="1" latinLnBrk="0" hangingPunct="1">
+              <a:defRPr sz="1800" kern="1200">
+                <a:solidFill>
+                  <a:schemeClr val="lt1"/>
+                </a:solidFill>
+                <a:latin typeface="+mn-lt"/>
+                <a:ea typeface="+mn-ea"/>
+                <a:cs typeface="+mn-cs"/>
+              </a:defRPr>
+            </a:lvl3pPr>
+            <a:lvl4pPr marL="1371600" algn="l" defTabSz="914400" rtl="0" eaLnBrk="1" latinLnBrk="0" hangingPunct="1">
+              <a:defRPr sz="1800" kern="1200">
+                <a:solidFill>
+                  <a:schemeClr val="lt1"/>
+                </a:solidFill>
+                <a:latin typeface="+mn-lt"/>
+                <a:ea typeface="+mn-ea"/>
+                <a:cs typeface="+mn-cs"/>
+              </a:defRPr>
+            </a:lvl4pPr>
+            <a:lvl5pPr marL="1828800" algn="l" defTabSz="914400" rtl="0" eaLnBrk="1" latinLnBrk="0" hangingPunct="1">
+              <a:defRPr sz="1800" kern="1200">
+                <a:solidFill>
+                  <a:schemeClr val="lt1"/>
+                </a:solidFill>
+                <a:latin typeface="+mn-lt"/>
+                <a:ea typeface="+mn-ea"/>
+                <a:cs typeface="+mn-cs"/>
+              </a:defRPr>
+            </a:lvl5pPr>
+            <a:lvl6pPr marL="2286000" algn="l" defTabSz="914400" rtl="0" eaLnBrk="1" latinLnBrk="0" hangingPunct="1">
+              <a:defRPr sz="1800" kern="1200">
+                <a:solidFill>
+                  <a:schemeClr val="lt1"/>
+                </a:solidFill>
+                <a:latin typeface="+mn-lt"/>
+                <a:ea typeface="+mn-ea"/>
+                <a:cs typeface="+mn-cs"/>
+              </a:defRPr>
+            </a:lvl6pPr>
+            <a:lvl7pPr marL="2743200" algn="l" defTabSz="914400" rtl="0" eaLnBrk="1" latinLnBrk="0" hangingPunct="1">
+              <a:defRPr sz="1800" kern="1200">
+                <a:solidFill>
+                  <a:schemeClr val="lt1"/>
+                </a:solidFill>
+                <a:latin typeface="+mn-lt"/>
+                <a:ea typeface="+mn-ea"/>
+                <a:cs typeface="+mn-cs"/>
+              </a:defRPr>
+            </a:lvl7pPr>
+            <a:lvl8pPr marL="3200400" algn="l" defTabSz="914400" rtl="0" eaLnBrk="1" latinLnBrk="0" hangingPunct="1">
+              <a:defRPr sz="1800" kern="1200">
+                <a:solidFill>
+                  <a:schemeClr val="lt1"/>
+                </a:solidFill>
+                <a:latin typeface="+mn-lt"/>
+                <a:ea typeface="+mn-ea"/>
+                <a:cs typeface="+mn-cs"/>
+              </a:defRPr>
+            </a:lvl8pPr>
+            <a:lvl9pPr marL="3657600" algn="l" defTabSz="914400" rtl="0" eaLnBrk="1" latinLnBrk="0" hangingPunct="1">
+              <a:defRPr sz="1800" kern="1200">
+                <a:solidFill>
+                  <a:schemeClr val="lt1"/>
+                </a:solidFill>
+                <a:latin typeface="+mn-lt"/>
+                <a:ea typeface="+mn-ea"/>
+                <a:cs typeface="+mn-cs"/>
+              </a:defRPr>
+            </a:lvl9pPr>
+          </a:lstStyle>
+          <a:p>
+            <a:pPr algn="ctr"/>
+            <a:endParaRPr lang="en-US"/>
+          </a:p>
+        </p:txBody>
+      </p:sp>
+      <p:pic>
+        <p:nvPicPr>
+          <p:cNvPr id="5" name="Picture 4" descr="A blue and white graph&#10;&#10;AI-generated content may be incorrect.">
+            <a:extLst>
+              <a:ext uri="{FF2B5EF4-FFF2-40B4-BE49-F238E27FC236}">
+                <a16:creationId xmlns:a16="http://schemas.microsoft.com/office/drawing/2014/main" id="{FFAF5CC4-22E4-93FF-04BE-FCFA432574C4}"/>
+              </a:ext>
+            </a:extLst>
+          </p:cNvPr>
+          <p:cNvPicPr>
+            <a:picLocks noChangeAspect="1"/>
+          </p:cNvPicPr>
+          <p:nvPr/>
+        </p:nvPicPr>
+        <p:blipFill>
+          <a:blip r:embed="rId2"/>
+          <a:srcRect l="19201" t="5223" r="14921" b="1"/>
+          <a:stretch>
+            <a:fillRect/>
+          </a:stretch>
+        </p:blipFill>
+        <p:spPr>
+          <a:xfrm>
+            <a:off x="321732" y="857250"/>
+            <a:ext cx="5668684" cy="5443557"/>
+          </a:xfrm>
+          <a:prstGeom prst="rect">
+            <a:avLst/>
+          </a:prstGeom>
+        </p:spPr>
+      </p:pic>
+      <p:pic>
+        <p:nvPicPr>
+          <p:cNvPr id="3" name="Picture 2" descr="A blue and white graph&#10;&#10;AI-generated content may be incorrect.">
+            <a:extLst>
+              <a:ext uri="{FF2B5EF4-FFF2-40B4-BE49-F238E27FC236}">
+                <a16:creationId xmlns:a16="http://schemas.microsoft.com/office/drawing/2014/main" id="{90A02793-AD4A-1FFC-67DF-0439B9976A90}"/>
+              </a:ext>
+            </a:extLst>
+          </p:cNvPr>
+          <p:cNvPicPr>
+            <a:picLocks noChangeAspect="1"/>
+          </p:cNvPicPr>
+          <p:nvPr/>
+        </p:nvPicPr>
+        <p:blipFill>
+          <a:blip r:embed="rId3"/>
+          <a:srcRect l="19090" t="5224" r="14960" b="1"/>
+          <a:stretch>
+            <a:fillRect/>
+          </a:stretch>
+        </p:blipFill>
+        <p:spPr>
+          <a:xfrm>
+            <a:off x="6195375" y="857249"/>
+            <a:ext cx="5674893" cy="5443557"/>
+          </a:xfrm>
+          <a:prstGeom prst="rect">
+            <a:avLst/>
+          </a:prstGeom>
+        </p:spPr>
+      </p:pic>
+    </p:spTree>
+    <p:extLst>
+      <p:ext uri="{BB962C8B-B14F-4D97-AF65-F5344CB8AC3E}">
+        <p14:creationId xmlns:p14="http://schemas.microsoft.com/office/powerpoint/2010/main" val="1523166997"/>
+      </p:ext>
+    </p:extLst>
+  </p:cSld>
+  <p:clrMapOvr>
+    <a:masterClrMapping/>
+  </p:clrMapOvr>
+</p:sld>
+</file>
+
+<file path=ppt/slides/slide12.xml><?xml version="1.0" encoding="utf-8"?>
+<p:sld xmlns:a="http://schemas.openxmlformats.org/drawingml/2006/main" xmlns:r="http://schemas.openxmlformats.org/officeDocument/2006/relationships" xmlns:p="http://schemas.openxmlformats.org/presentationml/2006/main">
+  <p:cSld>
+    <p:spTree>
+      <p:nvGrpSpPr>
+        <p:cNvPr id="1" name="">
+          <a:extLst>
+            <a:ext uri="{FF2B5EF4-FFF2-40B4-BE49-F238E27FC236}">
+              <a16:creationId xmlns:a16="http://schemas.microsoft.com/office/drawing/2014/main" id="{FF47A1A8-4A85-F450-47DC-087C273E23A3}"/>
+            </a:ext>
+          </a:extLst>
+        </p:cNvPr>
+        <p:cNvGrpSpPr/>
+        <p:nvPr/>
+      </p:nvGrpSpPr>
+      <p:grpSpPr>
+        <a:xfrm>
+          <a:off x="0" y="0"/>
+          <a:ext cx="0" cy="0"/>
+          <a:chOff x="0" y="0"/>
+          <a:chExt cx="0" cy="0"/>
+        </a:xfrm>
+      </p:grpSpPr>
+      <p:sp>
+        <p:nvSpPr>
+          <p:cNvPr id="2" name="Title 1">
+            <a:extLst>
+              <a:ext uri="{FF2B5EF4-FFF2-40B4-BE49-F238E27FC236}">
+                <a16:creationId xmlns:a16="http://schemas.microsoft.com/office/drawing/2014/main" id="{1BA65267-615A-BED3-41ED-79D3285D1ED2}"/>
+              </a:ext>
+            </a:extLst>
+          </p:cNvPr>
+          <p:cNvSpPr>
+            <a:spLocks noGrp="1"/>
+          </p:cNvSpPr>
+          <p:nvPr>
+            <p:ph type="title"/>
+          </p:nvPr>
+        </p:nvSpPr>
+        <p:spPr/>
+        <p:txBody>
+          <a:bodyPr/>
+          <a:lstStyle/>
+          <a:p>
+            <a:r>
+              <a:rPr lang="en-US" dirty="0"/>
+              <a:t>Predicting Star Types using the OPTICS model</a:t>
+            </a:r>
+          </a:p>
+        </p:txBody>
+      </p:sp>
+      <p:sp>
+        <p:nvSpPr>
+          <p:cNvPr id="3" name="Text Placeholder 2">
+            <a:extLst>
+              <a:ext uri="{FF2B5EF4-FFF2-40B4-BE49-F238E27FC236}">
+                <a16:creationId xmlns:a16="http://schemas.microsoft.com/office/drawing/2014/main" id="{0EAA43CF-7749-93AA-0369-FF98FCA8F8F1}"/>
+              </a:ext>
+            </a:extLst>
+          </p:cNvPr>
+          <p:cNvSpPr>
+            <a:spLocks noGrp="1"/>
+          </p:cNvSpPr>
+          <p:nvPr>
+            <p:ph type="body" idx="1"/>
+          </p:nvPr>
+        </p:nvSpPr>
+        <p:spPr/>
+        <p:txBody>
+          <a:bodyPr/>
+          <a:lstStyle/>
+          <a:p>
+            <a:endParaRPr lang="en-US"/>
+          </a:p>
+        </p:txBody>
+      </p:sp>
+    </p:spTree>
+    <p:extLst>
+      <p:ext uri="{BB962C8B-B14F-4D97-AF65-F5344CB8AC3E}">
+        <p14:creationId xmlns:p14="http://schemas.microsoft.com/office/powerpoint/2010/main" val="1897258499"/>
+      </p:ext>
+    </p:extLst>
+  </p:cSld>
+  <p:clrMapOvr>
+    <a:masterClrMapping/>
+  </p:clrMapOvr>
+</p:sld>
+</file>
+
+<file path=ppt/slides/slide2.xml><?xml version="1.0" encoding="utf-8"?>
+<p:sld xmlns:a="http://schemas.openxmlformats.org/drawingml/2006/main" xmlns:r="http://schemas.openxmlformats.org/officeDocument/2006/relationships" xmlns:p="http://schemas.openxmlformats.org/presentationml/2006/main">
+  <p:cSld>
+    <p:spTree>
+      <p:nvGrpSpPr>
+        <p:cNvPr id="1" name=""/>
+        <p:cNvGrpSpPr/>
+        <p:nvPr/>
+      </p:nvGrpSpPr>
+      <p:grpSpPr>
+        <a:xfrm>
+          <a:off x="0" y="0"/>
+          <a:ext cx="0" cy="0"/>
+          <a:chOff x="0" y="0"/>
+          <a:chExt cx="0" cy="0"/>
+        </a:xfrm>
+      </p:grpSpPr>
+      <p:sp>
+        <p:nvSpPr>
+          <p:cNvPr id="2" name="Title 1">
+            <a:extLst>
+              <a:ext uri="{FF2B5EF4-FFF2-40B4-BE49-F238E27FC236}">
+                <a16:creationId xmlns:a16="http://schemas.microsoft.com/office/drawing/2014/main" id="{CAAAD677-4782-7492-D832-AF5E12188420}"/>
+              </a:ext>
+            </a:extLst>
+          </p:cNvPr>
+          <p:cNvSpPr>
+            <a:spLocks noGrp="1"/>
+          </p:cNvSpPr>
+          <p:nvPr>
+            <p:ph type="title"/>
+          </p:nvPr>
+        </p:nvSpPr>
+        <p:spPr>
+          <a:xfrm>
+            <a:off x="337863" y="430924"/>
+            <a:ext cx="11517805" cy="860151"/>
+          </a:xfrm>
+          <a:noFill/>
+        </p:spPr>
+        <p:txBody>
+          <a:bodyPr>
+            <a:normAutofit fontScale="90000"/>
+          </a:bodyPr>
+          <a:lstStyle/>
+          <a:p>
+            <a:r>
+              <a:rPr lang="en-US" b="1" u="sng" dirty="0"/>
+              <a:t>Our Objective</a:t>
+            </a:r>
+          </a:p>
+        </p:txBody>
+      </p:sp>
+      <p:sp>
+        <p:nvSpPr>
+          <p:cNvPr id="3" name="Text Placeholder 2">
+            <a:extLst>
+              <a:ext uri="{FF2B5EF4-FFF2-40B4-BE49-F238E27FC236}">
+                <a16:creationId xmlns:a16="http://schemas.microsoft.com/office/drawing/2014/main" id="{50BF81E1-9E29-5FF7-132A-D8EA52751A73}"/>
+              </a:ext>
+            </a:extLst>
+          </p:cNvPr>
+          <p:cNvSpPr>
+            <a:spLocks noGrp="1"/>
+          </p:cNvSpPr>
+          <p:nvPr>
+            <p:ph type="body" idx="1"/>
+          </p:nvPr>
+        </p:nvSpPr>
+        <p:spPr>
+          <a:xfrm>
+            <a:off x="831850" y="1545021"/>
+            <a:ext cx="10515600" cy="4487917"/>
+          </a:xfrm>
+        </p:spPr>
+        <p:txBody>
+          <a:bodyPr anchor="ctr"/>
+          <a:lstStyle/>
+          <a:p>
+            <a:pPr algn="just"/>
+            <a:r>
+              <a:rPr lang="en-US" sz="3600" dirty="0"/>
+              <a:t>The goal of this project is to use the key stellar features to build and evaluate classification models that predict a star's type into one of the target labels. The target labels for prediction are: Red Dwarf, Brown Dwarf, White Dwarf, Main Sequence, </a:t>
+            </a:r>
+            <a:r>
+              <a:rPr lang="en-US" sz="3600" dirty="0" err="1"/>
+              <a:t>Supergiants</a:t>
+            </a:r>
+            <a:r>
+              <a:rPr lang="en-US" sz="3600" dirty="0"/>
+              <a:t>, and Hypergiants.</a:t>
+            </a:r>
+          </a:p>
+          <a:p>
+            <a:br>
+              <a:rPr lang="en-US" dirty="0"/>
+            </a:br>
+            <a:endParaRPr lang="en-US" dirty="0"/>
+          </a:p>
+        </p:txBody>
+      </p:sp>
+    </p:spTree>
+    <p:extLst>
+      <p:ext uri="{BB962C8B-B14F-4D97-AF65-F5344CB8AC3E}">
+        <p14:creationId xmlns:p14="http://schemas.microsoft.com/office/powerpoint/2010/main" val="1614252893"/>
+      </p:ext>
+    </p:extLst>
+  </p:cSld>
+  <p:clrMapOvr>
+    <a:masterClrMapping/>
+  </p:clrMapOvr>
+</p:sld>
+</file>
+
+<file path=ppt/slides/slide3.xml><?xml version="1.0" encoding="utf-8"?>
+<p:sld xmlns:a="http://schemas.openxmlformats.org/drawingml/2006/main" xmlns:r="http://schemas.openxmlformats.org/officeDocument/2006/relationships" xmlns:p="http://schemas.openxmlformats.org/presentationml/2006/main">
+  <p:cSld>
+    <p:spTree>
+      <p:nvGrpSpPr>
+        <p:cNvPr id="1" name=""/>
+        <p:cNvGrpSpPr/>
+        <p:nvPr/>
+      </p:nvGrpSpPr>
+      <p:grpSpPr>
+        <a:xfrm>
+          <a:off x="0" y="0"/>
+          <a:ext cx="0" cy="0"/>
+          <a:chOff x="0" y="0"/>
+          <a:chExt cx="0" cy="0"/>
+        </a:xfrm>
+      </p:grpSpPr>
+      <p:sp>
+        <p:nvSpPr>
+          <p:cNvPr id="2" name="Title 1">
+            <a:extLst>
+              <a:ext uri="{FF2B5EF4-FFF2-40B4-BE49-F238E27FC236}">
+                <a16:creationId xmlns:a16="http://schemas.microsoft.com/office/drawing/2014/main" id="{4B47C1C5-2FA2-2E71-1AF9-2DFF75EA89D8}"/>
+              </a:ext>
+            </a:extLst>
+          </p:cNvPr>
+          <p:cNvSpPr>
+            <a:spLocks noGrp="1"/>
+          </p:cNvSpPr>
+          <p:nvPr>
+            <p:ph type="title"/>
+          </p:nvPr>
+        </p:nvSpPr>
+        <p:spPr/>
+        <p:txBody>
+          <a:bodyPr/>
+          <a:lstStyle/>
+          <a:p>
+            <a:r>
+              <a:rPr lang="en-US" dirty="0"/>
+              <a:t>Exploratory Analysis</a:t>
+            </a:r>
+          </a:p>
+        </p:txBody>
+      </p:sp>
+      <p:sp>
+        <p:nvSpPr>
+          <p:cNvPr id="3" name="Text Placeholder 2">
+            <a:extLst>
+              <a:ext uri="{FF2B5EF4-FFF2-40B4-BE49-F238E27FC236}">
+                <a16:creationId xmlns:a16="http://schemas.microsoft.com/office/drawing/2014/main" id="{A9E65451-7F0B-0DC9-626B-AAFBDFFF37B0}"/>
+              </a:ext>
+            </a:extLst>
+          </p:cNvPr>
+          <p:cNvSpPr>
+            <a:spLocks noGrp="1"/>
+          </p:cNvSpPr>
+          <p:nvPr>
+            <p:ph type="body" idx="1"/>
+          </p:nvPr>
+        </p:nvSpPr>
+        <p:spPr/>
+        <p:txBody>
+          <a:bodyPr/>
+          <a:lstStyle/>
+          <a:p>
+            <a:endParaRPr lang="en-US"/>
+          </a:p>
+        </p:txBody>
+      </p:sp>
+    </p:spTree>
+    <p:extLst>
+      <p:ext uri="{BB962C8B-B14F-4D97-AF65-F5344CB8AC3E}">
+        <p14:creationId xmlns:p14="http://schemas.microsoft.com/office/powerpoint/2010/main" val="3811946841"/>
+      </p:ext>
+    </p:extLst>
+  </p:cSld>
+  <p:clrMapOvr>
+    <a:masterClrMapping/>
+  </p:clrMapOvr>
+</p:sld>
+</file>
+
+<file path=ppt/slides/slide4.xml><?xml version="1.0" encoding="utf-8"?>
+<p:sld xmlns:a="http://schemas.openxmlformats.org/drawingml/2006/main" xmlns:r="http://schemas.openxmlformats.org/officeDocument/2006/relationships" xmlns:p="http://schemas.openxmlformats.org/presentationml/2006/main">
+  <p:cSld>
+    <p:spTree>
+      <p:nvGrpSpPr>
+        <p:cNvPr id="1" name=""/>
+        <p:cNvGrpSpPr/>
+        <p:nvPr/>
+      </p:nvGrpSpPr>
+      <p:grpSpPr>
+        <a:xfrm>
+          <a:off x="0" y="0"/>
+          <a:ext cx="0" cy="0"/>
+          <a:chOff x="0" y="0"/>
+          <a:chExt cx="0" cy="0"/>
+        </a:xfrm>
+      </p:grpSpPr>
+      <p:sp>
+        <p:nvSpPr>
+          <p:cNvPr id="2" name="Title 1">
+            <a:extLst>
+              <a:ext uri="{FF2B5EF4-FFF2-40B4-BE49-F238E27FC236}">
+                <a16:creationId xmlns:a16="http://schemas.microsoft.com/office/drawing/2014/main" id="{BA43C611-88F6-CF17-FCA3-B9AC30C15775}"/>
+              </a:ext>
+            </a:extLst>
+          </p:cNvPr>
+          <p:cNvSpPr>
+            <a:spLocks noGrp="1"/>
+          </p:cNvSpPr>
+          <p:nvPr>
+            <p:ph type="title"/>
+          </p:nvPr>
+        </p:nvSpPr>
+        <p:spPr/>
+        <p:txBody>
+          <a:bodyPr/>
+          <a:lstStyle/>
+          <a:p>
+            <a:r>
+              <a:rPr lang="en-US" dirty="0"/>
+              <a:t>Predicting Star Types using the Decision Tree model</a:t>
+            </a:r>
+          </a:p>
+        </p:txBody>
+      </p:sp>
+      <p:sp>
+        <p:nvSpPr>
+          <p:cNvPr id="3" name="Text Placeholder 2">
+            <a:extLst>
+              <a:ext uri="{FF2B5EF4-FFF2-40B4-BE49-F238E27FC236}">
+                <a16:creationId xmlns:a16="http://schemas.microsoft.com/office/drawing/2014/main" id="{5A70D355-73DE-53C3-FC59-AF6AF3B4C928}"/>
+              </a:ext>
+            </a:extLst>
+          </p:cNvPr>
+          <p:cNvSpPr>
+            <a:spLocks noGrp="1"/>
+          </p:cNvSpPr>
+          <p:nvPr>
+            <p:ph type="body" idx="1"/>
+          </p:nvPr>
+        </p:nvSpPr>
+        <p:spPr/>
+        <p:txBody>
+          <a:bodyPr/>
+          <a:lstStyle/>
+          <a:p>
+            <a:endParaRPr lang="en-US"/>
+          </a:p>
+        </p:txBody>
+      </p:sp>
+    </p:spTree>
+    <p:extLst>
+      <p:ext uri="{BB962C8B-B14F-4D97-AF65-F5344CB8AC3E}">
+        <p14:creationId xmlns:p14="http://schemas.microsoft.com/office/powerpoint/2010/main" val="3364378645"/>
+      </p:ext>
+    </p:extLst>
+  </p:cSld>
+  <p:clrMapOvr>
+    <a:masterClrMapping/>
+  </p:clrMapOvr>
+</p:sld>
+</file>
+
+<file path=ppt/slides/slide5.xml><?xml version="1.0" encoding="utf-8"?>
+<p:sld xmlns:a="http://schemas.openxmlformats.org/drawingml/2006/main" xmlns:r="http://schemas.openxmlformats.org/officeDocument/2006/relationships" xmlns:p="http://schemas.openxmlformats.org/presentationml/2006/main">
+  <p:cSld>
+    <p:spTree>
+      <p:nvGrpSpPr>
+        <p:cNvPr id="1" name=""/>
+        <p:cNvGrpSpPr/>
+        <p:nvPr/>
+      </p:nvGrpSpPr>
+      <p:grpSpPr>
+        <a:xfrm>
+          <a:off x="0" y="0"/>
+          <a:ext cx="0" cy="0"/>
+          <a:chOff x="0" y="0"/>
+          <a:chExt cx="0" cy="0"/>
+        </a:xfrm>
+      </p:grpSpPr>
+      <p:sp>
+        <p:nvSpPr>
+          <p:cNvPr id="2" name="Title 1">
+            <a:extLst>
+              <a:ext uri="{FF2B5EF4-FFF2-40B4-BE49-F238E27FC236}">
+                <a16:creationId xmlns:a16="http://schemas.microsoft.com/office/drawing/2014/main" id="{843031FD-CC01-AF3F-91D8-C8977338AD35}"/>
+              </a:ext>
+            </a:extLst>
+          </p:cNvPr>
+          <p:cNvSpPr>
+            <a:spLocks noGrp="1"/>
+          </p:cNvSpPr>
+          <p:nvPr>
+            <p:ph type="title"/>
+          </p:nvPr>
+        </p:nvSpPr>
+        <p:spPr/>
+        <p:txBody>
+          <a:bodyPr/>
+          <a:lstStyle/>
+          <a:p>
+            <a:r>
+              <a:rPr lang="en-US" dirty="0"/>
+              <a:t>Predicting Star Types using K-Nearest Neighbor model (KNN)</a:t>
+            </a:r>
+          </a:p>
+        </p:txBody>
+      </p:sp>
+      <p:sp>
+        <p:nvSpPr>
+          <p:cNvPr id="3" name="Text Placeholder 2">
+            <a:extLst>
+              <a:ext uri="{FF2B5EF4-FFF2-40B4-BE49-F238E27FC236}">
+                <a16:creationId xmlns:a16="http://schemas.microsoft.com/office/drawing/2014/main" id="{4BA057B9-C75F-5F81-D8A7-0B9D28816795}"/>
+              </a:ext>
+            </a:extLst>
+          </p:cNvPr>
+          <p:cNvSpPr>
+            <a:spLocks noGrp="1"/>
+          </p:cNvSpPr>
+          <p:nvPr>
+            <p:ph type="body" idx="1"/>
+          </p:nvPr>
+        </p:nvSpPr>
+        <p:spPr/>
+        <p:txBody>
+          <a:bodyPr/>
+          <a:lstStyle/>
+          <a:p>
+            <a:endParaRPr lang="en-US" dirty="0"/>
+          </a:p>
+        </p:txBody>
+      </p:sp>
+    </p:spTree>
+    <p:extLst>
+      <p:ext uri="{BB962C8B-B14F-4D97-AF65-F5344CB8AC3E}">
+        <p14:creationId xmlns:p14="http://schemas.microsoft.com/office/powerpoint/2010/main" val="2877514114"/>
+      </p:ext>
+    </p:extLst>
+  </p:cSld>
+  <p:clrMapOvr>
+    <a:masterClrMapping/>
+  </p:clrMapOvr>
+</p:sld>
+</file>
+
+<file path=ppt/slides/slide6.xml><?xml version="1.0" encoding="utf-8"?>
+<p:sld xmlns:a="http://schemas.openxmlformats.org/drawingml/2006/main" xmlns:r="http://schemas.openxmlformats.org/officeDocument/2006/relationships" xmlns:p="http://schemas.openxmlformats.org/presentationml/2006/main">
+  <p:cSld>
+    <p:bg>
+      <p:bgPr>
+        <a:solidFill>
+          <a:schemeClr val="bg1"/>
+        </a:solidFill>
+        <a:effectLst/>
+      </p:bgPr>
+    </p:bg>
+    <p:spTree>
+      <p:nvGrpSpPr>
+        <p:cNvPr id="1" name=""/>
+        <p:cNvGrpSpPr/>
+        <p:nvPr/>
+      </p:nvGrpSpPr>
+      <p:grpSpPr>
+        <a:xfrm>
+          <a:off x="0" y="0"/>
+          <a:ext cx="0" cy="0"/>
+          <a:chOff x="0" y="0"/>
+          <a:chExt cx="0" cy="0"/>
+        </a:xfrm>
+      </p:grpSpPr>
+      <p:sp>
+        <p:nvSpPr>
+          <p:cNvPr id="11" name="Down Arrow 7">
+            <a:extLst>
+              <a:ext uri="{FF2B5EF4-FFF2-40B4-BE49-F238E27FC236}">
+                <a16:creationId xmlns:a16="http://schemas.microsoft.com/office/drawing/2014/main" id="{D4771268-CB57-404A-9271-370EB28F6090}"/>
+              </a:ext>
+              <a:ext uri="{C183D7F6-B498-43B3-948B-1728B52AA6E4}">
+                <adec:decorative xmlns:adec="http://schemas.microsoft.com/office/drawing/2017/decorative" val="1"/>
+              </a:ext>
+            </a:extLst>
+          </p:cNvPr>
+          <p:cNvSpPr>
+            <a:spLocks noGrp="1" noRot="1" noChangeAspect="1" noMove="1" noResize="1" noEditPoints="1" noAdjustHandles="1" noChangeArrowheads="1" noChangeShapeType="1" noTextEdit="1"/>
+          </p:cNvSpPr>
+          <p:nvPr>
+            <p:extLst>
+              <p:ext uri="{386F3935-93C4-4BCD-93E2-E3B085C9AB24}">
+                <p16:designElem xmlns:p16="http://schemas.microsoft.com/office/powerpoint/2015/main" val="1"/>
+              </p:ext>
+            </p:extLst>
+          </p:nvPr>
+        </p:nvSpPr>
+        <p:spPr>
+          <a:xfrm rot="16200000">
+            <a:off x="800100" y="1491343"/>
+            <a:ext cx="3333749" cy="3499103"/>
+          </a:xfrm>
+          <a:prstGeom prst="downArrow">
+            <a:avLst>
+              <a:gd name="adj1" fmla="val 100000"/>
+              <a:gd name="adj2" fmla="val 15788"/>
+            </a:avLst>
+          </a:prstGeom>
+          <a:solidFill>
+            <a:srgbClr val="404040"/>
+          </a:solidFill>
+          <a:ln w="53975">
+            <a:noFill/>
+          </a:ln>
+        </p:spPr>
+        <p:style>
+          <a:lnRef idx="2">
+            <a:schemeClr val="accent1">
+              <a:shade val="50000"/>
+            </a:schemeClr>
+          </a:lnRef>
+          <a:fillRef idx="1">
+            <a:schemeClr val="accent1"/>
+          </a:fillRef>
+          <a:effectRef idx="0">
+            <a:schemeClr val="accent1"/>
+          </a:effectRef>
+          <a:fontRef idx="minor">
+            <a:schemeClr val="lt1"/>
+          </a:fontRef>
+        </p:style>
+        <p:txBody>
+          <a:bodyPr rtlCol="0" anchor="ctr"/>
+          <a:lstStyle/>
+          <a:p>
+            <a:pPr algn="ctr"/>
+            <a:endParaRPr lang="en-US"/>
+          </a:p>
+        </p:txBody>
+      </p:sp>
+      <p:sp>
+        <p:nvSpPr>
+          <p:cNvPr id="2" name="Title 1">
+            <a:extLst>
+              <a:ext uri="{FF2B5EF4-FFF2-40B4-BE49-F238E27FC236}">
+                <a16:creationId xmlns:a16="http://schemas.microsoft.com/office/drawing/2014/main" id="{4D232782-94D6-3226-49ED-8CF6B5D0D8A1}"/>
+              </a:ext>
+            </a:extLst>
+          </p:cNvPr>
+          <p:cNvSpPr>
+            <a:spLocks noGrp="1"/>
+          </p:cNvSpPr>
+          <p:nvPr>
+            <p:ph type="title"/>
+          </p:nvPr>
+        </p:nvSpPr>
+        <p:spPr>
+          <a:xfrm>
+            <a:off x="1028700" y="1967266"/>
+            <a:ext cx="2628900" cy="2547257"/>
+          </a:xfrm>
+          <a:noFill/>
+        </p:spPr>
+        <p:txBody>
+          <a:bodyPr vert="horz" lIns="91440" tIns="45720" rIns="91440" bIns="45720" rtlCol="0" anchor="ctr">
+            <a:normAutofit/>
+          </a:bodyPr>
+          <a:lstStyle/>
+          <a:p>
+            <a:pPr algn="ctr"/>
+            <a:r>
+              <a:rPr lang="en-US" sz="3600" kern="1200">
+                <a:solidFill>
+                  <a:srgbClr val="FFFFFF"/>
+                </a:solidFill>
+                <a:latin typeface="+mj-lt"/>
+                <a:ea typeface="+mj-ea"/>
+                <a:cs typeface="+mj-cs"/>
+              </a:rPr>
+              <a:t>Code</a:t>
+            </a:r>
+          </a:p>
+        </p:txBody>
+      </p:sp>
+      <p:pic>
+        <p:nvPicPr>
+          <p:cNvPr id="6" name="Content Placeholder 5" descr="A screenshot of a computer program&#10;&#10;AI-generated content may be incorrect.">
+            <a:extLst>
+              <a:ext uri="{FF2B5EF4-FFF2-40B4-BE49-F238E27FC236}">
+                <a16:creationId xmlns:a16="http://schemas.microsoft.com/office/drawing/2014/main" id="{86D0587C-6590-4605-1667-9AF0D626A850}"/>
+              </a:ext>
+            </a:extLst>
+          </p:cNvPr>
+          <p:cNvPicPr>
+            <a:picLocks noGrp="1" noChangeAspect="1"/>
+          </p:cNvPicPr>
+          <p:nvPr>
+            <p:ph idx="1"/>
+          </p:nvPr>
+        </p:nvPicPr>
+        <p:blipFill>
+          <a:blip r:embed="rId2"/>
+          <a:stretch>
+            <a:fillRect/>
+          </a:stretch>
+        </p:blipFill>
+        <p:spPr>
+          <a:xfrm>
+            <a:off x="5533395" y="356641"/>
+            <a:ext cx="5092561" cy="5003441"/>
+          </a:xfrm>
+          <a:prstGeom prst="rect">
+            <a:avLst/>
+          </a:prstGeom>
+        </p:spPr>
+      </p:pic>
+      <p:pic>
+        <p:nvPicPr>
+          <p:cNvPr id="8" name="Picture 7" descr="A white background with red and green text&#10;&#10;AI-generated content may be incorrect.">
+            <a:extLst>
+              <a:ext uri="{FF2B5EF4-FFF2-40B4-BE49-F238E27FC236}">
+                <a16:creationId xmlns:a16="http://schemas.microsoft.com/office/drawing/2014/main" id="{246DB88E-5C4F-B119-AE99-42C704AE07CA}"/>
+              </a:ext>
+            </a:extLst>
+          </p:cNvPr>
+          <p:cNvPicPr>
+            <a:picLocks noChangeAspect="1"/>
+          </p:cNvPicPr>
+          <p:nvPr/>
+        </p:nvPicPr>
+        <p:blipFill>
+          <a:blip r:embed="rId3"/>
+          <a:stretch>
+            <a:fillRect/>
+          </a:stretch>
+        </p:blipFill>
+        <p:spPr>
+          <a:xfrm>
+            <a:off x="5533395" y="5360082"/>
+            <a:ext cx="5092561" cy="676899"/>
+          </a:xfrm>
+          <a:prstGeom prst="rect">
+            <a:avLst/>
+          </a:prstGeom>
+        </p:spPr>
+      </p:pic>
+    </p:spTree>
+    <p:extLst>
+      <p:ext uri="{BB962C8B-B14F-4D97-AF65-F5344CB8AC3E}">
+        <p14:creationId xmlns:p14="http://schemas.microsoft.com/office/powerpoint/2010/main" val="1983819204"/>
+      </p:ext>
+    </p:extLst>
+  </p:cSld>
+  <p:clrMapOvr>
+    <a:masterClrMapping/>
+  </p:clrMapOvr>
+</p:sld>
+</file>
+
+<file path=ppt/slides/slide7.xml><?xml version="1.0" encoding="utf-8"?>
+<p:sld xmlns:a="http://schemas.openxmlformats.org/drawingml/2006/main" xmlns:r="http://schemas.openxmlformats.org/officeDocument/2006/relationships" xmlns:p="http://schemas.openxmlformats.org/presentationml/2006/main">
+  <p:cSld>
+    <p:bg>
+      <p:bgPr>
+        <a:solidFill>
+          <a:schemeClr val="bg1"/>
+        </a:solidFill>
+        <a:effectLst/>
+      </p:bgPr>
+    </p:bg>
+    <p:spTree>
+      <p:nvGrpSpPr>
+        <p:cNvPr id="1" name=""/>
+        <p:cNvGrpSpPr/>
+        <p:nvPr/>
+      </p:nvGrpSpPr>
+      <p:grpSpPr>
+        <a:xfrm>
+          <a:off x="0" y="0"/>
+          <a:ext cx="0" cy="0"/>
+          <a:chOff x="0" y="0"/>
+          <a:chExt cx="0" cy="0"/>
+        </a:xfrm>
+      </p:grpSpPr>
+      <p:sp>
+        <p:nvSpPr>
+          <p:cNvPr id="24" name="Rectangle 23">
+            <a:extLst>
+              <a:ext uri="{FF2B5EF4-FFF2-40B4-BE49-F238E27FC236}">
+                <a16:creationId xmlns:a16="http://schemas.microsoft.com/office/drawing/2014/main" id="{32BC26D8-82FB-445E-AA49-62A77D7C1EE0}"/>
+              </a:ext>
+              <a:ext uri="{C183D7F6-B498-43B3-948B-1728B52AA6E4}">
+                <adec:decorative xmlns:adec="http://schemas.microsoft.com/office/drawing/2017/decorative" val="1"/>
+              </a:ext>
+            </a:extLst>
+          </p:cNvPr>
+          <p:cNvSpPr>
+            <a:spLocks noGrp="1" noRot="1" noChangeAspect="1" noMove="1" noResize="1" noEditPoints="1" noAdjustHandles="1" noChangeArrowheads="1" noChangeShapeType="1" noTextEdit="1"/>
+          </p:cNvSpPr>
+          <p:nvPr>
+            <p:extLst>
+              <p:ext uri="{386F3935-93C4-4BCD-93E2-E3B085C9AB24}">
+                <p16:designElem xmlns:p16="http://schemas.microsoft.com/office/powerpoint/2015/main" val="1"/>
+              </p:ext>
+            </p:extLst>
+          </p:nvPr>
+        </p:nvSpPr>
+        <p:spPr>
+          <a:xfrm>
+            <a:off x="0" y="0"/>
+            <a:ext cx="12192000" cy="6858000"/>
+          </a:xfrm>
+          <a:prstGeom prst="rect">
+            <a:avLst/>
+          </a:prstGeom>
+          <a:solidFill>
+            <a:srgbClr val="465235"/>
+          </a:solidFill>
+          <a:ln>
+            <a:noFill/>
+          </a:ln>
+        </p:spPr>
+        <p:style>
+          <a:lnRef idx="2">
+            <a:schemeClr val="accent1">
+              <a:shade val="50000"/>
+            </a:schemeClr>
+          </a:lnRef>
+          <a:fillRef idx="1">
+            <a:schemeClr val="accent1"/>
+          </a:fillRef>
+          <a:effectRef idx="0">
+            <a:schemeClr val="accent1"/>
+          </a:effectRef>
+          <a:fontRef idx="minor">
+            <a:schemeClr val="lt1"/>
+          </a:fontRef>
+        </p:style>
+        <p:txBody>
+          <a:bodyPr rtlCol="0" anchor="ctr"/>
+          <a:lstStyle/>
+          <a:p>
+            <a:pPr algn="ctr"/>
+            <a:endParaRPr lang="en-US"/>
+          </a:p>
+        </p:txBody>
+      </p:sp>
+      <p:sp>
+        <p:nvSpPr>
+          <p:cNvPr id="23" name="Rectangle 22">
+            <a:extLst>
+              <a:ext uri="{FF2B5EF4-FFF2-40B4-BE49-F238E27FC236}">
+                <a16:creationId xmlns:a16="http://schemas.microsoft.com/office/drawing/2014/main" id="{CB44330D-EA18-4254-AA95-EB49948539B8}"/>
+              </a:ext>
+              <a:ext uri="{C183D7F6-B498-43B3-948B-1728B52AA6E4}">
+                <adec:decorative xmlns:adec="http://schemas.microsoft.com/office/drawing/2017/decorative" val="1"/>
+              </a:ext>
+            </a:extLst>
+          </p:cNvPr>
+          <p:cNvSpPr>
+            <a:spLocks noGrp="1" noRot="1" noChangeAspect="1" noMove="1" noResize="1" noEditPoints="1" noAdjustHandles="1" noChangeArrowheads="1" noChangeShapeType="1" noTextEdit="1"/>
+          </p:cNvSpPr>
+          <p:nvPr>
+            <p:extLst>
+              <p:ext uri="{386F3935-93C4-4BCD-93E2-E3B085C9AB24}">
+                <p16:designElem xmlns:p16="http://schemas.microsoft.com/office/powerpoint/2015/main" val="1"/>
+              </p:ext>
+            </p:extLst>
+          </p:nvPr>
+        </p:nvSpPr>
+        <p:spPr>
+          <a:xfrm>
+            <a:off x="477012" y="480060"/>
+            <a:ext cx="11237976" cy="5897880"/>
+          </a:xfrm>
+          <a:prstGeom prst="rect">
+            <a:avLst/>
+          </a:prstGeom>
+          <a:solidFill>
+            <a:srgbClr val="FFFFFF"/>
+          </a:solidFill>
+          <a:ln>
+            <a:noFill/>
+          </a:ln>
+        </p:spPr>
+        <p:style>
+          <a:lnRef idx="2">
+            <a:schemeClr val="accent1">
+              <a:shade val="50000"/>
+            </a:schemeClr>
+          </a:lnRef>
+          <a:fillRef idx="1">
+            <a:schemeClr val="accent1"/>
+          </a:fillRef>
+          <a:effectRef idx="0">
+            <a:schemeClr val="accent1"/>
+          </a:effectRef>
+          <a:fontRef idx="minor">
+            <a:schemeClr val="lt1"/>
+          </a:fontRef>
+        </p:style>
+        <p:txBody>
+          <a:bodyPr rtlCol="0" anchor="ctr"/>
+          <a:lstStyle/>
+          <a:p>
+            <a:pPr algn="ctr"/>
+            <a:endParaRPr lang="en-US"/>
+          </a:p>
+        </p:txBody>
+      </p:sp>
+      <p:pic>
+        <p:nvPicPr>
+          <p:cNvPr id="9" name="Picture 8" descr="A screenshot of a graph&#10;&#10;AI-generated content may be incorrect.">
+            <a:extLst>
+              <a:ext uri="{FF2B5EF4-FFF2-40B4-BE49-F238E27FC236}">
+                <a16:creationId xmlns:a16="http://schemas.microsoft.com/office/drawing/2014/main" id="{70504723-4847-B279-DB59-39EF153D13EA}"/>
+              </a:ext>
+            </a:extLst>
+          </p:cNvPr>
+          <p:cNvPicPr>
+            <a:picLocks noChangeAspect="1"/>
+          </p:cNvPicPr>
+          <p:nvPr/>
+        </p:nvPicPr>
+        <p:blipFill>
+          <a:blip r:embed="rId2"/>
+          <a:stretch>
+            <a:fillRect/>
+          </a:stretch>
+        </p:blipFill>
+        <p:spPr>
+          <a:xfrm>
+            <a:off x="1922917" y="643467"/>
+            <a:ext cx="8346165" cy="5571066"/>
+          </a:xfrm>
+          <a:prstGeom prst="rect">
+            <a:avLst/>
+          </a:prstGeom>
+        </p:spPr>
+      </p:pic>
+      <p:sp>
+        <p:nvSpPr>
+          <p:cNvPr id="4" name="AutoShape 2">
+            <a:extLst>
+              <a:ext uri="{FF2B5EF4-FFF2-40B4-BE49-F238E27FC236}">
+                <a16:creationId xmlns:a16="http://schemas.microsoft.com/office/drawing/2014/main" id="{69A3A004-2FCC-A839-4F4D-82CD19D0475B}"/>
+              </a:ext>
+            </a:extLst>
+          </p:cNvPr>
+          <p:cNvSpPr>
+            <a:spLocks noChangeAspect="1" noChangeArrowheads="1"/>
+          </p:cNvSpPr>
+          <p:nvPr/>
+        </p:nvSpPr>
+        <p:spPr bwMode="auto">
+          <a:xfrm>
+            <a:off x="2564524" y="-102476"/>
+            <a:ext cx="3683876" cy="3683876"/>
+          </a:xfrm>
+          <a:prstGeom prst="rect">
+            <a:avLst/>
+          </a:prstGeom>
+          <a:noFill/>
+          <a:extLst>
+            <a:ext uri="{909E8E84-426E-40DD-AFC4-6F175D3DCCD1}">
+              <a14:hiddenFill xmlns:a14="http://schemas.microsoft.com/office/drawing/2010/main">
+                <a:solidFill>
+                  <a:srgbClr val="FFFFFF"/>
+                </a:solidFill>
+              </a14:hiddenFill>
+            </a:ext>
+          </a:extLst>
+        </p:spPr>
+        <p:txBody>
+          <a:bodyPr vert="horz" wrap="square" lIns="91440" tIns="45720" rIns="91440" bIns="45720" numCol="1" anchor="t" anchorCtr="0" compatLnSpc="1">
+            <a:prstTxWarp prst="textNoShape">
+              <a:avLst/>
+            </a:prstTxWarp>
+          </a:bodyPr>
+          <a:lstStyle/>
+          <a:p>
+            <a:endParaRPr lang="en-US"/>
+          </a:p>
+        </p:txBody>
+      </p:sp>
+      <p:sp>
+        <p:nvSpPr>
+          <p:cNvPr id="7" name="AutoShape 4">
+            <a:extLst>
+              <a:ext uri="{FF2B5EF4-FFF2-40B4-BE49-F238E27FC236}">
+                <a16:creationId xmlns:a16="http://schemas.microsoft.com/office/drawing/2014/main" id="{3DA6D3CD-0363-BB44-5B18-5AE58A0421CD}"/>
+              </a:ext>
+            </a:extLst>
+          </p:cNvPr>
+          <p:cNvSpPr>
+            <a:spLocks noChangeAspect="1" noChangeArrowheads="1"/>
+          </p:cNvSpPr>
+          <p:nvPr/>
+        </p:nvSpPr>
+        <p:spPr bwMode="auto">
+          <a:xfrm>
+            <a:off x="5943600" y="3276600"/>
+            <a:ext cx="304800" cy="304800"/>
+          </a:xfrm>
+          <a:prstGeom prst="rect">
+            <a:avLst/>
+          </a:prstGeom>
+          <a:noFill/>
+          <a:extLst>
+            <a:ext uri="{909E8E84-426E-40DD-AFC4-6F175D3DCCD1}">
+              <a14:hiddenFill xmlns:a14="http://schemas.microsoft.com/office/drawing/2010/main">
+                <a:solidFill>
+                  <a:srgbClr val="FFFFFF"/>
+                </a:solidFill>
+              </a14:hiddenFill>
+            </a:ext>
+          </a:extLst>
+        </p:spPr>
+        <p:txBody>
+          <a:bodyPr vert="horz" wrap="square" lIns="91440" tIns="45720" rIns="91440" bIns="45720" numCol="1" anchor="t" anchorCtr="0" compatLnSpc="1">
+            <a:prstTxWarp prst="textNoShape">
+              <a:avLst/>
+            </a:prstTxWarp>
+          </a:bodyPr>
+          <a:lstStyle/>
+          <a:p>
+            <a:endParaRPr lang="en-US"/>
+          </a:p>
+        </p:txBody>
+      </p:sp>
+    </p:spTree>
+    <p:extLst>
+      <p:ext uri="{BB962C8B-B14F-4D97-AF65-F5344CB8AC3E}">
+        <p14:creationId xmlns:p14="http://schemas.microsoft.com/office/powerpoint/2010/main" val="2446726839"/>
+      </p:ext>
+    </p:extLst>
+  </p:cSld>
+  <p:clrMapOvr>
+    <a:masterClrMapping/>
+  </p:clrMapOvr>
+</p:sld>
+</file>
+
+<file path=ppt/slides/slide8.xml><?xml version="1.0" encoding="utf-8"?>
+<p:sld xmlns:a="http://schemas.openxmlformats.org/drawingml/2006/main" xmlns:r="http://schemas.openxmlformats.org/officeDocument/2006/relationships" xmlns:p="http://schemas.openxmlformats.org/presentationml/2006/main">
+  <p:cSld>
+    <p:spTree>
+      <p:nvGrpSpPr>
+        <p:cNvPr id="1" name=""/>
+        <p:cNvGrpSpPr/>
+        <p:nvPr/>
+      </p:nvGrpSpPr>
+      <p:grpSpPr>
+        <a:xfrm>
+          <a:off x="0" y="0"/>
+          <a:ext cx="0" cy="0"/>
+          <a:chOff x="0" y="0"/>
+          <a:chExt cx="0" cy="0"/>
+        </a:xfrm>
+      </p:grpSpPr>
+      <p:pic>
+        <p:nvPicPr>
+          <p:cNvPr id="6" name="Picture 5" descr="A screenshot of a computer program&#10;&#10;AI-generated content may be incorrect.">
+            <a:extLst>
+              <a:ext uri="{FF2B5EF4-FFF2-40B4-BE49-F238E27FC236}">
+                <a16:creationId xmlns:a16="http://schemas.microsoft.com/office/drawing/2014/main" id="{CA0D0AB7-2806-F5F3-AB0D-DAE25B3E49D7}"/>
+              </a:ext>
+            </a:extLst>
+          </p:cNvPr>
+          <p:cNvPicPr>
+            <a:picLocks noChangeAspect="1"/>
+          </p:cNvPicPr>
+          <p:nvPr/>
+        </p:nvPicPr>
+        <p:blipFill>
+          <a:blip r:embed="rId2"/>
+          <a:stretch>
+            <a:fillRect/>
+          </a:stretch>
+        </p:blipFill>
+        <p:spPr>
+          <a:xfrm>
+            <a:off x="387927" y="182416"/>
+            <a:ext cx="5708073" cy="3187696"/>
+          </a:xfrm>
+          <a:prstGeom prst="rect">
+            <a:avLst/>
+          </a:prstGeom>
+          <a:ln>
+            <a:solidFill>
+              <a:srgbClr val="7030A0"/>
+            </a:solidFill>
+            <a:prstDash val="lgDash"/>
+          </a:ln>
+        </p:spPr>
+      </p:pic>
+      <p:pic>
+        <p:nvPicPr>
+          <p:cNvPr id="8" name="Picture 7" descr="A blue and white graph&#10;&#10;AI-generated content may be incorrect.">
+            <a:extLst>
+              <a:ext uri="{FF2B5EF4-FFF2-40B4-BE49-F238E27FC236}">
+                <a16:creationId xmlns:a16="http://schemas.microsoft.com/office/drawing/2014/main" id="{67A3B431-8199-64B7-B948-B245CCB6FB71}"/>
+              </a:ext>
+            </a:extLst>
+          </p:cNvPr>
+          <p:cNvPicPr>
+            <a:picLocks noChangeAspect="1"/>
+          </p:cNvPicPr>
+          <p:nvPr/>
+        </p:nvPicPr>
+        <p:blipFill>
+          <a:blip r:embed="rId3"/>
+          <a:stretch>
+            <a:fillRect/>
+          </a:stretch>
+        </p:blipFill>
+        <p:spPr>
+          <a:xfrm>
+            <a:off x="6769684" y="182416"/>
+            <a:ext cx="4535626" cy="3023752"/>
+          </a:xfrm>
+          <a:prstGeom prst="rect">
+            <a:avLst/>
+          </a:prstGeom>
+          <a:ln w="38100">
+            <a:solidFill>
+              <a:schemeClr val="tx1"/>
+            </a:solidFill>
+          </a:ln>
+        </p:spPr>
+      </p:pic>
+      <p:pic>
+        <p:nvPicPr>
+          <p:cNvPr id="10" name="Picture 9" descr="A diagram of a graph&#10;&#10;AI-generated content may be incorrect.">
+            <a:extLst>
+              <a:ext uri="{FF2B5EF4-FFF2-40B4-BE49-F238E27FC236}">
+                <a16:creationId xmlns:a16="http://schemas.microsoft.com/office/drawing/2014/main" id="{9AE9C298-A721-DA02-D62C-A3BF0E745F2A}"/>
+              </a:ext>
+            </a:extLst>
+          </p:cNvPr>
+          <p:cNvPicPr>
+            <a:picLocks noChangeAspect="1"/>
+          </p:cNvPicPr>
+          <p:nvPr/>
+        </p:nvPicPr>
+        <p:blipFill>
+          <a:blip r:embed="rId4"/>
+          <a:stretch>
+            <a:fillRect/>
+          </a:stretch>
+        </p:blipFill>
+        <p:spPr>
+          <a:xfrm>
+            <a:off x="6769684" y="3560627"/>
+            <a:ext cx="4535626" cy="3023751"/>
+          </a:xfrm>
+          <a:prstGeom prst="rect">
+            <a:avLst/>
+          </a:prstGeom>
+          <a:ln w="38100">
+            <a:solidFill>
+              <a:schemeClr val="tx1"/>
+            </a:solidFill>
+          </a:ln>
+        </p:spPr>
+      </p:pic>
+      <p:sp>
+        <p:nvSpPr>
+          <p:cNvPr id="11" name="TextBox 10">
+            <a:extLst>
+              <a:ext uri="{FF2B5EF4-FFF2-40B4-BE49-F238E27FC236}">
+                <a16:creationId xmlns:a16="http://schemas.microsoft.com/office/drawing/2014/main" id="{031A4306-79BD-7FBC-2973-91B4FF8600D1}"/>
+              </a:ext>
+            </a:extLst>
+          </p:cNvPr>
+          <p:cNvSpPr txBox="1"/>
+          <p:nvPr/>
+        </p:nvSpPr>
+        <p:spPr>
+          <a:xfrm>
+            <a:off x="387928" y="3985170"/>
+            <a:ext cx="5708072" cy="1938992"/>
+          </a:xfrm>
+          <a:prstGeom prst="rect">
+            <a:avLst/>
+          </a:prstGeom>
+          <a:solidFill>
+            <a:schemeClr val="accent2"/>
+          </a:solidFill>
+        </p:spPr>
+        <p:txBody>
+          <a:bodyPr wrap="square" rtlCol="0">
+            <a:spAutoFit/>
+          </a:bodyPr>
+          <a:lstStyle/>
+          <a:p>
+            <a:pPr algn="ctr"/>
+            <a:r>
+              <a:rPr lang="en-US" sz="4000" b="1" dirty="0"/>
+              <a:t>Initial Experiment with K=5 with split train/test (80/20)</a:t>
+            </a:r>
+          </a:p>
+        </p:txBody>
+      </p:sp>
+    </p:spTree>
+    <p:extLst>
+      <p:ext uri="{BB962C8B-B14F-4D97-AF65-F5344CB8AC3E}">
+        <p14:creationId xmlns:p14="http://schemas.microsoft.com/office/powerpoint/2010/main" val="2743876708"/>
+      </p:ext>
+    </p:extLst>
+  </p:cSld>
+  <p:clrMapOvr>
+    <a:masterClrMapping/>
+  </p:clrMapOvr>
+</p:sld>
+</file>
+
+<file path=ppt/slides/slide9.xml><?xml version="1.0" encoding="utf-8"?>
+<p:sld xmlns:a="http://schemas.openxmlformats.org/drawingml/2006/main" xmlns:r="http://schemas.openxmlformats.org/officeDocument/2006/relationships" xmlns:p="http://schemas.openxmlformats.org/presentationml/2006/main">
+  <p:cSld>
+    <p:spTree>
+      <p:nvGrpSpPr>
+        <p:cNvPr id="1" name=""/>
+        <p:cNvGrpSpPr/>
+        <p:nvPr/>
+      </p:nvGrpSpPr>
+      <p:grpSpPr>
+        <a:xfrm>
+          <a:off x="0" y="0"/>
+          <a:ext cx="0" cy="0"/>
+          <a:chOff x="0" y="0"/>
+          <a:chExt cx="0" cy="0"/>
+        </a:xfrm>
+      </p:grpSpPr>
+      <p:pic>
+        <p:nvPicPr>
+          <p:cNvPr id="5" name="Picture 4" descr="A table of numbers and letters&#10;&#10;AI-generated content may be incorrect.">
+            <a:extLst>
+              <a:ext uri="{FF2B5EF4-FFF2-40B4-BE49-F238E27FC236}">
+                <a16:creationId xmlns:a16="http://schemas.microsoft.com/office/drawing/2014/main" id="{DE0FE3D7-838F-70A0-7E5E-569460B2FBD6}"/>
+              </a:ext>
+            </a:extLst>
+          </p:cNvPr>
+          <p:cNvPicPr>
+            <a:picLocks noChangeAspect="1"/>
+          </p:cNvPicPr>
+          <p:nvPr/>
+        </p:nvPicPr>
+        <p:blipFill>
+          <a:blip r:embed="rId2"/>
+          <a:stretch>
+            <a:fillRect/>
+          </a:stretch>
+        </p:blipFill>
+        <p:spPr>
+          <a:xfrm>
+            <a:off x="260817" y="64294"/>
+            <a:ext cx="3545251" cy="6729412"/>
+          </a:xfrm>
+          <a:prstGeom prst="rect">
+            <a:avLst/>
+          </a:prstGeom>
+          <a:ln w="38100">
+            <a:solidFill>
+              <a:schemeClr val="tx1"/>
+            </a:solidFill>
+          </a:ln>
+        </p:spPr>
+      </p:pic>
+      <p:pic>
+        <p:nvPicPr>
+          <p:cNvPr id="7" name="Picture 6" descr="A table of numbers and a train&#10;&#10;AI-generated content may be incorrect.">
+            <a:extLst>
+              <a:ext uri="{FF2B5EF4-FFF2-40B4-BE49-F238E27FC236}">
+                <a16:creationId xmlns:a16="http://schemas.microsoft.com/office/drawing/2014/main" id="{7D838CB4-2840-A484-8589-F92CA9501615}"/>
+              </a:ext>
+            </a:extLst>
+          </p:cNvPr>
+          <p:cNvPicPr>
+            <a:picLocks noChangeAspect="1"/>
+          </p:cNvPicPr>
+          <p:nvPr/>
+        </p:nvPicPr>
+        <p:blipFill>
+          <a:blip r:embed="rId3"/>
+          <a:stretch>
+            <a:fillRect/>
+          </a:stretch>
+        </p:blipFill>
+        <p:spPr>
+          <a:xfrm>
+            <a:off x="4050579" y="100727"/>
+            <a:ext cx="3545251" cy="6692980"/>
+          </a:xfrm>
+          <a:prstGeom prst="rect">
+            <a:avLst/>
+          </a:prstGeom>
+          <a:ln w="38100">
+            <a:solidFill>
+              <a:schemeClr val="tx1"/>
+            </a:solidFill>
+          </a:ln>
+        </p:spPr>
+      </p:pic>
+      <p:sp>
+        <p:nvSpPr>
+          <p:cNvPr id="10" name="TextBox 9">
+            <a:extLst>
+              <a:ext uri="{FF2B5EF4-FFF2-40B4-BE49-F238E27FC236}">
+                <a16:creationId xmlns:a16="http://schemas.microsoft.com/office/drawing/2014/main" id="{0C5AEC4A-D94A-6DB4-816B-D59BC171CAA1}"/>
+              </a:ext>
+            </a:extLst>
+          </p:cNvPr>
+          <p:cNvSpPr txBox="1"/>
+          <p:nvPr/>
+        </p:nvSpPr>
+        <p:spPr>
+          <a:xfrm>
+            <a:off x="7983216" y="1246614"/>
+            <a:ext cx="3843338" cy="4401205"/>
+          </a:xfrm>
+          <a:prstGeom prst="rect">
+            <a:avLst/>
+          </a:prstGeom>
+          <a:solidFill>
+            <a:schemeClr val="accent2"/>
+          </a:solidFill>
+        </p:spPr>
+        <p:txBody>
+          <a:bodyPr wrap="square" rtlCol="0">
+            <a:spAutoFit/>
+          </a:bodyPr>
+          <a:lstStyle/>
+          <a:p>
+            <a:pPr algn="ctr"/>
+            <a:r>
+              <a:rPr lang="en-US" sz="4000" b="1" dirty="0"/>
+              <a:t>Ran 94 experiments of KNN models with different K’s ranging from 1 to 94 to observe accuracy</a:t>
+            </a:r>
+          </a:p>
+        </p:txBody>
+      </p:sp>
+    </p:spTree>
+    <p:extLst>
+      <p:ext uri="{BB962C8B-B14F-4D97-AF65-F5344CB8AC3E}">
+        <p14:creationId xmlns:p14="http://schemas.microsoft.com/office/powerpoint/2010/main" val="39558463"/>
+      </p:ext>
+    </p:extLst>
+  </p:cSld>
+  <p:clrMapOvr>
+    <a:masterClrMapping/>
+  </p:clrMapOvr>
+</p:sld>
+</file>
+
 <file path=ppt/theme/theme1.xml><?xml version="1.0" encoding="utf-8"?>
-<a:theme xmlns:a="http://schemas.openxmlformats.org/drawingml/2006/main" name="Office Theme">
+<a:theme xmlns:a="http://schemas.openxmlformats.org/drawingml/2006/main" name="Office 2013 - 2022 Theme">
   <a:themeElements>
-    <a:clrScheme name="Office">
+    <a:clrScheme name="Office 2013 - 2022 Theme">
       <a:dk1>
         <a:sysClr val="windowText" lastClr="000000"/>
       </a:dk1>
@@ -3395,39 +4654,39 @@
         <a:sysClr val="window" lastClr="FFFFFF"/>
       </a:lt1>
       <a:dk2>
-        <a:srgbClr val="0E2841"/>
+        <a:srgbClr val="44546A"/>
       </a:dk2>
       <a:lt2>
-        <a:srgbClr val="E8E8E8"/>
+        <a:srgbClr val="E7E6E6"/>
       </a:lt2>
       <a:accent1>
-        <a:srgbClr val="156082"/>
+        <a:srgbClr val="1D9A78"/>
       </a:accent1>
       <a:accent2>
-        <a:srgbClr val="E97132"/>
+        <a:srgbClr val="8BC145"/>
       </a:accent2>
       <a:accent3>
-        <a:srgbClr val="196B24"/>
+        <a:srgbClr val="36AFCE"/>
       </a:accent3>
       <a:accent4>
-        <a:srgbClr val="0F9ED5"/>
+        <a:srgbClr val="1D6FA9"/>
       </a:accent4>
       <a:accent5>
-        <a:srgbClr val="A02B93"/>
+        <a:srgbClr val="B74919"/>
       </a:accent5>
       <a:accent6>
-        <a:srgbClr val="4EA72E"/>
+        <a:srgbClr val="F19D19"/>
       </a:accent6>
       <a:hlink>
-        <a:srgbClr val="467886"/>
+        <a:srgbClr val="0563C1"/>
       </a:hlink>
       <a:folHlink>
-        <a:srgbClr val="96607D"/>
+        <a:srgbClr val="954F72"/>
       </a:folHlink>
     </a:clrScheme>
-    <a:fontScheme name="Office">
+    <a:fontScheme name="Office 2013 - 2022 Theme">
       <a:majorFont>
-        <a:latin typeface="Aptos Display" panose="02110004020202020204"/>
+        <a:latin typeface="Calibri Light" panose="020F0302020204030204"/>
         <a:ea typeface=""/>
         <a:cs typeface=""/>
         <a:font script="Jpan" typeface="游ゴシック Light"/>
@@ -3460,26 +4719,9 @@
         <a:font script="Viet" typeface="Times New Roman"/>
         <a:font script="Uigh" typeface="Microsoft Uighur"/>
         <a:font script="Geor" typeface="Sylfaen"/>
-        <a:font script="Armn" typeface="Arial"/>
-        <a:font script="Bugi" typeface="Leelawadee UI"/>
-        <a:font script="Bopo" typeface="Microsoft JhengHei"/>
-        <a:font script="Java" typeface="Javanese Text"/>
-        <a:font script="Lisu" typeface="Segoe UI"/>
-        <a:font script="Mymr" typeface="Myanmar Text"/>
-        <a:font script="Nkoo" typeface="Ebrima"/>
-        <a:font script="Olck" typeface="Nirmala UI"/>
-        <a:font script="Osma" typeface="Ebrima"/>
-        <a:font script="Phag" typeface="Phagspa"/>
-        <a:font script="Syrn" typeface="Estrangelo Edessa"/>
-        <a:font script="Syrj" typeface="Estrangelo Edessa"/>
-        <a:font script="Syre" typeface="Estrangelo Edessa"/>
-        <a:font script="Sora" typeface="Nirmala UI"/>
-        <a:font script="Tale" typeface="Microsoft Tai Le"/>
-        <a:font script="Talu" typeface="Microsoft New Tai Lue"/>
-        <a:font script="Tfng" typeface="Ebrima"/>
       </a:majorFont>
       <a:minorFont>
-        <a:latin typeface="Aptos" panose="02110004020202020204"/>
+        <a:latin typeface="Calibri" panose="020F0502020204030204"/>
         <a:ea typeface=""/>
         <a:cs typeface=""/>
         <a:font script="Jpan" typeface="游ゴシック"/>
@@ -3512,26 +4754,9 @@
         <a:font script="Viet" typeface="Arial"/>
         <a:font script="Uigh" typeface="Microsoft Uighur"/>
         <a:font script="Geor" typeface="Sylfaen"/>
-        <a:font script="Armn" typeface="Arial"/>
-        <a:font script="Bugi" typeface="Leelawadee UI"/>
-        <a:font script="Bopo" typeface="Microsoft JhengHei"/>
-        <a:font script="Java" typeface="Javanese Text"/>
-        <a:font script="Lisu" typeface="Segoe UI"/>
-        <a:font script="Mymr" typeface="Myanmar Text"/>
-        <a:font script="Nkoo" typeface="Ebrima"/>
-        <a:font script="Olck" typeface="Nirmala UI"/>
-        <a:font script="Osma" typeface="Ebrima"/>
-        <a:font script="Phag" typeface="Phagspa"/>
-        <a:font script="Syrn" typeface="Estrangelo Edessa"/>
-        <a:font script="Syrj" typeface="Estrangelo Edessa"/>
-        <a:font script="Syre" typeface="Estrangelo Edessa"/>
-        <a:font script="Sora" typeface="Nirmala UI"/>
-        <a:font script="Tale" typeface="Microsoft Tai Le"/>
-        <a:font script="Talu" typeface="Microsoft New Tai Lue"/>
-        <a:font script="Tfng" typeface="Ebrima"/>
       </a:minorFont>
     </a:fontScheme>
-    <a:fmtScheme name="Office">
+    <a:fmtScheme name="Office 2013 - 2022 Theme">
       <a:fillStyleLst>
         <a:solidFill>
           <a:schemeClr val="phClr"/>
@@ -3590,6 +4815,13 @@
         </a:gradFill>
       </a:fillStyleLst>
       <a:lnStyleLst>
+        <a:ln w="6350" cap="flat" cmpd="sng" algn="ctr">
+          <a:solidFill>
+            <a:schemeClr val="phClr"/>
+          </a:solidFill>
+          <a:prstDash val="solid"/>
+          <a:miter lim="800000"/>
+        </a:ln>
         <a:ln w="12700" cap="flat" cmpd="sng" algn="ctr">
           <a:solidFill>
             <a:schemeClr val="phClr"/>
@@ -3598,13 +4830,6 @@
           <a:miter lim="800000"/>
         </a:ln>
         <a:ln w="19050" cap="flat" cmpd="sng" algn="ctr">
-          <a:solidFill>
-            <a:schemeClr val="phClr"/>
-          </a:solidFill>
-          <a:prstDash val="solid"/>
-          <a:miter lim="800000"/>
-        </a:ln>
-        <a:ln w="25400" cap="flat" cmpd="sng" algn="ctr">
           <a:solidFill>
             <a:schemeClr val="phClr"/>
           </a:solidFill>
@@ -3669,31 +4894,11 @@
       </a:bgFillStyleLst>
     </a:fmtScheme>
   </a:themeElements>
-  <a:objectDefaults>
-    <a:lnDef>
-      <a:spPr/>
-      <a:bodyPr/>
-      <a:lstStyle/>
-      <a:style>
-        <a:lnRef idx="2">
-          <a:schemeClr val="accent1"/>
-        </a:lnRef>
-        <a:fillRef idx="0">
-          <a:schemeClr val="accent1"/>
-        </a:fillRef>
-        <a:effectRef idx="1">
-          <a:schemeClr val="accent1"/>
-        </a:effectRef>
-        <a:fontRef idx="minor">
-          <a:schemeClr val="tx1"/>
-        </a:fontRef>
-      </a:style>
-    </a:lnDef>
-  </a:objectDefaults>
+  <a:objectDefaults/>
   <a:extraClrSchemeLst/>
   <a:extLst>
     <a:ext uri="{05A4C25C-085E-4340-85A3-A5531E510DB2}">
-      <thm15:themeFamily xmlns:thm15="http://schemas.microsoft.com/office/thememl/2012/main" name="Office Theme" id="{2E142A2C-CD16-42D6-873A-C26D2A0506FA}" vid="{1BDDFF52-6CD6-40A5-AB3C-68EB2F1E4D0A}"/>
+      <thm15:themeFamily xmlns:thm15="http://schemas.microsoft.com/office/thememl/2012/main" name="Office 2013 - 2022 Theme" id="{62F939B6-93AF-4DB8-9C6B-D6C7DFDC589F}" vid="{AE6F2518-B084-4896-AF52-66CC2144AA26}"/>
     </a:ext>
   </a:extLst>
 </a:theme>

</xml_diff>

<commit_message>
added optics slides and optics code and exploratory data analysis
</commit_message>
<xml_diff>
--- a/data-science-final-projects.pptx
+++ b/data-science-final-projects.pptx
@@ -8,15 +8,23 @@
     <p:sldId id="256" r:id="rId2"/>
     <p:sldId id="257" r:id="rId3"/>
     <p:sldId id="258" r:id="rId4"/>
-    <p:sldId id="259" r:id="rId5"/>
-    <p:sldId id="260" r:id="rId6"/>
-    <p:sldId id="263" r:id="rId7"/>
-    <p:sldId id="264" r:id="rId8"/>
-    <p:sldId id="265" r:id="rId9"/>
-    <p:sldId id="266" r:id="rId10"/>
-    <p:sldId id="267" r:id="rId11"/>
-    <p:sldId id="268" r:id="rId12"/>
-    <p:sldId id="261" r:id="rId13"/>
+    <p:sldId id="270" r:id="rId5"/>
+    <p:sldId id="271" r:id="rId6"/>
+    <p:sldId id="272" r:id="rId7"/>
+    <p:sldId id="273" r:id="rId8"/>
+    <p:sldId id="274" r:id="rId9"/>
+    <p:sldId id="259" r:id="rId10"/>
+    <p:sldId id="260" r:id="rId11"/>
+    <p:sldId id="263" r:id="rId12"/>
+    <p:sldId id="264" r:id="rId13"/>
+    <p:sldId id="265" r:id="rId14"/>
+    <p:sldId id="266" r:id="rId15"/>
+    <p:sldId id="267" r:id="rId16"/>
+    <p:sldId id="268" r:id="rId17"/>
+    <p:sldId id="261" r:id="rId18"/>
+    <p:sldId id="269" r:id="rId19"/>
+    <p:sldId id="275" r:id="rId20"/>
+    <p:sldId id="276" r:id="rId21"/>
   </p:sldIdLst>
   <p:sldSz cx="12192000" cy="6858000"/>
   <p:notesSz cx="6858000" cy="9144000"/>
@@ -3081,6 +3089,895 @@
           <a:chExt cx="0" cy="0"/>
         </a:xfrm>
       </p:grpSpPr>
+      <p:sp>
+        <p:nvSpPr>
+          <p:cNvPr id="2" name="Title 1">
+            <a:extLst>
+              <a:ext uri="{FF2B5EF4-FFF2-40B4-BE49-F238E27FC236}">
+                <a16:creationId xmlns:a16="http://schemas.microsoft.com/office/drawing/2014/main" id="{843031FD-CC01-AF3F-91D8-C8977338AD35}"/>
+              </a:ext>
+            </a:extLst>
+          </p:cNvPr>
+          <p:cNvSpPr>
+            <a:spLocks noGrp="1"/>
+          </p:cNvSpPr>
+          <p:nvPr>
+            <p:ph type="title"/>
+          </p:nvPr>
+        </p:nvSpPr>
+        <p:spPr/>
+        <p:txBody>
+          <a:bodyPr/>
+          <a:lstStyle/>
+          <a:p>
+            <a:r>
+              <a:rPr lang="en-US" dirty="0"/>
+              <a:t>Predicting Star Types using K-Nearest Neighbor model (KNN)</a:t>
+            </a:r>
+          </a:p>
+        </p:txBody>
+      </p:sp>
+      <p:sp>
+        <p:nvSpPr>
+          <p:cNvPr id="3" name="Text Placeholder 2">
+            <a:extLst>
+              <a:ext uri="{FF2B5EF4-FFF2-40B4-BE49-F238E27FC236}">
+                <a16:creationId xmlns:a16="http://schemas.microsoft.com/office/drawing/2014/main" id="{4BA057B9-C75F-5F81-D8A7-0B9D28816795}"/>
+              </a:ext>
+            </a:extLst>
+          </p:cNvPr>
+          <p:cNvSpPr>
+            <a:spLocks noGrp="1"/>
+          </p:cNvSpPr>
+          <p:nvPr>
+            <p:ph type="body" idx="1"/>
+          </p:nvPr>
+        </p:nvSpPr>
+        <p:spPr/>
+        <p:txBody>
+          <a:bodyPr/>
+          <a:lstStyle/>
+          <a:p>
+            <a:endParaRPr lang="en-US" dirty="0"/>
+          </a:p>
+        </p:txBody>
+      </p:sp>
+    </p:spTree>
+    <p:extLst>
+      <p:ext uri="{BB962C8B-B14F-4D97-AF65-F5344CB8AC3E}">
+        <p14:creationId xmlns:p14="http://schemas.microsoft.com/office/powerpoint/2010/main" val="2877514114"/>
+      </p:ext>
+    </p:extLst>
+  </p:cSld>
+  <p:clrMapOvr>
+    <a:masterClrMapping/>
+  </p:clrMapOvr>
+</p:sld>
+</file>
+
+<file path=ppt/slides/slide11.xml><?xml version="1.0" encoding="utf-8"?>
+<p:sld xmlns:a="http://schemas.openxmlformats.org/drawingml/2006/main" xmlns:r="http://schemas.openxmlformats.org/officeDocument/2006/relationships" xmlns:p="http://schemas.openxmlformats.org/presentationml/2006/main">
+  <p:cSld>
+    <p:bg>
+      <p:bgPr>
+        <a:solidFill>
+          <a:schemeClr val="bg1"/>
+        </a:solidFill>
+        <a:effectLst/>
+      </p:bgPr>
+    </p:bg>
+    <p:spTree>
+      <p:nvGrpSpPr>
+        <p:cNvPr id="1" name=""/>
+        <p:cNvGrpSpPr/>
+        <p:nvPr/>
+      </p:nvGrpSpPr>
+      <p:grpSpPr>
+        <a:xfrm>
+          <a:off x="0" y="0"/>
+          <a:ext cx="0" cy="0"/>
+          <a:chOff x="0" y="0"/>
+          <a:chExt cx="0" cy="0"/>
+        </a:xfrm>
+      </p:grpSpPr>
+      <p:sp>
+        <p:nvSpPr>
+          <p:cNvPr id="11" name="Down Arrow 7">
+            <a:extLst>
+              <a:ext uri="{FF2B5EF4-FFF2-40B4-BE49-F238E27FC236}">
+                <a16:creationId xmlns:a16="http://schemas.microsoft.com/office/drawing/2014/main" id="{D4771268-CB57-404A-9271-370EB28F6090}"/>
+              </a:ext>
+              <a:ext uri="{C183D7F6-B498-43B3-948B-1728B52AA6E4}">
+                <adec:decorative xmlns:adec="http://schemas.microsoft.com/office/drawing/2017/decorative" val="1"/>
+              </a:ext>
+            </a:extLst>
+          </p:cNvPr>
+          <p:cNvSpPr>
+            <a:spLocks noGrp="1" noRot="1" noChangeAspect="1" noMove="1" noResize="1" noEditPoints="1" noAdjustHandles="1" noChangeArrowheads="1" noChangeShapeType="1" noTextEdit="1"/>
+          </p:cNvSpPr>
+          <p:nvPr>
+            <p:extLst>
+              <p:ext uri="{386F3935-93C4-4BCD-93E2-E3B085C9AB24}">
+                <p16:designElem xmlns:p16="http://schemas.microsoft.com/office/powerpoint/2015/main" val="1"/>
+              </p:ext>
+            </p:extLst>
+          </p:nvPr>
+        </p:nvSpPr>
+        <p:spPr>
+          <a:xfrm rot="16200000">
+            <a:off x="800100" y="1491343"/>
+            <a:ext cx="3333749" cy="3499103"/>
+          </a:xfrm>
+          <a:prstGeom prst="downArrow">
+            <a:avLst>
+              <a:gd name="adj1" fmla="val 100000"/>
+              <a:gd name="adj2" fmla="val 15788"/>
+            </a:avLst>
+          </a:prstGeom>
+          <a:solidFill>
+            <a:srgbClr val="404040"/>
+          </a:solidFill>
+          <a:ln w="53975">
+            <a:noFill/>
+          </a:ln>
+        </p:spPr>
+        <p:style>
+          <a:lnRef idx="2">
+            <a:schemeClr val="accent1">
+              <a:shade val="50000"/>
+            </a:schemeClr>
+          </a:lnRef>
+          <a:fillRef idx="1">
+            <a:schemeClr val="accent1"/>
+          </a:fillRef>
+          <a:effectRef idx="0">
+            <a:schemeClr val="accent1"/>
+          </a:effectRef>
+          <a:fontRef idx="minor">
+            <a:schemeClr val="lt1"/>
+          </a:fontRef>
+        </p:style>
+        <p:txBody>
+          <a:bodyPr rtlCol="0" anchor="ctr"/>
+          <a:lstStyle/>
+          <a:p>
+            <a:pPr algn="ctr"/>
+            <a:endParaRPr lang="en-US"/>
+          </a:p>
+        </p:txBody>
+      </p:sp>
+      <p:sp>
+        <p:nvSpPr>
+          <p:cNvPr id="2" name="Title 1">
+            <a:extLst>
+              <a:ext uri="{FF2B5EF4-FFF2-40B4-BE49-F238E27FC236}">
+                <a16:creationId xmlns:a16="http://schemas.microsoft.com/office/drawing/2014/main" id="{4D232782-94D6-3226-49ED-8CF6B5D0D8A1}"/>
+              </a:ext>
+            </a:extLst>
+          </p:cNvPr>
+          <p:cNvSpPr>
+            <a:spLocks noGrp="1"/>
+          </p:cNvSpPr>
+          <p:nvPr>
+            <p:ph type="title"/>
+          </p:nvPr>
+        </p:nvSpPr>
+        <p:spPr>
+          <a:xfrm>
+            <a:off x="1028700" y="1967266"/>
+            <a:ext cx="2628900" cy="2547257"/>
+          </a:xfrm>
+          <a:noFill/>
+        </p:spPr>
+        <p:txBody>
+          <a:bodyPr vert="horz" lIns="91440" tIns="45720" rIns="91440" bIns="45720" rtlCol="0" anchor="ctr">
+            <a:normAutofit/>
+          </a:bodyPr>
+          <a:lstStyle/>
+          <a:p>
+            <a:pPr algn="ctr"/>
+            <a:r>
+              <a:rPr lang="en-US" sz="3600" kern="1200">
+                <a:solidFill>
+                  <a:srgbClr val="FFFFFF"/>
+                </a:solidFill>
+                <a:latin typeface="+mj-lt"/>
+                <a:ea typeface="+mj-ea"/>
+                <a:cs typeface="+mj-cs"/>
+              </a:rPr>
+              <a:t>Code</a:t>
+            </a:r>
+          </a:p>
+        </p:txBody>
+      </p:sp>
+      <p:pic>
+        <p:nvPicPr>
+          <p:cNvPr id="6" name="Content Placeholder 5" descr="A screenshot of a computer program&#10;&#10;AI-generated content may be incorrect.">
+            <a:extLst>
+              <a:ext uri="{FF2B5EF4-FFF2-40B4-BE49-F238E27FC236}">
+                <a16:creationId xmlns:a16="http://schemas.microsoft.com/office/drawing/2014/main" id="{86D0587C-6590-4605-1667-9AF0D626A850}"/>
+              </a:ext>
+            </a:extLst>
+          </p:cNvPr>
+          <p:cNvPicPr>
+            <a:picLocks noGrp="1" noChangeAspect="1"/>
+          </p:cNvPicPr>
+          <p:nvPr>
+            <p:ph idx="1"/>
+          </p:nvPr>
+        </p:nvPicPr>
+        <p:blipFill>
+          <a:blip r:embed="rId2"/>
+          <a:stretch>
+            <a:fillRect/>
+          </a:stretch>
+        </p:blipFill>
+        <p:spPr>
+          <a:xfrm>
+            <a:off x="5533395" y="356641"/>
+            <a:ext cx="5092561" cy="5003441"/>
+          </a:xfrm>
+          <a:prstGeom prst="rect">
+            <a:avLst/>
+          </a:prstGeom>
+        </p:spPr>
+      </p:pic>
+      <p:pic>
+        <p:nvPicPr>
+          <p:cNvPr id="8" name="Picture 7" descr="A white background with red and green text&#10;&#10;AI-generated content may be incorrect.">
+            <a:extLst>
+              <a:ext uri="{FF2B5EF4-FFF2-40B4-BE49-F238E27FC236}">
+                <a16:creationId xmlns:a16="http://schemas.microsoft.com/office/drawing/2014/main" id="{246DB88E-5C4F-B119-AE99-42C704AE07CA}"/>
+              </a:ext>
+            </a:extLst>
+          </p:cNvPr>
+          <p:cNvPicPr>
+            <a:picLocks noChangeAspect="1"/>
+          </p:cNvPicPr>
+          <p:nvPr/>
+        </p:nvPicPr>
+        <p:blipFill>
+          <a:blip r:embed="rId3"/>
+          <a:stretch>
+            <a:fillRect/>
+          </a:stretch>
+        </p:blipFill>
+        <p:spPr>
+          <a:xfrm>
+            <a:off x="5533395" y="5360082"/>
+            <a:ext cx="5092561" cy="676899"/>
+          </a:xfrm>
+          <a:prstGeom prst="rect">
+            <a:avLst/>
+          </a:prstGeom>
+        </p:spPr>
+      </p:pic>
+    </p:spTree>
+    <p:extLst>
+      <p:ext uri="{BB962C8B-B14F-4D97-AF65-F5344CB8AC3E}">
+        <p14:creationId xmlns:p14="http://schemas.microsoft.com/office/powerpoint/2010/main" val="1983819204"/>
+      </p:ext>
+    </p:extLst>
+  </p:cSld>
+  <p:clrMapOvr>
+    <a:masterClrMapping/>
+  </p:clrMapOvr>
+</p:sld>
+</file>
+
+<file path=ppt/slides/slide12.xml><?xml version="1.0" encoding="utf-8"?>
+<p:sld xmlns:a="http://schemas.openxmlformats.org/drawingml/2006/main" xmlns:r="http://schemas.openxmlformats.org/officeDocument/2006/relationships" xmlns:p="http://schemas.openxmlformats.org/presentationml/2006/main">
+  <p:cSld>
+    <p:bg>
+      <p:bgPr>
+        <a:solidFill>
+          <a:schemeClr val="bg1"/>
+        </a:solidFill>
+        <a:effectLst/>
+      </p:bgPr>
+    </p:bg>
+    <p:spTree>
+      <p:nvGrpSpPr>
+        <p:cNvPr id="1" name=""/>
+        <p:cNvGrpSpPr/>
+        <p:nvPr/>
+      </p:nvGrpSpPr>
+      <p:grpSpPr>
+        <a:xfrm>
+          <a:off x="0" y="0"/>
+          <a:ext cx="0" cy="0"/>
+          <a:chOff x="0" y="0"/>
+          <a:chExt cx="0" cy="0"/>
+        </a:xfrm>
+      </p:grpSpPr>
+      <p:sp>
+        <p:nvSpPr>
+          <p:cNvPr id="24" name="Rectangle 23">
+            <a:extLst>
+              <a:ext uri="{FF2B5EF4-FFF2-40B4-BE49-F238E27FC236}">
+                <a16:creationId xmlns:a16="http://schemas.microsoft.com/office/drawing/2014/main" id="{32BC26D8-82FB-445E-AA49-62A77D7C1EE0}"/>
+              </a:ext>
+              <a:ext uri="{C183D7F6-B498-43B3-948B-1728B52AA6E4}">
+                <adec:decorative xmlns:adec="http://schemas.microsoft.com/office/drawing/2017/decorative" val="1"/>
+              </a:ext>
+            </a:extLst>
+          </p:cNvPr>
+          <p:cNvSpPr>
+            <a:spLocks noGrp="1" noRot="1" noChangeAspect="1" noMove="1" noResize="1" noEditPoints="1" noAdjustHandles="1" noChangeArrowheads="1" noChangeShapeType="1" noTextEdit="1"/>
+          </p:cNvSpPr>
+          <p:nvPr>
+            <p:extLst>
+              <p:ext uri="{386F3935-93C4-4BCD-93E2-E3B085C9AB24}">
+                <p16:designElem xmlns:p16="http://schemas.microsoft.com/office/powerpoint/2015/main" val="1"/>
+              </p:ext>
+            </p:extLst>
+          </p:nvPr>
+        </p:nvSpPr>
+        <p:spPr>
+          <a:xfrm>
+            <a:off x="0" y="0"/>
+            <a:ext cx="12192000" cy="6858000"/>
+          </a:xfrm>
+          <a:prstGeom prst="rect">
+            <a:avLst/>
+          </a:prstGeom>
+          <a:solidFill>
+            <a:srgbClr val="465235"/>
+          </a:solidFill>
+          <a:ln>
+            <a:noFill/>
+          </a:ln>
+        </p:spPr>
+        <p:style>
+          <a:lnRef idx="2">
+            <a:schemeClr val="accent1">
+              <a:shade val="50000"/>
+            </a:schemeClr>
+          </a:lnRef>
+          <a:fillRef idx="1">
+            <a:schemeClr val="accent1"/>
+          </a:fillRef>
+          <a:effectRef idx="0">
+            <a:schemeClr val="accent1"/>
+          </a:effectRef>
+          <a:fontRef idx="minor">
+            <a:schemeClr val="lt1"/>
+          </a:fontRef>
+        </p:style>
+        <p:txBody>
+          <a:bodyPr rtlCol="0" anchor="ctr"/>
+          <a:lstStyle/>
+          <a:p>
+            <a:pPr algn="ctr"/>
+            <a:endParaRPr lang="en-US"/>
+          </a:p>
+        </p:txBody>
+      </p:sp>
+      <p:sp>
+        <p:nvSpPr>
+          <p:cNvPr id="23" name="Rectangle 22">
+            <a:extLst>
+              <a:ext uri="{FF2B5EF4-FFF2-40B4-BE49-F238E27FC236}">
+                <a16:creationId xmlns:a16="http://schemas.microsoft.com/office/drawing/2014/main" id="{CB44330D-EA18-4254-AA95-EB49948539B8}"/>
+              </a:ext>
+              <a:ext uri="{C183D7F6-B498-43B3-948B-1728B52AA6E4}">
+                <adec:decorative xmlns:adec="http://schemas.microsoft.com/office/drawing/2017/decorative" val="1"/>
+              </a:ext>
+            </a:extLst>
+          </p:cNvPr>
+          <p:cNvSpPr>
+            <a:spLocks noGrp="1" noRot="1" noChangeAspect="1" noMove="1" noResize="1" noEditPoints="1" noAdjustHandles="1" noChangeArrowheads="1" noChangeShapeType="1" noTextEdit="1"/>
+          </p:cNvSpPr>
+          <p:nvPr>
+            <p:extLst>
+              <p:ext uri="{386F3935-93C4-4BCD-93E2-E3B085C9AB24}">
+                <p16:designElem xmlns:p16="http://schemas.microsoft.com/office/powerpoint/2015/main" val="1"/>
+              </p:ext>
+            </p:extLst>
+          </p:nvPr>
+        </p:nvSpPr>
+        <p:spPr>
+          <a:xfrm>
+            <a:off x="477012" y="480060"/>
+            <a:ext cx="11237976" cy="5897880"/>
+          </a:xfrm>
+          <a:prstGeom prst="rect">
+            <a:avLst/>
+          </a:prstGeom>
+          <a:solidFill>
+            <a:srgbClr val="FFFFFF"/>
+          </a:solidFill>
+          <a:ln>
+            <a:noFill/>
+          </a:ln>
+        </p:spPr>
+        <p:style>
+          <a:lnRef idx="2">
+            <a:schemeClr val="accent1">
+              <a:shade val="50000"/>
+            </a:schemeClr>
+          </a:lnRef>
+          <a:fillRef idx="1">
+            <a:schemeClr val="accent1"/>
+          </a:fillRef>
+          <a:effectRef idx="0">
+            <a:schemeClr val="accent1"/>
+          </a:effectRef>
+          <a:fontRef idx="minor">
+            <a:schemeClr val="lt1"/>
+          </a:fontRef>
+        </p:style>
+        <p:txBody>
+          <a:bodyPr rtlCol="0" anchor="ctr"/>
+          <a:lstStyle/>
+          <a:p>
+            <a:pPr algn="ctr"/>
+            <a:endParaRPr lang="en-US"/>
+          </a:p>
+        </p:txBody>
+      </p:sp>
+      <p:pic>
+        <p:nvPicPr>
+          <p:cNvPr id="9" name="Picture 8" descr="A screenshot of a graph&#10;&#10;AI-generated content may be incorrect.">
+            <a:extLst>
+              <a:ext uri="{FF2B5EF4-FFF2-40B4-BE49-F238E27FC236}">
+                <a16:creationId xmlns:a16="http://schemas.microsoft.com/office/drawing/2014/main" id="{70504723-4847-B279-DB59-39EF153D13EA}"/>
+              </a:ext>
+            </a:extLst>
+          </p:cNvPr>
+          <p:cNvPicPr>
+            <a:picLocks noChangeAspect="1"/>
+          </p:cNvPicPr>
+          <p:nvPr/>
+        </p:nvPicPr>
+        <p:blipFill>
+          <a:blip r:embed="rId2"/>
+          <a:stretch>
+            <a:fillRect/>
+          </a:stretch>
+        </p:blipFill>
+        <p:spPr>
+          <a:xfrm>
+            <a:off x="1922917" y="643467"/>
+            <a:ext cx="8346165" cy="5571066"/>
+          </a:xfrm>
+          <a:prstGeom prst="rect">
+            <a:avLst/>
+          </a:prstGeom>
+        </p:spPr>
+      </p:pic>
+      <p:sp>
+        <p:nvSpPr>
+          <p:cNvPr id="4" name="AutoShape 2">
+            <a:extLst>
+              <a:ext uri="{FF2B5EF4-FFF2-40B4-BE49-F238E27FC236}">
+                <a16:creationId xmlns:a16="http://schemas.microsoft.com/office/drawing/2014/main" id="{69A3A004-2FCC-A839-4F4D-82CD19D0475B}"/>
+              </a:ext>
+            </a:extLst>
+          </p:cNvPr>
+          <p:cNvSpPr>
+            <a:spLocks noChangeAspect="1" noChangeArrowheads="1"/>
+          </p:cNvSpPr>
+          <p:nvPr/>
+        </p:nvSpPr>
+        <p:spPr bwMode="auto">
+          <a:xfrm>
+            <a:off x="2564524" y="-102476"/>
+            <a:ext cx="3683876" cy="3683876"/>
+          </a:xfrm>
+          <a:prstGeom prst="rect">
+            <a:avLst/>
+          </a:prstGeom>
+          <a:noFill/>
+          <a:extLst>
+            <a:ext uri="{909E8E84-426E-40DD-AFC4-6F175D3DCCD1}">
+              <a14:hiddenFill xmlns:a14="http://schemas.microsoft.com/office/drawing/2010/main">
+                <a:solidFill>
+                  <a:srgbClr val="FFFFFF"/>
+                </a:solidFill>
+              </a14:hiddenFill>
+            </a:ext>
+          </a:extLst>
+        </p:spPr>
+        <p:txBody>
+          <a:bodyPr vert="horz" wrap="square" lIns="91440" tIns="45720" rIns="91440" bIns="45720" numCol="1" anchor="t" anchorCtr="0" compatLnSpc="1">
+            <a:prstTxWarp prst="textNoShape">
+              <a:avLst/>
+            </a:prstTxWarp>
+          </a:bodyPr>
+          <a:lstStyle/>
+          <a:p>
+            <a:endParaRPr lang="en-US"/>
+          </a:p>
+        </p:txBody>
+      </p:sp>
+      <p:sp>
+        <p:nvSpPr>
+          <p:cNvPr id="7" name="AutoShape 4">
+            <a:extLst>
+              <a:ext uri="{FF2B5EF4-FFF2-40B4-BE49-F238E27FC236}">
+                <a16:creationId xmlns:a16="http://schemas.microsoft.com/office/drawing/2014/main" id="{3DA6D3CD-0363-BB44-5B18-5AE58A0421CD}"/>
+              </a:ext>
+            </a:extLst>
+          </p:cNvPr>
+          <p:cNvSpPr>
+            <a:spLocks noChangeAspect="1" noChangeArrowheads="1"/>
+          </p:cNvSpPr>
+          <p:nvPr/>
+        </p:nvSpPr>
+        <p:spPr bwMode="auto">
+          <a:xfrm>
+            <a:off x="5943600" y="3276600"/>
+            <a:ext cx="304800" cy="304800"/>
+          </a:xfrm>
+          <a:prstGeom prst="rect">
+            <a:avLst/>
+          </a:prstGeom>
+          <a:noFill/>
+          <a:extLst>
+            <a:ext uri="{909E8E84-426E-40DD-AFC4-6F175D3DCCD1}">
+              <a14:hiddenFill xmlns:a14="http://schemas.microsoft.com/office/drawing/2010/main">
+                <a:solidFill>
+                  <a:srgbClr val="FFFFFF"/>
+                </a:solidFill>
+              </a14:hiddenFill>
+            </a:ext>
+          </a:extLst>
+        </p:spPr>
+        <p:txBody>
+          <a:bodyPr vert="horz" wrap="square" lIns="91440" tIns="45720" rIns="91440" bIns="45720" numCol="1" anchor="t" anchorCtr="0" compatLnSpc="1">
+            <a:prstTxWarp prst="textNoShape">
+              <a:avLst/>
+            </a:prstTxWarp>
+          </a:bodyPr>
+          <a:lstStyle/>
+          <a:p>
+            <a:endParaRPr lang="en-US"/>
+          </a:p>
+        </p:txBody>
+      </p:sp>
+    </p:spTree>
+    <p:extLst>
+      <p:ext uri="{BB962C8B-B14F-4D97-AF65-F5344CB8AC3E}">
+        <p14:creationId xmlns:p14="http://schemas.microsoft.com/office/powerpoint/2010/main" val="2446726839"/>
+      </p:ext>
+    </p:extLst>
+  </p:cSld>
+  <p:clrMapOvr>
+    <a:masterClrMapping/>
+  </p:clrMapOvr>
+</p:sld>
+</file>
+
+<file path=ppt/slides/slide13.xml><?xml version="1.0" encoding="utf-8"?>
+<p:sld xmlns:a="http://schemas.openxmlformats.org/drawingml/2006/main" xmlns:r="http://schemas.openxmlformats.org/officeDocument/2006/relationships" xmlns:p="http://schemas.openxmlformats.org/presentationml/2006/main">
+  <p:cSld>
+    <p:spTree>
+      <p:nvGrpSpPr>
+        <p:cNvPr id="1" name=""/>
+        <p:cNvGrpSpPr/>
+        <p:nvPr/>
+      </p:nvGrpSpPr>
+      <p:grpSpPr>
+        <a:xfrm>
+          <a:off x="0" y="0"/>
+          <a:ext cx="0" cy="0"/>
+          <a:chOff x="0" y="0"/>
+          <a:chExt cx="0" cy="0"/>
+        </a:xfrm>
+      </p:grpSpPr>
+      <p:pic>
+        <p:nvPicPr>
+          <p:cNvPr id="6" name="Picture 5" descr="A screenshot of a computer program&#10;&#10;AI-generated content may be incorrect.">
+            <a:extLst>
+              <a:ext uri="{FF2B5EF4-FFF2-40B4-BE49-F238E27FC236}">
+                <a16:creationId xmlns:a16="http://schemas.microsoft.com/office/drawing/2014/main" id="{CA0D0AB7-2806-F5F3-AB0D-DAE25B3E49D7}"/>
+              </a:ext>
+            </a:extLst>
+          </p:cNvPr>
+          <p:cNvPicPr>
+            <a:picLocks noChangeAspect="1"/>
+          </p:cNvPicPr>
+          <p:nvPr/>
+        </p:nvPicPr>
+        <p:blipFill>
+          <a:blip r:embed="rId2"/>
+          <a:stretch>
+            <a:fillRect/>
+          </a:stretch>
+        </p:blipFill>
+        <p:spPr>
+          <a:xfrm>
+            <a:off x="387927" y="182416"/>
+            <a:ext cx="5708073" cy="3187696"/>
+          </a:xfrm>
+          <a:prstGeom prst="rect">
+            <a:avLst/>
+          </a:prstGeom>
+          <a:ln>
+            <a:solidFill>
+              <a:srgbClr val="7030A0"/>
+            </a:solidFill>
+            <a:prstDash val="lgDash"/>
+          </a:ln>
+        </p:spPr>
+      </p:pic>
+      <p:pic>
+        <p:nvPicPr>
+          <p:cNvPr id="8" name="Picture 7" descr="A blue and white graph&#10;&#10;AI-generated content may be incorrect.">
+            <a:extLst>
+              <a:ext uri="{FF2B5EF4-FFF2-40B4-BE49-F238E27FC236}">
+                <a16:creationId xmlns:a16="http://schemas.microsoft.com/office/drawing/2014/main" id="{67A3B431-8199-64B7-B948-B245CCB6FB71}"/>
+              </a:ext>
+            </a:extLst>
+          </p:cNvPr>
+          <p:cNvPicPr>
+            <a:picLocks noChangeAspect="1"/>
+          </p:cNvPicPr>
+          <p:nvPr/>
+        </p:nvPicPr>
+        <p:blipFill>
+          <a:blip r:embed="rId3"/>
+          <a:stretch>
+            <a:fillRect/>
+          </a:stretch>
+        </p:blipFill>
+        <p:spPr>
+          <a:xfrm>
+            <a:off x="6769684" y="182416"/>
+            <a:ext cx="4535626" cy="3023752"/>
+          </a:xfrm>
+          <a:prstGeom prst="rect">
+            <a:avLst/>
+          </a:prstGeom>
+          <a:ln w="38100">
+            <a:solidFill>
+              <a:schemeClr val="tx1"/>
+            </a:solidFill>
+          </a:ln>
+        </p:spPr>
+      </p:pic>
+      <p:pic>
+        <p:nvPicPr>
+          <p:cNvPr id="10" name="Picture 9" descr="A diagram of a graph&#10;&#10;AI-generated content may be incorrect.">
+            <a:extLst>
+              <a:ext uri="{FF2B5EF4-FFF2-40B4-BE49-F238E27FC236}">
+                <a16:creationId xmlns:a16="http://schemas.microsoft.com/office/drawing/2014/main" id="{9AE9C298-A721-DA02-D62C-A3BF0E745F2A}"/>
+              </a:ext>
+            </a:extLst>
+          </p:cNvPr>
+          <p:cNvPicPr>
+            <a:picLocks noChangeAspect="1"/>
+          </p:cNvPicPr>
+          <p:nvPr/>
+        </p:nvPicPr>
+        <p:blipFill>
+          <a:blip r:embed="rId4"/>
+          <a:stretch>
+            <a:fillRect/>
+          </a:stretch>
+        </p:blipFill>
+        <p:spPr>
+          <a:xfrm>
+            <a:off x="6769684" y="3560627"/>
+            <a:ext cx="4535626" cy="3023751"/>
+          </a:xfrm>
+          <a:prstGeom prst="rect">
+            <a:avLst/>
+          </a:prstGeom>
+          <a:ln w="38100">
+            <a:solidFill>
+              <a:schemeClr val="tx1"/>
+            </a:solidFill>
+          </a:ln>
+        </p:spPr>
+      </p:pic>
+      <p:sp>
+        <p:nvSpPr>
+          <p:cNvPr id="11" name="TextBox 10">
+            <a:extLst>
+              <a:ext uri="{FF2B5EF4-FFF2-40B4-BE49-F238E27FC236}">
+                <a16:creationId xmlns:a16="http://schemas.microsoft.com/office/drawing/2014/main" id="{031A4306-79BD-7FBC-2973-91B4FF8600D1}"/>
+              </a:ext>
+            </a:extLst>
+          </p:cNvPr>
+          <p:cNvSpPr txBox="1"/>
+          <p:nvPr/>
+        </p:nvSpPr>
+        <p:spPr>
+          <a:xfrm>
+            <a:off x="387928" y="3985170"/>
+            <a:ext cx="5708072" cy="1938992"/>
+          </a:xfrm>
+          <a:prstGeom prst="rect">
+            <a:avLst/>
+          </a:prstGeom>
+          <a:solidFill>
+            <a:schemeClr val="accent2"/>
+          </a:solidFill>
+        </p:spPr>
+        <p:txBody>
+          <a:bodyPr wrap="square" rtlCol="0">
+            <a:spAutoFit/>
+          </a:bodyPr>
+          <a:lstStyle/>
+          <a:p>
+            <a:pPr algn="ctr"/>
+            <a:r>
+              <a:rPr lang="en-US" sz="4000" b="1" dirty="0"/>
+              <a:t>Initial Experiment with K=5 with split train/test (80/20)</a:t>
+            </a:r>
+          </a:p>
+        </p:txBody>
+      </p:sp>
+    </p:spTree>
+    <p:extLst>
+      <p:ext uri="{BB962C8B-B14F-4D97-AF65-F5344CB8AC3E}">
+        <p14:creationId xmlns:p14="http://schemas.microsoft.com/office/powerpoint/2010/main" val="2743876708"/>
+      </p:ext>
+    </p:extLst>
+  </p:cSld>
+  <p:clrMapOvr>
+    <a:masterClrMapping/>
+  </p:clrMapOvr>
+</p:sld>
+</file>
+
+<file path=ppt/slides/slide14.xml><?xml version="1.0" encoding="utf-8"?>
+<p:sld xmlns:a="http://schemas.openxmlformats.org/drawingml/2006/main" xmlns:r="http://schemas.openxmlformats.org/officeDocument/2006/relationships" xmlns:p="http://schemas.openxmlformats.org/presentationml/2006/main">
+  <p:cSld>
+    <p:spTree>
+      <p:nvGrpSpPr>
+        <p:cNvPr id="1" name=""/>
+        <p:cNvGrpSpPr/>
+        <p:nvPr/>
+      </p:nvGrpSpPr>
+      <p:grpSpPr>
+        <a:xfrm>
+          <a:off x="0" y="0"/>
+          <a:ext cx="0" cy="0"/>
+          <a:chOff x="0" y="0"/>
+          <a:chExt cx="0" cy="0"/>
+        </a:xfrm>
+      </p:grpSpPr>
+      <p:pic>
+        <p:nvPicPr>
+          <p:cNvPr id="5" name="Picture 4" descr="A table of numbers and letters&#10;&#10;AI-generated content may be incorrect.">
+            <a:extLst>
+              <a:ext uri="{FF2B5EF4-FFF2-40B4-BE49-F238E27FC236}">
+                <a16:creationId xmlns:a16="http://schemas.microsoft.com/office/drawing/2014/main" id="{DE0FE3D7-838F-70A0-7E5E-569460B2FBD6}"/>
+              </a:ext>
+            </a:extLst>
+          </p:cNvPr>
+          <p:cNvPicPr>
+            <a:picLocks noChangeAspect="1"/>
+          </p:cNvPicPr>
+          <p:nvPr/>
+        </p:nvPicPr>
+        <p:blipFill>
+          <a:blip r:embed="rId2"/>
+          <a:stretch>
+            <a:fillRect/>
+          </a:stretch>
+        </p:blipFill>
+        <p:spPr>
+          <a:xfrm>
+            <a:off x="260817" y="64294"/>
+            <a:ext cx="3545251" cy="6729412"/>
+          </a:xfrm>
+          <a:prstGeom prst="rect">
+            <a:avLst/>
+          </a:prstGeom>
+          <a:ln w="38100">
+            <a:solidFill>
+              <a:schemeClr val="tx1"/>
+            </a:solidFill>
+          </a:ln>
+        </p:spPr>
+      </p:pic>
+      <p:pic>
+        <p:nvPicPr>
+          <p:cNvPr id="7" name="Picture 6" descr="A table of numbers and a train&#10;&#10;AI-generated content may be incorrect.">
+            <a:extLst>
+              <a:ext uri="{FF2B5EF4-FFF2-40B4-BE49-F238E27FC236}">
+                <a16:creationId xmlns:a16="http://schemas.microsoft.com/office/drawing/2014/main" id="{7D838CB4-2840-A484-8589-F92CA9501615}"/>
+              </a:ext>
+            </a:extLst>
+          </p:cNvPr>
+          <p:cNvPicPr>
+            <a:picLocks noChangeAspect="1"/>
+          </p:cNvPicPr>
+          <p:nvPr/>
+        </p:nvPicPr>
+        <p:blipFill>
+          <a:blip r:embed="rId3"/>
+          <a:stretch>
+            <a:fillRect/>
+          </a:stretch>
+        </p:blipFill>
+        <p:spPr>
+          <a:xfrm>
+            <a:off x="4050579" y="100727"/>
+            <a:ext cx="3545251" cy="6692980"/>
+          </a:xfrm>
+          <a:prstGeom prst="rect">
+            <a:avLst/>
+          </a:prstGeom>
+          <a:ln w="38100">
+            <a:solidFill>
+              <a:schemeClr val="tx1"/>
+            </a:solidFill>
+          </a:ln>
+        </p:spPr>
+      </p:pic>
+      <p:sp>
+        <p:nvSpPr>
+          <p:cNvPr id="10" name="TextBox 9">
+            <a:extLst>
+              <a:ext uri="{FF2B5EF4-FFF2-40B4-BE49-F238E27FC236}">
+                <a16:creationId xmlns:a16="http://schemas.microsoft.com/office/drawing/2014/main" id="{0C5AEC4A-D94A-6DB4-816B-D59BC171CAA1}"/>
+              </a:ext>
+            </a:extLst>
+          </p:cNvPr>
+          <p:cNvSpPr txBox="1"/>
+          <p:nvPr/>
+        </p:nvSpPr>
+        <p:spPr>
+          <a:xfrm>
+            <a:off x="7983216" y="1246614"/>
+            <a:ext cx="3843338" cy="4401205"/>
+          </a:xfrm>
+          <a:prstGeom prst="rect">
+            <a:avLst/>
+          </a:prstGeom>
+          <a:solidFill>
+            <a:schemeClr val="accent2"/>
+          </a:solidFill>
+        </p:spPr>
+        <p:txBody>
+          <a:bodyPr wrap="square" rtlCol="0">
+            <a:spAutoFit/>
+          </a:bodyPr>
+          <a:lstStyle/>
+          <a:p>
+            <a:pPr algn="ctr"/>
+            <a:r>
+              <a:rPr lang="en-US" sz="4000" b="1" dirty="0"/>
+              <a:t>Ran 94 experiments of KNN models with different K’s ranging from 1 to 94 to observe accuracy</a:t>
+            </a:r>
+          </a:p>
+        </p:txBody>
+      </p:sp>
+    </p:spTree>
+    <p:extLst>
+      <p:ext uri="{BB962C8B-B14F-4D97-AF65-F5344CB8AC3E}">
+        <p14:creationId xmlns:p14="http://schemas.microsoft.com/office/powerpoint/2010/main" val="39558463"/>
+      </p:ext>
+    </p:extLst>
+  </p:cSld>
+  <p:clrMapOvr>
+    <a:masterClrMapping/>
+  </p:clrMapOvr>
+</p:sld>
+</file>
+
+<file path=ppt/slides/slide15.xml><?xml version="1.0" encoding="utf-8"?>
+<p:sld xmlns:a="http://schemas.openxmlformats.org/drawingml/2006/main" xmlns:r="http://schemas.openxmlformats.org/officeDocument/2006/relationships" xmlns:p="http://schemas.openxmlformats.org/presentationml/2006/main">
+  <p:cSld>
+    <p:spTree>
+      <p:nvGrpSpPr>
+        <p:cNvPr id="1" name=""/>
+        <p:cNvGrpSpPr/>
+        <p:nvPr/>
+      </p:nvGrpSpPr>
+      <p:grpSpPr>
+        <a:xfrm>
+          <a:off x="0" y="0"/>
+          <a:ext cx="0" cy="0"/>
+          <a:chOff x="0" y="0"/>
+          <a:chExt cx="0" cy="0"/>
+        </a:xfrm>
+      </p:grpSpPr>
       <p:pic>
         <p:nvPicPr>
           <p:cNvPr id="3" name="Picture 2" descr="A graph with blue and orange lines&#10;&#10;AI-generated content may be incorrect.">
@@ -3129,7 +4026,7 @@
 </p:sld>
 </file>
 
-<file path=ppt/slides/slide11.xml><?xml version="1.0" encoding="utf-8"?>
+<file path=ppt/slides/slide16.xml><?xml version="1.0" encoding="utf-8"?>
 <p:sld xmlns:a="http://schemas.openxmlformats.org/drawingml/2006/main" xmlns:r="http://schemas.openxmlformats.org/officeDocument/2006/relationships" xmlns:p="http://schemas.openxmlformats.org/presentationml/2006/main">
   <p:cSld>
     <p:bg>
@@ -3385,7 +4282,7 @@
 </p:sld>
 </file>
 
-<file path=ppt/slides/slide12.xml><?xml version="1.0" encoding="utf-8"?>
+<file path=ppt/slides/slide17.xml><?xml version="1.0" encoding="utf-8"?>
 <p:sld xmlns:a="http://schemas.openxmlformats.org/drawingml/2006/main" xmlns:r="http://schemas.openxmlformats.org/officeDocument/2006/relationships" xmlns:p="http://schemas.openxmlformats.org/presentationml/2006/main">
   <p:cSld>
     <p:spTree>
@@ -3436,35 +4333,254 @@
           </a:p>
         </p:txBody>
       </p:sp>
-      <p:sp>
-        <p:nvSpPr>
-          <p:cNvPr id="3" name="Text Placeholder 2">
-            <a:extLst>
-              <a:ext uri="{FF2B5EF4-FFF2-40B4-BE49-F238E27FC236}">
-                <a16:creationId xmlns:a16="http://schemas.microsoft.com/office/drawing/2014/main" id="{0EAA43CF-7749-93AA-0369-FF98FCA8F8F1}"/>
-              </a:ext>
-            </a:extLst>
-          </p:cNvPr>
-          <p:cNvSpPr>
-            <a:spLocks noGrp="1"/>
-          </p:cNvSpPr>
-          <p:nvPr>
-            <p:ph type="body" idx="1"/>
-          </p:nvPr>
-        </p:nvSpPr>
-        <p:spPr/>
-        <p:txBody>
-          <a:bodyPr/>
-          <a:lstStyle/>
-          <a:p>
-            <a:endParaRPr lang="en-US"/>
-          </a:p>
-        </p:txBody>
-      </p:sp>
     </p:spTree>
     <p:extLst>
       <p:ext uri="{BB962C8B-B14F-4D97-AF65-F5344CB8AC3E}">
         <p14:creationId xmlns:p14="http://schemas.microsoft.com/office/powerpoint/2010/main" val="1897258499"/>
+      </p:ext>
+    </p:extLst>
+  </p:cSld>
+  <p:clrMapOvr>
+    <a:masterClrMapping/>
+  </p:clrMapOvr>
+</p:sld>
+</file>
+
+<file path=ppt/slides/slide18.xml><?xml version="1.0" encoding="utf-8"?>
+<p:sld xmlns:a="http://schemas.openxmlformats.org/drawingml/2006/main" xmlns:r="http://schemas.openxmlformats.org/officeDocument/2006/relationships" xmlns:p="http://schemas.openxmlformats.org/presentationml/2006/main">
+  <p:cSld>
+    <p:bg>
+      <p:bgPr>
+        <a:solidFill>
+          <a:schemeClr val="bg1"/>
+        </a:solidFill>
+        <a:effectLst/>
+      </p:bgPr>
+    </p:bg>
+    <p:spTree>
+      <p:nvGrpSpPr>
+        <p:cNvPr id="1" name="">
+          <a:extLst>
+            <a:ext uri="{FF2B5EF4-FFF2-40B4-BE49-F238E27FC236}">
+              <a16:creationId xmlns:a16="http://schemas.microsoft.com/office/drawing/2014/main" id="{A4B51BD7-B5CB-A550-5AC7-273092236118}"/>
+            </a:ext>
+          </a:extLst>
+        </p:cNvPr>
+        <p:cNvGrpSpPr/>
+        <p:nvPr/>
+      </p:nvGrpSpPr>
+      <p:grpSpPr>
+        <a:xfrm>
+          <a:off x="0" y="0"/>
+          <a:ext cx="0" cy="0"/>
+          <a:chOff x="0" y="0"/>
+          <a:chExt cx="0" cy="0"/>
+        </a:xfrm>
+      </p:grpSpPr>
+      <p:sp>
+        <p:nvSpPr>
+          <p:cNvPr id="11" name="Down Arrow 7">
+            <a:extLst>
+              <a:ext uri="{FF2B5EF4-FFF2-40B4-BE49-F238E27FC236}">
+                <a16:creationId xmlns:a16="http://schemas.microsoft.com/office/drawing/2014/main" id="{71B62BE2-F600-0B03-1C39-6A30920330D2}"/>
+              </a:ext>
+              <a:ext uri="{C183D7F6-B498-43B3-948B-1728B52AA6E4}">
+                <adec:decorative xmlns:adec="http://schemas.microsoft.com/office/drawing/2017/decorative" val="1"/>
+              </a:ext>
+            </a:extLst>
+          </p:cNvPr>
+          <p:cNvSpPr>
+            <a:spLocks noGrp="1" noRot="1" noChangeAspect="1" noMove="1" noResize="1" noEditPoints="1" noAdjustHandles="1" noChangeArrowheads="1" noChangeShapeType="1" noTextEdit="1"/>
+          </p:cNvSpPr>
+          <p:nvPr>
+            <p:extLst>
+              <p:ext uri="{386F3935-93C4-4BCD-93E2-E3B085C9AB24}">
+                <p16:designElem xmlns:p16="http://schemas.microsoft.com/office/powerpoint/2015/main" val="1"/>
+              </p:ext>
+            </p:extLst>
+          </p:nvPr>
+        </p:nvSpPr>
+        <p:spPr>
+          <a:xfrm rot="16200000">
+            <a:off x="800100" y="1491343"/>
+            <a:ext cx="3333749" cy="3499103"/>
+          </a:xfrm>
+          <a:prstGeom prst="downArrow">
+            <a:avLst>
+              <a:gd name="adj1" fmla="val 100000"/>
+              <a:gd name="adj2" fmla="val 15788"/>
+            </a:avLst>
+          </a:prstGeom>
+          <a:solidFill>
+            <a:srgbClr val="404040"/>
+          </a:solidFill>
+          <a:ln w="53975">
+            <a:noFill/>
+          </a:ln>
+        </p:spPr>
+        <p:style>
+          <a:lnRef idx="2">
+            <a:schemeClr val="accent1">
+              <a:shade val="50000"/>
+            </a:schemeClr>
+          </a:lnRef>
+          <a:fillRef idx="1">
+            <a:schemeClr val="accent1"/>
+          </a:fillRef>
+          <a:effectRef idx="0">
+            <a:schemeClr val="accent1"/>
+          </a:effectRef>
+          <a:fontRef idx="minor">
+            <a:schemeClr val="lt1"/>
+          </a:fontRef>
+        </p:style>
+        <p:txBody>
+          <a:bodyPr rtlCol="0" anchor="ctr"/>
+          <a:lstStyle/>
+          <a:p>
+            <a:pPr algn="ctr"/>
+            <a:endParaRPr lang="en-US"/>
+          </a:p>
+        </p:txBody>
+      </p:sp>
+      <p:sp>
+        <p:nvSpPr>
+          <p:cNvPr id="2" name="Title 1">
+            <a:extLst>
+              <a:ext uri="{FF2B5EF4-FFF2-40B4-BE49-F238E27FC236}">
+                <a16:creationId xmlns:a16="http://schemas.microsoft.com/office/drawing/2014/main" id="{C8F46AFD-2827-9B41-A0F3-A28446D7A634}"/>
+              </a:ext>
+            </a:extLst>
+          </p:cNvPr>
+          <p:cNvSpPr>
+            <a:spLocks noGrp="1"/>
+          </p:cNvSpPr>
+          <p:nvPr>
+            <p:ph type="title"/>
+          </p:nvPr>
+        </p:nvSpPr>
+        <p:spPr>
+          <a:xfrm>
+            <a:off x="1028700" y="1967266"/>
+            <a:ext cx="2628900" cy="2547257"/>
+          </a:xfrm>
+          <a:noFill/>
+        </p:spPr>
+        <p:txBody>
+          <a:bodyPr vert="horz" lIns="91440" tIns="45720" rIns="91440" bIns="45720" rtlCol="0" anchor="ctr">
+            <a:normAutofit/>
+          </a:bodyPr>
+          <a:lstStyle/>
+          <a:p>
+            <a:pPr algn="ctr"/>
+            <a:r>
+              <a:rPr lang="en-US" sz="3600" kern="1200">
+                <a:solidFill>
+                  <a:srgbClr val="FFFFFF"/>
+                </a:solidFill>
+                <a:latin typeface="+mj-lt"/>
+                <a:ea typeface="+mj-ea"/>
+                <a:cs typeface="+mj-cs"/>
+              </a:rPr>
+              <a:t>Code</a:t>
+            </a:r>
+          </a:p>
+        </p:txBody>
+      </p:sp>
+      <p:pic>
+        <p:nvPicPr>
+          <p:cNvPr id="5" name="Picture 4">
+            <a:extLst>
+              <a:ext uri="{FF2B5EF4-FFF2-40B4-BE49-F238E27FC236}">
+                <a16:creationId xmlns:a16="http://schemas.microsoft.com/office/drawing/2014/main" id="{D4CACF7A-1A0E-2CB3-03E4-729F49FCFB07}"/>
+              </a:ext>
+            </a:extLst>
+          </p:cNvPr>
+          <p:cNvPicPr>
+            <a:picLocks noChangeAspect="1"/>
+          </p:cNvPicPr>
+          <p:nvPr/>
+        </p:nvPicPr>
+        <p:blipFill>
+          <a:blip r:embed="rId2"/>
+          <a:stretch>
+            <a:fillRect/>
+          </a:stretch>
+        </p:blipFill>
+        <p:spPr>
+          <a:xfrm>
+            <a:off x="4694365" y="2909500"/>
+            <a:ext cx="7243683" cy="661601"/>
+          </a:xfrm>
+          <a:prstGeom prst="rect">
+            <a:avLst/>
+          </a:prstGeom>
+        </p:spPr>
+      </p:pic>
+    </p:spTree>
+    <p:extLst>
+      <p:ext uri="{BB962C8B-B14F-4D97-AF65-F5344CB8AC3E}">
+        <p14:creationId xmlns:p14="http://schemas.microsoft.com/office/powerpoint/2010/main" val="4221784839"/>
+      </p:ext>
+    </p:extLst>
+  </p:cSld>
+  <p:clrMapOvr>
+    <a:masterClrMapping/>
+  </p:clrMapOvr>
+</p:sld>
+</file>
+
+<file path=ppt/slides/slide19.xml><?xml version="1.0" encoding="utf-8"?>
+<p:sld xmlns:a="http://schemas.openxmlformats.org/drawingml/2006/main" xmlns:r="http://schemas.openxmlformats.org/officeDocument/2006/relationships" xmlns:p="http://schemas.openxmlformats.org/presentationml/2006/main">
+  <p:cSld>
+    <p:spTree>
+      <p:nvGrpSpPr>
+        <p:cNvPr id="1" name=""/>
+        <p:cNvGrpSpPr/>
+        <p:nvPr/>
+      </p:nvGrpSpPr>
+      <p:grpSpPr>
+        <a:xfrm>
+          <a:off x="0" y="0"/>
+          <a:ext cx="0" cy="0"/>
+          <a:chOff x="0" y="0"/>
+          <a:chExt cx="0" cy="0"/>
+        </a:xfrm>
+      </p:grpSpPr>
+      <p:pic>
+        <p:nvPicPr>
+          <p:cNvPr id="5" name="Picture 4">
+            <a:extLst>
+              <a:ext uri="{FF2B5EF4-FFF2-40B4-BE49-F238E27FC236}">
+                <a16:creationId xmlns:a16="http://schemas.microsoft.com/office/drawing/2014/main" id="{75F465EB-AC84-54C4-28BD-D3E8A958AC40}"/>
+              </a:ext>
+            </a:extLst>
+          </p:cNvPr>
+          <p:cNvPicPr>
+            <a:picLocks noChangeAspect="1"/>
+          </p:cNvPicPr>
+          <p:nvPr/>
+        </p:nvPicPr>
+        <p:blipFill>
+          <a:blip r:embed="rId2"/>
+          <a:stretch>
+            <a:fillRect/>
+          </a:stretch>
+        </p:blipFill>
+        <p:spPr>
+          <a:xfrm>
+            <a:off x="2343150" y="1892300"/>
+            <a:ext cx="7505700" cy="3073400"/>
+          </a:xfrm>
+          <a:prstGeom prst="rect">
+            <a:avLst/>
+          </a:prstGeom>
+        </p:spPr>
+      </p:pic>
+    </p:spTree>
+    <p:extLst>
+      <p:ext uri="{BB962C8B-B14F-4D97-AF65-F5344CB8AC3E}">
+        <p14:creationId xmlns:p14="http://schemas.microsoft.com/office/powerpoint/2010/main" val="1016261354"/>
       </p:ext>
     </p:extLst>
   </p:cSld>
@@ -3579,6 +4695,96 @@
     <p:extLst>
       <p:ext uri="{BB962C8B-B14F-4D97-AF65-F5344CB8AC3E}">
         <p14:creationId xmlns:p14="http://schemas.microsoft.com/office/powerpoint/2010/main" val="1614252893"/>
+      </p:ext>
+    </p:extLst>
+  </p:cSld>
+  <p:clrMapOvr>
+    <a:masterClrMapping/>
+  </p:clrMapOvr>
+</p:sld>
+</file>
+
+<file path=ppt/slides/slide20.xml><?xml version="1.0" encoding="utf-8"?>
+<p:sld xmlns:a="http://schemas.openxmlformats.org/drawingml/2006/main" xmlns:r="http://schemas.openxmlformats.org/officeDocument/2006/relationships" xmlns:p="http://schemas.openxmlformats.org/presentationml/2006/main">
+  <p:cSld>
+    <p:spTree>
+      <p:nvGrpSpPr>
+        <p:cNvPr id="1" name=""/>
+        <p:cNvGrpSpPr/>
+        <p:nvPr/>
+      </p:nvGrpSpPr>
+      <p:grpSpPr>
+        <a:xfrm>
+          <a:off x="0" y="0"/>
+          <a:ext cx="0" cy="0"/>
+          <a:chOff x="0" y="0"/>
+          <a:chExt cx="0" cy="0"/>
+        </a:xfrm>
+      </p:grpSpPr>
+      <p:pic>
+        <p:nvPicPr>
+          <p:cNvPr id="5" name="Picture 4">
+            <a:extLst>
+              <a:ext uri="{FF2B5EF4-FFF2-40B4-BE49-F238E27FC236}">
+                <a16:creationId xmlns:a16="http://schemas.microsoft.com/office/drawing/2014/main" id="{222D59C8-31B7-C60B-D1DB-3646D2E6503D}"/>
+              </a:ext>
+            </a:extLst>
+          </p:cNvPr>
+          <p:cNvPicPr>
+            <a:picLocks noChangeAspect="1"/>
+          </p:cNvPicPr>
+          <p:nvPr/>
+        </p:nvPicPr>
+        <p:blipFill>
+          <a:blip r:embed="rId2"/>
+          <a:stretch>
+            <a:fillRect/>
+          </a:stretch>
+        </p:blipFill>
+        <p:spPr>
+          <a:xfrm>
+            <a:off x="0" y="0"/>
+            <a:ext cx="12192000" cy="4581805"/>
+          </a:xfrm>
+          <a:prstGeom prst="rect">
+            <a:avLst/>
+          </a:prstGeom>
+        </p:spPr>
+      </p:pic>
+      <p:pic>
+        <p:nvPicPr>
+          <p:cNvPr id="6" name="Picture 5">
+            <a:extLst>
+              <a:ext uri="{FF2B5EF4-FFF2-40B4-BE49-F238E27FC236}">
+                <a16:creationId xmlns:a16="http://schemas.microsoft.com/office/drawing/2014/main" id="{46630101-9D34-E803-3E39-639711E964FE}"/>
+              </a:ext>
+            </a:extLst>
+          </p:cNvPr>
+          <p:cNvPicPr>
+            <a:picLocks noChangeAspect="1"/>
+          </p:cNvPicPr>
+          <p:nvPr/>
+        </p:nvPicPr>
+        <p:blipFill>
+          <a:blip r:embed="rId3"/>
+          <a:stretch>
+            <a:fillRect/>
+          </a:stretch>
+        </p:blipFill>
+        <p:spPr>
+          <a:xfrm>
+            <a:off x="4425950" y="5001397"/>
+            <a:ext cx="3340100" cy="1600200"/>
+          </a:xfrm>
+          <a:prstGeom prst="rect">
+            <a:avLst/>
+          </a:prstGeom>
+        </p:spPr>
+      </p:pic>
+    </p:spTree>
+    <p:extLst>
+      <p:ext uri="{BB962C8B-B14F-4D97-AF65-F5344CB8AC3E}">
+        <p14:creationId xmlns:p14="http://schemas.microsoft.com/office/powerpoint/2010/main" val="3759300887"/>
       </p:ext>
     </p:extLst>
   </p:cSld>
@@ -3688,63 +4894,40 @@
           <a:chExt cx="0" cy="0"/>
         </a:xfrm>
       </p:grpSpPr>
-      <p:sp>
-        <p:nvSpPr>
-          <p:cNvPr id="2" name="Title 1">
+      <p:pic>
+        <p:nvPicPr>
+          <p:cNvPr id="4" name="Picture 3">
             <a:extLst>
               <a:ext uri="{FF2B5EF4-FFF2-40B4-BE49-F238E27FC236}">
-                <a16:creationId xmlns:a16="http://schemas.microsoft.com/office/drawing/2014/main" id="{BA43C611-88F6-CF17-FCA3-B9AC30C15775}"/>
+                <a16:creationId xmlns:a16="http://schemas.microsoft.com/office/drawing/2014/main" id="{B8323104-F295-BF1D-AF74-73C2BA88D300}"/>
               </a:ext>
             </a:extLst>
           </p:cNvPr>
-          <p:cNvSpPr>
-            <a:spLocks noGrp="1"/>
-          </p:cNvSpPr>
-          <p:nvPr>
-            <p:ph type="title"/>
-          </p:nvPr>
-        </p:nvSpPr>
-        <p:spPr/>
-        <p:txBody>
-          <a:bodyPr/>
-          <a:lstStyle/>
-          <a:p>
-            <a:r>
-              <a:rPr lang="en-US" dirty="0"/>
-              <a:t>Predicting Star Types using the Decision Tree model</a:t>
-            </a:r>
-          </a:p>
-        </p:txBody>
-      </p:sp>
-      <p:sp>
-        <p:nvSpPr>
-          <p:cNvPr id="3" name="Text Placeholder 2">
-            <a:extLst>
-              <a:ext uri="{FF2B5EF4-FFF2-40B4-BE49-F238E27FC236}">
-                <a16:creationId xmlns:a16="http://schemas.microsoft.com/office/drawing/2014/main" id="{5A70D355-73DE-53C3-FC59-AF6AF3B4C928}"/>
-              </a:ext>
-            </a:extLst>
-          </p:cNvPr>
-          <p:cNvSpPr>
-            <a:spLocks noGrp="1"/>
-          </p:cNvSpPr>
-          <p:nvPr>
-            <p:ph type="body" idx="1"/>
-          </p:nvPr>
-        </p:nvSpPr>
-        <p:spPr/>
-        <p:txBody>
-          <a:bodyPr/>
-          <a:lstStyle/>
-          <a:p>
-            <a:endParaRPr lang="en-US"/>
-          </a:p>
-        </p:txBody>
-      </p:sp>
+          <p:cNvPicPr>
+            <a:picLocks noChangeAspect="1"/>
+          </p:cNvPicPr>
+          <p:nvPr/>
+        </p:nvPicPr>
+        <p:blipFill>
+          <a:blip r:embed="rId2"/>
+          <a:stretch>
+            <a:fillRect/>
+          </a:stretch>
+        </p:blipFill>
+        <p:spPr>
+          <a:xfrm>
+            <a:off x="1483894" y="0"/>
+            <a:ext cx="9224211" cy="6858000"/>
+          </a:xfrm>
+          <a:prstGeom prst="rect">
+            <a:avLst/>
+          </a:prstGeom>
+        </p:spPr>
+      </p:pic>
     </p:spTree>
     <p:extLst>
       <p:ext uri="{BB962C8B-B14F-4D97-AF65-F5344CB8AC3E}">
-        <p14:creationId xmlns:p14="http://schemas.microsoft.com/office/powerpoint/2010/main" val="3364378645"/>
+        <p14:creationId xmlns:p14="http://schemas.microsoft.com/office/powerpoint/2010/main" val="3950172818"/>
       </p:ext>
     </p:extLst>
   </p:cSld>
@@ -3771,439 +4954,12 @@
           <a:chExt cx="0" cy="0"/>
         </a:xfrm>
       </p:grpSpPr>
-      <p:sp>
-        <p:nvSpPr>
-          <p:cNvPr id="2" name="Title 1">
+      <p:pic>
+        <p:nvPicPr>
+          <p:cNvPr id="4" name="Picture 3">
             <a:extLst>
               <a:ext uri="{FF2B5EF4-FFF2-40B4-BE49-F238E27FC236}">
-                <a16:creationId xmlns:a16="http://schemas.microsoft.com/office/drawing/2014/main" id="{843031FD-CC01-AF3F-91D8-C8977338AD35}"/>
-              </a:ext>
-            </a:extLst>
-          </p:cNvPr>
-          <p:cNvSpPr>
-            <a:spLocks noGrp="1"/>
-          </p:cNvSpPr>
-          <p:nvPr>
-            <p:ph type="title"/>
-          </p:nvPr>
-        </p:nvSpPr>
-        <p:spPr/>
-        <p:txBody>
-          <a:bodyPr/>
-          <a:lstStyle/>
-          <a:p>
-            <a:r>
-              <a:rPr lang="en-US" dirty="0"/>
-              <a:t>Predicting Star Types using K-Nearest Neighbor model (KNN)</a:t>
-            </a:r>
-          </a:p>
-        </p:txBody>
-      </p:sp>
-      <p:sp>
-        <p:nvSpPr>
-          <p:cNvPr id="3" name="Text Placeholder 2">
-            <a:extLst>
-              <a:ext uri="{FF2B5EF4-FFF2-40B4-BE49-F238E27FC236}">
-                <a16:creationId xmlns:a16="http://schemas.microsoft.com/office/drawing/2014/main" id="{4BA057B9-C75F-5F81-D8A7-0B9D28816795}"/>
-              </a:ext>
-            </a:extLst>
-          </p:cNvPr>
-          <p:cNvSpPr>
-            <a:spLocks noGrp="1"/>
-          </p:cNvSpPr>
-          <p:nvPr>
-            <p:ph type="body" idx="1"/>
-          </p:nvPr>
-        </p:nvSpPr>
-        <p:spPr/>
-        <p:txBody>
-          <a:bodyPr/>
-          <a:lstStyle/>
-          <a:p>
-            <a:endParaRPr lang="en-US" dirty="0"/>
-          </a:p>
-        </p:txBody>
-      </p:sp>
-    </p:spTree>
-    <p:extLst>
-      <p:ext uri="{BB962C8B-B14F-4D97-AF65-F5344CB8AC3E}">
-        <p14:creationId xmlns:p14="http://schemas.microsoft.com/office/powerpoint/2010/main" val="2877514114"/>
-      </p:ext>
-    </p:extLst>
-  </p:cSld>
-  <p:clrMapOvr>
-    <a:masterClrMapping/>
-  </p:clrMapOvr>
-</p:sld>
-</file>
-
-<file path=ppt/slides/slide6.xml><?xml version="1.0" encoding="utf-8"?>
-<p:sld xmlns:a="http://schemas.openxmlformats.org/drawingml/2006/main" xmlns:r="http://schemas.openxmlformats.org/officeDocument/2006/relationships" xmlns:p="http://schemas.openxmlformats.org/presentationml/2006/main">
-  <p:cSld>
-    <p:bg>
-      <p:bgPr>
-        <a:solidFill>
-          <a:schemeClr val="bg1"/>
-        </a:solidFill>
-        <a:effectLst/>
-      </p:bgPr>
-    </p:bg>
-    <p:spTree>
-      <p:nvGrpSpPr>
-        <p:cNvPr id="1" name=""/>
-        <p:cNvGrpSpPr/>
-        <p:nvPr/>
-      </p:nvGrpSpPr>
-      <p:grpSpPr>
-        <a:xfrm>
-          <a:off x="0" y="0"/>
-          <a:ext cx="0" cy="0"/>
-          <a:chOff x="0" y="0"/>
-          <a:chExt cx="0" cy="0"/>
-        </a:xfrm>
-      </p:grpSpPr>
-      <p:sp>
-        <p:nvSpPr>
-          <p:cNvPr id="11" name="Down Arrow 7">
-            <a:extLst>
-              <a:ext uri="{FF2B5EF4-FFF2-40B4-BE49-F238E27FC236}">
-                <a16:creationId xmlns:a16="http://schemas.microsoft.com/office/drawing/2014/main" id="{D4771268-CB57-404A-9271-370EB28F6090}"/>
-              </a:ext>
-              <a:ext uri="{C183D7F6-B498-43B3-948B-1728B52AA6E4}">
-                <adec:decorative xmlns:adec="http://schemas.microsoft.com/office/drawing/2017/decorative" val="1"/>
-              </a:ext>
-            </a:extLst>
-          </p:cNvPr>
-          <p:cNvSpPr>
-            <a:spLocks noGrp="1" noRot="1" noChangeAspect="1" noMove="1" noResize="1" noEditPoints="1" noAdjustHandles="1" noChangeArrowheads="1" noChangeShapeType="1" noTextEdit="1"/>
-          </p:cNvSpPr>
-          <p:nvPr>
-            <p:extLst>
-              <p:ext uri="{386F3935-93C4-4BCD-93E2-E3B085C9AB24}">
-                <p16:designElem xmlns:p16="http://schemas.microsoft.com/office/powerpoint/2015/main" val="1"/>
-              </p:ext>
-            </p:extLst>
-          </p:nvPr>
-        </p:nvSpPr>
-        <p:spPr>
-          <a:xfrm rot="16200000">
-            <a:off x="800100" y="1491343"/>
-            <a:ext cx="3333749" cy="3499103"/>
-          </a:xfrm>
-          <a:prstGeom prst="downArrow">
-            <a:avLst>
-              <a:gd name="adj1" fmla="val 100000"/>
-              <a:gd name="adj2" fmla="val 15788"/>
-            </a:avLst>
-          </a:prstGeom>
-          <a:solidFill>
-            <a:srgbClr val="404040"/>
-          </a:solidFill>
-          <a:ln w="53975">
-            <a:noFill/>
-          </a:ln>
-        </p:spPr>
-        <p:style>
-          <a:lnRef idx="2">
-            <a:schemeClr val="accent1">
-              <a:shade val="50000"/>
-            </a:schemeClr>
-          </a:lnRef>
-          <a:fillRef idx="1">
-            <a:schemeClr val="accent1"/>
-          </a:fillRef>
-          <a:effectRef idx="0">
-            <a:schemeClr val="accent1"/>
-          </a:effectRef>
-          <a:fontRef idx="minor">
-            <a:schemeClr val="lt1"/>
-          </a:fontRef>
-        </p:style>
-        <p:txBody>
-          <a:bodyPr rtlCol="0" anchor="ctr"/>
-          <a:lstStyle/>
-          <a:p>
-            <a:pPr algn="ctr"/>
-            <a:endParaRPr lang="en-US"/>
-          </a:p>
-        </p:txBody>
-      </p:sp>
-      <p:sp>
-        <p:nvSpPr>
-          <p:cNvPr id="2" name="Title 1">
-            <a:extLst>
-              <a:ext uri="{FF2B5EF4-FFF2-40B4-BE49-F238E27FC236}">
-                <a16:creationId xmlns:a16="http://schemas.microsoft.com/office/drawing/2014/main" id="{4D232782-94D6-3226-49ED-8CF6B5D0D8A1}"/>
-              </a:ext>
-            </a:extLst>
-          </p:cNvPr>
-          <p:cNvSpPr>
-            <a:spLocks noGrp="1"/>
-          </p:cNvSpPr>
-          <p:nvPr>
-            <p:ph type="title"/>
-          </p:nvPr>
-        </p:nvSpPr>
-        <p:spPr>
-          <a:xfrm>
-            <a:off x="1028700" y="1967266"/>
-            <a:ext cx="2628900" cy="2547257"/>
-          </a:xfrm>
-          <a:noFill/>
-        </p:spPr>
-        <p:txBody>
-          <a:bodyPr vert="horz" lIns="91440" tIns="45720" rIns="91440" bIns="45720" rtlCol="0" anchor="ctr">
-            <a:normAutofit/>
-          </a:bodyPr>
-          <a:lstStyle/>
-          <a:p>
-            <a:pPr algn="ctr"/>
-            <a:r>
-              <a:rPr lang="en-US" sz="3600" kern="1200">
-                <a:solidFill>
-                  <a:srgbClr val="FFFFFF"/>
-                </a:solidFill>
-                <a:latin typeface="+mj-lt"/>
-                <a:ea typeface="+mj-ea"/>
-                <a:cs typeface="+mj-cs"/>
-              </a:rPr>
-              <a:t>Code</a:t>
-            </a:r>
-          </a:p>
-        </p:txBody>
-      </p:sp>
-      <p:pic>
-        <p:nvPicPr>
-          <p:cNvPr id="6" name="Content Placeholder 5" descr="A screenshot of a computer program&#10;&#10;AI-generated content may be incorrect.">
-            <a:extLst>
-              <a:ext uri="{FF2B5EF4-FFF2-40B4-BE49-F238E27FC236}">
-                <a16:creationId xmlns:a16="http://schemas.microsoft.com/office/drawing/2014/main" id="{86D0587C-6590-4605-1667-9AF0D626A850}"/>
-              </a:ext>
-            </a:extLst>
-          </p:cNvPr>
-          <p:cNvPicPr>
-            <a:picLocks noGrp="1" noChangeAspect="1"/>
-          </p:cNvPicPr>
-          <p:nvPr>
-            <p:ph idx="1"/>
-          </p:nvPr>
-        </p:nvPicPr>
-        <p:blipFill>
-          <a:blip r:embed="rId2"/>
-          <a:stretch>
-            <a:fillRect/>
-          </a:stretch>
-        </p:blipFill>
-        <p:spPr>
-          <a:xfrm>
-            <a:off x="5533395" y="356641"/>
-            <a:ext cx="5092561" cy="5003441"/>
-          </a:xfrm>
-          <a:prstGeom prst="rect">
-            <a:avLst/>
-          </a:prstGeom>
-        </p:spPr>
-      </p:pic>
-      <p:pic>
-        <p:nvPicPr>
-          <p:cNvPr id="8" name="Picture 7" descr="A white background with red and green text&#10;&#10;AI-generated content may be incorrect.">
-            <a:extLst>
-              <a:ext uri="{FF2B5EF4-FFF2-40B4-BE49-F238E27FC236}">
-                <a16:creationId xmlns:a16="http://schemas.microsoft.com/office/drawing/2014/main" id="{246DB88E-5C4F-B119-AE99-42C704AE07CA}"/>
-              </a:ext>
-            </a:extLst>
-          </p:cNvPr>
-          <p:cNvPicPr>
-            <a:picLocks noChangeAspect="1"/>
-          </p:cNvPicPr>
-          <p:nvPr/>
-        </p:nvPicPr>
-        <p:blipFill>
-          <a:blip r:embed="rId3"/>
-          <a:stretch>
-            <a:fillRect/>
-          </a:stretch>
-        </p:blipFill>
-        <p:spPr>
-          <a:xfrm>
-            <a:off x="5533395" y="5360082"/>
-            <a:ext cx="5092561" cy="676899"/>
-          </a:xfrm>
-          <a:prstGeom prst="rect">
-            <a:avLst/>
-          </a:prstGeom>
-        </p:spPr>
-      </p:pic>
-    </p:spTree>
-    <p:extLst>
-      <p:ext uri="{BB962C8B-B14F-4D97-AF65-F5344CB8AC3E}">
-        <p14:creationId xmlns:p14="http://schemas.microsoft.com/office/powerpoint/2010/main" val="1983819204"/>
-      </p:ext>
-    </p:extLst>
-  </p:cSld>
-  <p:clrMapOvr>
-    <a:masterClrMapping/>
-  </p:clrMapOvr>
-</p:sld>
-</file>
-
-<file path=ppt/slides/slide7.xml><?xml version="1.0" encoding="utf-8"?>
-<p:sld xmlns:a="http://schemas.openxmlformats.org/drawingml/2006/main" xmlns:r="http://schemas.openxmlformats.org/officeDocument/2006/relationships" xmlns:p="http://schemas.openxmlformats.org/presentationml/2006/main">
-  <p:cSld>
-    <p:bg>
-      <p:bgPr>
-        <a:solidFill>
-          <a:schemeClr val="bg1"/>
-        </a:solidFill>
-        <a:effectLst/>
-      </p:bgPr>
-    </p:bg>
-    <p:spTree>
-      <p:nvGrpSpPr>
-        <p:cNvPr id="1" name=""/>
-        <p:cNvGrpSpPr/>
-        <p:nvPr/>
-      </p:nvGrpSpPr>
-      <p:grpSpPr>
-        <a:xfrm>
-          <a:off x="0" y="0"/>
-          <a:ext cx="0" cy="0"/>
-          <a:chOff x="0" y="0"/>
-          <a:chExt cx="0" cy="0"/>
-        </a:xfrm>
-      </p:grpSpPr>
-      <p:sp>
-        <p:nvSpPr>
-          <p:cNvPr id="24" name="Rectangle 23">
-            <a:extLst>
-              <a:ext uri="{FF2B5EF4-FFF2-40B4-BE49-F238E27FC236}">
-                <a16:creationId xmlns:a16="http://schemas.microsoft.com/office/drawing/2014/main" id="{32BC26D8-82FB-445E-AA49-62A77D7C1EE0}"/>
-              </a:ext>
-              <a:ext uri="{C183D7F6-B498-43B3-948B-1728B52AA6E4}">
-                <adec:decorative xmlns:adec="http://schemas.microsoft.com/office/drawing/2017/decorative" val="1"/>
-              </a:ext>
-            </a:extLst>
-          </p:cNvPr>
-          <p:cNvSpPr>
-            <a:spLocks noGrp="1" noRot="1" noChangeAspect="1" noMove="1" noResize="1" noEditPoints="1" noAdjustHandles="1" noChangeArrowheads="1" noChangeShapeType="1" noTextEdit="1"/>
-          </p:cNvSpPr>
-          <p:nvPr>
-            <p:extLst>
-              <p:ext uri="{386F3935-93C4-4BCD-93E2-E3B085C9AB24}">
-                <p16:designElem xmlns:p16="http://schemas.microsoft.com/office/powerpoint/2015/main" val="1"/>
-              </p:ext>
-            </p:extLst>
-          </p:nvPr>
-        </p:nvSpPr>
-        <p:spPr>
-          <a:xfrm>
-            <a:off x="0" y="0"/>
-            <a:ext cx="12192000" cy="6858000"/>
-          </a:xfrm>
-          <a:prstGeom prst="rect">
-            <a:avLst/>
-          </a:prstGeom>
-          <a:solidFill>
-            <a:srgbClr val="465235"/>
-          </a:solidFill>
-          <a:ln>
-            <a:noFill/>
-          </a:ln>
-        </p:spPr>
-        <p:style>
-          <a:lnRef idx="2">
-            <a:schemeClr val="accent1">
-              <a:shade val="50000"/>
-            </a:schemeClr>
-          </a:lnRef>
-          <a:fillRef idx="1">
-            <a:schemeClr val="accent1"/>
-          </a:fillRef>
-          <a:effectRef idx="0">
-            <a:schemeClr val="accent1"/>
-          </a:effectRef>
-          <a:fontRef idx="minor">
-            <a:schemeClr val="lt1"/>
-          </a:fontRef>
-        </p:style>
-        <p:txBody>
-          <a:bodyPr rtlCol="0" anchor="ctr"/>
-          <a:lstStyle/>
-          <a:p>
-            <a:pPr algn="ctr"/>
-            <a:endParaRPr lang="en-US"/>
-          </a:p>
-        </p:txBody>
-      </p:sp>
-      <p:sp>
-        <p:nvSpPr>
-          <p:cNvPr id="23" name="Rectangle 22">
-            <a:extLst>
-              <a:ext uri="{FF2B5EF4-FFF2-40B4-BE49-F238E27FC236}">
-                <a16:creationId xmlns:a16="http://schemas.microsoft.com/office/drawing/2014/main" id="{CB44330D-EA18-4254-AA95-EB49948539B8}"/>
-              </a:ext>
-              <a:ext uri="{C183D7F6-B498-43B3-948B-1728B52AA6E4}">
-                <adec:decorative xmlns:adec="http://schemas.microsoft.com/office/drawing/2017/decorative" val="1"/>
-              </a:ext>
-            </a:extLst>
-          </p:cNvPr>
-          <p:cNvSpPr>
-            <a:spLocks noGrp="1" noRot="1" noChangeAspect="1" noMove="1" noResize="1" noEditPoints="1" noAdjustHandles="1" noChangeArrowheads="1" noChangeShapeType="1" noTextEdit="1"/>
-          </p:cNvSpPr>
-          <p:nvPr>
-            <p:extLst>
-              <p:ext uri="{386F3935-93C4-4BCD-93E2-E3B085C9AB24}">
-                <p16:designElem xmlns:p16="http://schemas.microsoft.com/office/powerpoint/2015/main" val="1"/>
-              </p:ext>
-            </p:extLst>
-          </p:nvPr>
-        </p:nvSpPr>
-        <p:spPr>
-          <a:xfrm>
-            <a:off x="477012" y="480060"/>
-            <a:ext cx="11237976" cy="5897880"/>
-          </a:xfrm>
-          <a:prstGeom prst="rect">
-            <a:avLst/>
-          </a:prstGeom>
-          <a:solidFill>
-            <a:srgbClr val="FFFFFF"/>
-          </a:solidFill>
-          <a:ln>
-            <a:noFill/>
-          </a:ln>
-        </p:spPr>
-        <p:style>
-          <a:lnRef idx="2">
-            <a:schemeClr val="accent1">
-              <a:shade val="50000"/>
-            </a:schemeClr>
-          </a:lnRef>
-          <a:fillRef idx="1">
-            <a:schemeClr val="accent1"/>
-          </a:fillRef>
-          <a:effectRef idx="0">
-            <a:schemeClr val="accent1"/>
-          </a:effectRef>
-          <a:fontRef idx="minor">
-            <a:schemeClr val="lt1"/>
-          </a:fontRef>
-        </p:style>
-        <p:txBody>
-          <a:bodyPr rtlCol="0" anchor="ctr"/>
-          <a:lstStyle/>
-          <a:p>
-            <a:pPr algn="ctr"/>
-            <a:endParaRPr lang="en-US"/>
-          </a:p>
-        </p:txBody>
-      </p:sp>
-      <p:pic>
-        <p:nvPicPr>
-          <p:cNvPr id="9" name="Picture 8" descr="A screenshot of a graph&#10;&#10;AI-generated content may be incorrect.">
-            <a:extLst>
-              <a:ext uri="{FF2B5EF4-FFF2-40B4-BE49-F238E27FC236}">
-                <a16:creationId xmlns:a16="http://schemas.microsoft.com/office/drawing/2014/main" id="{70504723-4847-B279-DB59-39EF153D13EA}"/>
+                <a16:creationId xmlns:a16="http://schemas.microsoft.com/office/drawing/2014/main" id="{7447E5DC-DC93-C461-77DA-02A48D36327A}"/>
               </a:ext>
             </a:extLst>
           </p:cNvPr>
@@ -4220,108 +4976,138 @@
         </p:blipFill>
         <p:spPr>
           <a:xfrm>
-            <a:off x="1922917" y="643467"/>
-            <a:ext cx="8346165" cy="5571066"/>
+            <a:off x="914088" y="0"/>
+            <a:ext cx="10363823" cy="6858000"/>
           </a:xfrm>
           <a:prstGeom prst="rect">
             <a:avLst/>
           </a:prstGeom>
         </p:spPr>
       </p:pic>
-      <p:sp>
-        <p:nvSpPr>
-          <p:cNvPr id="4" name="AutoShape 2">
+    </p:spTree>
+    <p:extLst>
+      <p:ext uri="{BB962C8B-B14F-4D97-AF65-F5344CB8AC3E}">
+        <p14:creationId xmlns:p14="http://schemas.microsoft.com/office/powerpoint/2010/main" val="3773126096"/>
+      </p:ext>
+    </p:extLst>
+  </p:cSld>
+  <p:clrMapOvr>
+    <a:masterClrMapping/>
+  </p:clrMapOvr>
+</p:sld>
+</file>
+
+<file path=ppt/slides/slide6.xml><?xml version="1.0" encoding="utf-8"?>
+<p:sld xmlns:a="http://schemas.openxmlformats.org/drawingml/2006/main" xmlns:r="http://schemas.openxmlformats.org/officeDocument/2006/relationships" xmlns:p="http://schemas.openxmlformats.org/presentationml/2006/main">
+  <p:cSld>
+    <p:spTree>
+      <p:nvGrpSpPr>
+        <p:cNvPr id="1" name=""/>
+        <p:cNvGrpSpPr/>
+        <p:nvPr/>
+      </p:nvGrpSpPr>
+      <p:grpSpPr>
+        <a:xfrm>
+          <a:off x="0" y="0"/>
+          <a:ext cx="0" cy="0"/>
+          <a:chOff x="0" y="0"/>
+          <a:chExt cx="0" cy="0"/>
+        </a:xfrm>
+      </p:grpSpPr>
+      <p:pic>
+        <p:nvPicPr>
+          <p:cNvPr id="4" name="Picture 3">
             <a:extLst>
               <a:ext uri="{FF2B5EF4-FFF2-40B4-BE49-F238E27FC236}">
-                <a16:creationId xmlns:a16="http://schemas.microsoft.com/office/drawing/2014/main" id="{69A3A004-2FCC-A839-4F4D-82CD19D0475B}"/>
+                <a16:creationId xmlns:a16="http://schemas.microsoft.com/office/drawing/2014/main" id="{C8FDF237-FEAF-A3D7-1050-D0E29FC848CD}"/>
               </a:ext>
             </a:extLst>
           </p:cNvPr>
-          <p:cNvSpPr>
-            <a:spLocks noChangeAspect="1" noChangeArrowheads="1"/>
-          </p:cNvSpPr>
+          <p:cNvPicPr>
+            <a:picLocks noChangeAspect="1"/>
+          </p:cNvPicPr>
           <p:nvPr/>
-        </p:nvSpPr>
-        <p:spPr bwMode="auto">
+        </p:nvPicPr>
+        <p:blipFill>
+          <a:blip r:embed="rId2"/>
+          <a:stretch>
+            <a:fillRect/>
+          </a:stretch>
+        </p:blipFill>
+        <p:spPr>
           <a:xfrm>
-            <a:off x="2564524" y="-102476"/>
-            <a:ext cx="3683876" cy="3683876"/>
+            <a:off x="914088" y="0"/>
+            <a:ext cx="10363823" cy="6858000"/>
           </a:xfrm>
           <a:prstGeom prst="rect">
             <a:avLst/>
           </a:prstGeom>
-          <a:noFill/>
-          <a:extLst>
-            <a:ext uri="{909E8E84-426E-40DD-AFC4-6F175D3DCCD1}">
-              <a14:hiddenFill xmlns:a14="http://schemas.microsoft.com/office/drawing/2010/main">
-                <a:solidFill>
-                  <a:srgbClr val="FFFFFF"/>
-                </a:solidFill>
-              </a14:hiddenFill>
-            </a:ext>
-          </a:extLst>
-        </p:spPr>
-        <p:txBody>
-          <a:bodyPr vert="horz" wrap="square" lIns="91440" tIns="45720" rIns="91440" bIns="45720" numCol="1" anchor="t" anchorCtr="0" compatLnSpc="1">
-            <a:prstTxWarp prst="textNoShape">
-              <a:avLst/>
-            </a:prstTxWarp>
-          </a:bodyPr>
-          <a:lstStyle/>
-          <a:p>
-            <a:endParaRPr lang="en-US"/>
-          </a:p>
-        </p:txBody>
-      </p:sp>
-      <p:sp>
-        <p:nvSpPr>
-          <p:cNvPr id="7" name="AutoShape 4">
+        </p:spPr>
+      </p:pic>
+    </p:spTree>
+    <p:extLst>
+      <p:ext uri="{BB962C8B-B14F-4D97-AF65-F5344CB8AC3E}">
+        <p14:creationId xmlns:p14="http://schemas.microsoft.com/office/powerpoint/2010/main" val="2400734750"/>
+      </p:ext>
+    </p:extLst>
+  </p:cSld>
+  <p:clrMapOvr>
+    <a:masterClrMapping/>
+  </p:clrMapOvr>
+</p:sld>
+</file>
+
+<file path=ppt/slides/slide7.xml><?xml version="1.0" encoding="utf-8"?>
+<p:sld xmlns:a="http://schemas.openxmlformats.org/drawingml/2006/main" xmlns:r="http://schemas.openxmlformats.org/officeDocument/2006/relationships" xmlns:p="http://schemas.openxmlformats.org/presentationml/2006/main">
+  <p:cSld>
+    <p:spTree>
+      <p:nvGrpSpPr>
+        <p:cNvPr id="1" name=""/>
+        <p:cNvGrpSpPr/>
+        <p:nvPr/>
+      </p:nvGrpSpPr>
+      <p:grpSpPr>
+        <a:xfrm>
+          <a:off x="0" y="0"/>
+          <a:ext cx="0" cy="0"/>
+          <a:chOff x="0" y="0"/>
+          <a:chExt cx="0" cy="0"/>
+        </a:xfrm>
+      </p:grpSpPr>
+      <p:pic>
+        <p:nvPicPr>
+          <p:cNvPr id="4" name="Picture 3">
             <a:extLst>
               <a:ext uri="{FF2B5EF4-FFF2-40B4-BE49-F238E27FC236}">
-                <a16:creationId xmlns:a16="http://schemas.microsoft.com/office/drawing/2014/main" id="{3DA6D3CD-0363-BB44-5B18-5AE58A0421CD}"/>
+                <a16:creationId xmlns:a16="http://schemas.microsoft.com/office/drawing/2014/main" id="{6237EA35-0C02-C580-4BF4-74905488C016}"/>
               </a:ext>
             </a:extLst>
           </p:cNvPr>
-          <p:cNvSpPr>
-            <a:spLocks noChangeAspect="1" noChangeArrowheads="1"/>
-          </p:cNvSpPr>
+          <p:cNvPicPr>
+            <a:picLocks noChangeAspect="1"/>
+          </p:cNvPicPr>
           <p:nvPr/>
-        </p:nvSpPr>
-        <p:spPr bwMode="auto">
+        </p:nvPicPr>
+        <p:blipFill>
+          <a:blip r:embed="rId2"/>
+          <a:stretch>
+            <a:fillRect/>
+          </a:stretch>
+        </p:blipFill>
+        <p:spPr>
           <a:xfrm>
-            <a:off x="5943600" y="3276600"/>
-            <a:ext cx="304800" cy="304800"/>
+            <a:off x="2396610" y="0"/>
+            <a:ext cx="7398779" cy="6857735"/>
           </a:xfrm>
           <a:prstGeom prst="rect">
             <a:avLst/>
           </a:prstGeom>
-          <a:noFill/>
-          <a:extLst>
-            <a:ext uri="{909E8E84-426E-40DD-AFC4-6F175D3DCCD1}">
-              <a14:hiddenFill xmlns:a14="http://schemas.microsoft.com/office/drawing/2010/main">
-                <a:solidFill>
-                  <a:srgbClr val="FFFFFF"/>
-                </a:solidFill>
-              </a14:hiddenFill>
-            </a:ext>
-          </a:extLst>
-        </p:spPr>
-        <p:txBody>
-          <a:bodyPr vert="horz" wrap="square" lIns="91440" tIns="45720" rIns="91440" bIns="45720" numCol="1" anchor="t" anchorCtr="0" compatLnSpc="1">
-            <a:prstTxWarp prst="textNoShape">
-              <a:avLst/>
-            </a:prstTxWarp>
-          </a:bodyPr>
-          <a:lstStyle/>
-          <a:p>
-            <a:endParaRPr lang="en-US"/>
-          </a:p>
-        </p:txBody>
-      </p:sp>
+        </p:spPr>
+      </p:pic>
     </p:spTree>
     <p:extLst>
       <p:ext uri="{BB962C8B-B14F-4D97-AF65-F5344CB8AC3E}">
-        <p14:creationId xmlns:p14="http://schemas.microsoft.com/office/powerpoint/2010/main" val="2446726839"/>
+        <p14:creationId xmlns:p14="http://schemas.microsoft.com/office/powerpoint/2010/main" val="4127246039"/>
       </p:ext>
     </p:extLst>
   </p:cSld>
@@ -4350,10 +5136,10 @@
       </p:grpSpPr>
       <p:pic>
         <p:nvPicPr>
-          <p:cNvPr id="6" name="Picture 5" descr="A screenshot of a computer program&#10;&#10;AI-generated content may be incorrect.">
+          <p:cNvPr id="4" name="Picture 3">
             <a:extLst>
               <a:ext uri="{FF2B5EF4-FFF2-40B4-BE49-F238E27FC236}">
-                <a16:creationId xmlns:a16="http://schemas.microsoft.com/office/drawing/2014/main" id="{CA0D0AB7-2806-F5F3-AB0D-DAE25B3E49D7}"/>
+                <a16:creationId xmlns:a16="http://schemas.microsoft.com/office/drawing/2014/main" id="{534C7296-0382-AF7F-07BC-64C73EE556A7}"/>
               </a:ext>
             </a:extLst>
           </p:cNvPr>
@@ -4370,26 +5156,20 @@
         </p:blipFill>
         <p:spPr>
           <a:xfrm>
-            <a:off x="387927" y="182416"/>
-            <a:ext cx="5708073" cy="3187696"/>
+            <a:off x="2209800" y="0"/>
+            <a:ext cx="7772400" cy="2722027"/>
           </a:xfrm>
           <a:prstGeom prst="rect">
             <a:avLst/>
           </a:prstGeom>
-          <a:ln>
-            <a:solidFill>
-              <a:srgbClr val="7030A0"/>
-            </a:solidFill>
-            <a:prstDash val="lgDash"/>
-          </a:ln>
         </p:spPr>
       </p:pic>
       <p:pic>
         <p:nvPicPr>
-          <p:cNvPr id="8" name="Picture 7" descr="A blue and white graph&#10;&#10;AI-generated content may be incorrect.">
+          <p:cNvPr id="5" name="Picture 4">
             <a:extLst>
               <a:ext uri="{FF2B5EF4-FFF2-40B4-BE49-F238E27FC236}">
-                <a16:creationId xmlns:a16="http://schemas.microsoft.com/office/drawing/2014/main" id="{67A3B431-8199-64B7-B948-B245CCB6FB71}"/>
+                <a16:creationId xmlns:a16="http://schemas.microsoft.com/office/drawing/2014/main" id="{7A4AAAB9-E5FB-D9DF-1C00-B505BEFBBE5F}"/>
               </a:ext>
             </a:extLst>
           </p:cNvPr>
@@ -4406,96 +5186,18 @@
         </p:blipFill>
         <p:spPr>
           <a:xfrm>
-            <a:off x="6769684" y="182416"/>
-            <a:ext cx="4535626" cy="3023752"/>
+            <a:off x="3799359" y="2728261"/>
+            <a:ext cx="4593281" cy="4129739"/>
           </a:xfrm>
           <a:prstGeom prst="rect">
             <a:avLst/>
           </a:prstGeom>
-          <a:ln w="38100">
-            <a:solidFill>
-              <a:schemeClr val="tx1"/>
-            </a:solidFill>
-          </a:ln>
         </p:spPr>
       </p:pic>
-      <p:pic>
-        <p:nvPicPr>
-          <p:cNvPr id="10" name="Picture 9" descr="A diagram of a graph&#10;&#10;AI-generated content may be incorrect.">
-            <a:extLst>
-              <a:ext uri="{FF2B5EF4-FFF2-40B4-BE49-F238E27FC236}">
-                <a16:creationId xmlns:a16="http://schemas.microsoft.com/office/drawing/2014/main" id="{9AE9C298-A721-DA02-D62C-A3BF0E745F2A}"/>
-              </a:ext>
-            </a:extLst>
-          </p:cNvPr>
-          <p:cNvPicPr>
-            <a:picLocks noChangeAspect="1"/>
-          </p:cNvPicPr>
-          <p:nvPr/>
-        </p:nvPicPr>
-        <p:blipFill>
-          <a:blip r:embed="rId4"/>
-          <a:stretch>
-            <a:fillRect/>
-          </a:stretch>
-        </p:blipFill>
-        <p:spPr>
-          <a:xfrm>
-            <a:off x="6769684" y="3560627"/>
-            <a:ext cx="4535626" cy="3023751"/>
-          </a:xfrm>
-          <a:prstGeom prst="rect">
-            <a:avLst/>
-          </a:prstGeom>
-          <a:ln w="38100">
-            <a:solidFill>
-              <a:schemeClr val="tx1"/>
-            </a:solidFill>
-          </a:ln>
-        </p:spPr>
-      </p:pic>
-      <p:sp>
-        <p:nvSpPr>
-          <p:cNvPr id="11" name="TextBox 10">
-            <a:extLst>
-              <a:ext uri="{FF2B5EF4-FFF2-40B4-BE49-F238E27FC236}">
-                <a16:creationId xmlns:a16="http://schemas.microsoft.com/office/drawing/2014/main" id="{031A4306-79BD-7FBC-2973-91B4FF8600D1}"/>
-              </a:ext>
-            </a:extLst>
-          </p:cNvPr>
-          <p:cNvSpPr txBox="1"/>
-          <p:nvPr/>
-        </p:nvSpPr>
-        <p:spPr>
-          <a:xfrm>
-            <a:off x="387928" y="3985170"/>
-            <a:ext cx="5708072" cy="1938992"/>
-          </a:xfrm>
-          <a:prstGeom prst="rect">
-            <a:avLst/>
-          </a:prstGeom>
-          <a:solidFill>
-            <a:schemeClr val="accent2"/>
-          </a:solidFill>
-        </p:spPr>
-        <p:txBody>
-          <a:bodyPr wrap="square" rtlCol="0">
-            <a:spAutoFit/>
-          </a:bodyPr>
-          <a:lstStyle/>
-          <a:p>
-            <a:pPr algn="ctr"/>
-            <a:r>
-              <a:rPr lang="en-US" sz="4000" b="1" dirty="0"/>
-              <a:t>Initial Experiment with K=5 with split train/test (80/20)</a:t>
-            </a:r>
-          </a:p>
-        </p:txBody>
-      </p:sp>
     </p:spTree>
     <p:extLst>
       <p:ext uri="{BB962C8B-B14F-4D97-AF65-F5344CB8AC3E}">
-        <p14:creationId xmlns:p14="http://schemas.microsoft.com/office/powerpoint/2010/main" val="2743876708"/>
+        <p14:creationId xmlns:p14="http://schemas.microsoft.com/office/powerpoint/2010/main" val="4106298061"/>
       </p:ext>
     </p:extLst>
   </p:cSld>
@@ -4522,118 +5224,63 @@
           <a:chExt cx="0" cy="0"/>
         </a:xfrm>
       </p:grpSpPr>
-      <p:pic>
-        <p:nvPicPr>
-          <p:cNvPr id="5" name="Picture 4" descr="A table of numbers and letters&#10;&#10;AI-generated content may be incorrect.">
+      <p:sp>
+        <p:nvSpPr>
+          <p:cNvPr id="2" name="Title 1">
             <a:extLst>
               <a:ext uri="{FF2B5EF4-FFF2-40B4-BE49-F238E27FC236}">
-                <a16:creationId xmlns:a16="http://schemas.microsoft.com/office/drawing/2014/main" id="{DE0FE3D7-838F-70A0-7E5E-569460B2FBD6}"/>
+                <a16:creationId xmlns:a16="http://schemas.microsoft.com/office/drawing/2014/main" id="{BA43C611-88F6-CF17-FCA3-B9AC30C15775}"/>
               </a:ext>
             </a:extLst>
           </p:cNvPr>
-          <p:cNvPicPr>
-            <a:picLocks noChangeAspect="1"/>
-          </p:cNvPicPr>
-          <p:nvPr/>
-        </p:nvPicPr>
-        <p:blipFill>
-          <a:blip r:embed="rId2"/>
-          <a:stretch>
-            <a:fillRect/>
-          </a:stretch>
-        </p:blipFill>
-        <p:spPr>
-          <a:xfrm>
-            <a:off x="260817" y="64294"/>
-            <a:ext cx="3545251" cy="6729412"/>
-          </a:xfrm>
-          <a:prstGeom prst="rect">
-            <a:avLst/>
-          </a:prstGeom>
-          <a:ln w="38100">
-            <a:solidFill>
-              <a:schemeClr val="tx1"/>
-            </a:solidFill>
-          </a:ln>
-        </p:spPr>
-      </p:pic>
-      <p:pic>
-        <p:nvPicPr>
-          <p:cNvPr id="7" name="Picture 6" descr="A table of numbers and a train&#10;&#10;AI-generated content may be incorrect.">
+          <p:cNvSpPr>
+            <a:spLocks noGrp="1"/>
+          </p:cNvSpPr>
+          <p:nvPr>
+            <p:ph type="title"/>
+          </p:nvPr>
+        </p:nvSpPr>
+        <p:spPr/>
+        <p:txBody>
+          <a:bodyPr/>
+          <a:lstStyle/>
+          <a:p>
+            <a:r>
+              <a:rPr lang="en-US" dirty="0"/>
+              <a:t>Predicting Star Types using the Decision Tree model</a:t>
+            </a:r>
+          </a:p>
+        </p:txBody>
+      </p:sp>
+      <p:sp>
+        <p:nvSpPr>
+          <p:cNvPr id="3" name="Text Placeholder 2">
             <a:extLst>
               <a:ext uri="{FF2B5EF4-FFF2-40B4-BE49-F238E27FC236}">
-                <a16:creationId xmlns:a16="http://schemas.microsoft.com/office/drawing/2014/main" id="{7D838CB4-2840-A484-8589-F92CA9501615}"/>
+                <a16:creationId xmlns:a16="http://schemas.microsoft.com/office/drawing/2014/main" id="{5A70D355-73DE-53C3-FC59-AF6AF3B4C928}"/>
               </a:ext>
             </a:extLst>
           </p:cNvPr>
-          <p:cNvPicPr>
-            <a:picLocks noChangeAspect="1"/>
-          </p:cNvPicPr>
-          <p:nvPr/>
-        </p:nvPicPr>
-        <p:blipFill>
-          <a:blip r:embed="rId3"/>
-          <a:stretch>
-            <a:fillRect/>
-          </a:stretch>
-        </p:blipFill>
-        <p:spPr>
-          <a:xfrm>
-            <a:off x="4050579" y="100727"/>
-            <a:ext cx="3545251" cy="6692980"/>
-          </a:xfrm>
-          <a:prstGeom prst="rect">
-            <a:avLst/>
-          </a:prstGeom>
-          <a:ln w="38100">
-            <a:solidFill>
-              <a:schemeClr val="tx1"/>
-            </a:solidFill>
-          </a:ln>
-        </p:spPr>
-      </p:pic>
-      <p:sp>
-        <p:nvSpPr>
-          <p:cNvPr id="10" name="TextBox 9">
-            <a:extLst>
-              <a:ext uri="{FF2B5EF4-FFF2-40B4-BE49-F238E27FC236}">
-                <a16:creationId xmlns:a16="http://schemas.microsoft.com/office/drawing/2014/main" id="{0C5AEC4A-D94A-6DB4-816B-D59BC171CAA1}"/>
-              </a:ext>
-            </a:extLst>
-          </p:cNvPr>
-          <p:cNvSpPr txBox="1"/>
-          <p:nvPr/>
-        </p:nvSpPr>
-        <p:spPr>
-          <a:xfrm>
-            <a:off x="7983216" y="1246614"/>
-            <a:ext cx="3843338" cy="4401205"/>
-          </a:xfrm>
-          <a:prstGeom prst="rect">
-            <a:avLst/>
-          </a:prstGeom>
-          <a:solidFill>
-            <a:schemeClr val="accent2"/>
-          </a:solidFill>
-        </p:spPr>
-        <p:txBody>
-          <a:bodyPr wrap="square" rtlCol="0">
-            <a:spAutoFit/>
-          </a:bodyPr>
-          <a:lstStyle/>
-          <a:p>
-            <a:pPr algn="ctr"/>
-            <a:r>
-              <a:rPr lang="en-US" sz="4000" b="1" dirty="0"/>
-              <a:t>Ran 94 experiments of KNN models with different K’s ranging from 1 to 94 to observe accuracy</a:t>
-            </a:r>
+          <p:cNvSpPr>
+            <a:spLocks noGrp="1"/>
+          </p:cNvSpPr>
+          <p:nvPr>
+            <p:ph type="body" idx="1"/>
+          </p:nvPr>
+        </p:nvSpPr>
+        <p:spPr/>
+        <p:txBody>
+          <a:bodyPr/>
+          <a:lstStyle/>
+          <a:p>
+            <a:endParaRPr lang="en-US"/>
           </a:p>
         </p:txBody>
       </p:sp>
     </p:spTree>
     <p:extLst>
       <p:ext uri="{BB962C8B-B14F-4D97-AF65-F5344CB8AC3E}">
-        <p14:creationId xmlns:p14="http://schemas.microsoft.com/office/powerpoint/2010/main" val="39558463"/>
+        <p14:creationId xmlns:p14="http://schemas.microsoft.com/office/powerpoint/2010/main" val="3364378645"/>
       </p:ext>
     </p:extLst>
   </p:cSld>

</xml_diff>